<commit_message>
PPT para presentacion final modulo 1
</commit_message>
<xml_diff>
--- a/Common/2_Cohorte_G7.pptx
+++ b/Common/2_Cohorte_G7.pptx
@@ -12,9 +12,17 @@
     <p:sldId id="260" r:id="rId6"/>
     <p:sldId id="261" r:id="rId7"/>
     <p:sldId id="262" r:id="rId8"/>
-    <p:sldId id="264" r:id="rId9"/>
-    <p:sldId id="265" r:id="rId10"/>
-    <p:sldId id="266" r:id="rId11"/>
+    <p:sldId id="265" r:id="rId9"/>
+    <p:sldId id="266" r:id="rId10"/>
+    <p:sldId id="267" r:id="rId11"/>
+    <p:sldId id="271" r:id="rId12"/>
+    <p:sldId id="272" r:id="rId13"/>
+    <p:sldId id="273" r:id="rId14"/>
+    <p:sldId id="274" r:id="rId15"/>
+    <p:sldId id="270" r:id="rId16"/>
+    <p:sldId id="268" r:id="rId17"/>
+    <p:sldId id="269" r:id="rId18"/>
+    <p:sldId id="275" r:id="rId19"/>
   </p:sldIdLst>
   <p:sldSz cx="12192000" cy="6858000"/>
   <p:notesSz cx="6858000" cy="9144000"/>
@@ -171,7 +179,7 @@
           <a:noFill/>
           <a:extLst>
             <a:ext uri="{909E8E84-426E-40dd-AFC4-6F175D3DCCD1}">
-              <a14:hiddenFill xmlns="" xmlns:a14="http://schemas.microsoft.com/office/drawing/2010/main">
+              <a14:hiddenFill xmlns:a14="http://schemas.microsoft.com/office/drawing/2010/main" xmlns="">
                 <a:solidFill>
                   <a:srgbClr val="FFFFFF"/>
                 </a:solidFill>
@@ -231,7 +239,7 @@
             </a:ln>
             <a:extLst>
               <a:ext uri="{91240B29-F687-4f45-9708-019B960494DF}">
-                <a14:hiddenLine xmlns="" xmlns:a14="http://schemas.microsoft.com/office/drawing/2010/main" w="9525">
+                <a14:hiddenLine xmlns:a14="http://schemas.microsoft.com/office/drawing/2010/main" xmlns="" w="9525">
                   <a:solidFill>
                     <a:srgbClr val="000000"/>
                   </a:solidFill>
@@ -321,7 +329,7 @@
             </a:ln>
             <a:extLst>
               <a:ext uri="{91240B29-F687-4f45-9708-019B960494DF}">
-                <a14:hiddenLine xmlns="" xmlns:a14="http://schemas.microsoft.com/office/drawing/2010/main" w="9525">
+                <a14:hiddenLine xmlns:a14="http://schemas.microsoft.com/office/drawing/2010/main" xmlns="" w="9525">
                   <a:solidFill>
                     <a:srgbClr val="000000"/>
                   </a:solidFill>
@@ -411,7 +419,7 @@
             </a:ln>
             <a:extLst>
               <a:ext uri="{91240B29-F687-4f45-9708-019B960494DF}">
-                <a14:hiddenLine xmlns="" xmlns:a14="http://schemas.microsoft.com/office/drawing/2010/main" w="9525">
+                <a14:hiddenLine xmlns:a14="http://schemas.microsoft.com/office/drawing/2010/main" xmlns="" w="9525">
                   <a:solidFill>
                     <a:srgbClr val="000000"/>
                   </a:solidFill>
@@ -445,7 +453,7 @@
             </a:ln>
             <a:extLst>
               <a:ext uri="{91240B29-F687-4f45-9708-019B960494DF}">
-                <a14:hiddenLine xmlns="" xmlns:a14="http://schemas.microsoft.com/office/drawing/2010/main" w="9525">
+                <a14:hiddenLine xmlns:a14="http://schemas.microsoft.com/office/drawing/2010/main" xmlns="" w="9525">
                   <a:solidFill>
                     <a:srgbClr val="000000"/>
                   </a:solidFill>
@@ -535,7 +543,7 @@
             </a:ln>
             <a:extLst>
               <a:ext uri="{91240B29-F687-4f45-9708-019B960494DF}">
-                <a14:hiddenLine xmlns="" xmlns:a14="http://schemas.microsoft.com/office/drawing/2010/main" w="9525">
+                <a14:hiddenLine xmlns:a14="http://schemas.microsoft.com/office/drawing/2010/main" xmlns="" w="9525">
                   <a:solidFill>
                     <a:srgbClr val="000000"/>
                   </a:solidFill>
@@ -597,7 +605,7 @@
             </a:ln>
             <a:extLst>
               <a:ext uri="{91240B29-F687-4f45-9708-019B960494DF}">
-                <a14:hiddenLine xmlns="" xmlns:a14="http://schemas.microsoft.com/office/drawing/2010/main" w="9525">
+                <a14:hiddenLine xmlns:a14="http://schemas.microsoft.com/office/drawing/2010/main" xmlns="" w="9525">
                   <a:solidFill>
                     <a:srgbClr val="000000"/>
                   </a:solidFill>
@@ -659,7 +667,7 @@
             </a:ln>
             <a:extLst>
               <a:ext uri="{91240B29-F687-4f45-9708-019B960494DF}">
-                <a14:hiddenLine xmlns="" xmlns:a14="http://schemas.microsoft.com/office/drawing/2010/main" w="9525">
+                <a14:hiddenLine xmlns:a14="http://schemas.microsoft.com/office/drawing/2010/main" xmlns="" w="9525">
                   <a:solidFill>
                     <a:srgbClr val="000000"/>
                   </a:solidFill>
@@ -749,7 +757,7 @@
             </a:ln>
             <a:extLst>
               <a:ext uri="{91240B29-F687-4f45-9708-019B960494DF}">
-                <a14:hiddenLine xmlns="" xmlns:a14="http://schemas.microsoft.com/office/drawing/2010/main" w="9525">
+                <a14:hiddenLine xmlns:a14="http://schemas.microsoft.com/office/drawing/2010/main" xmlns="" w="9525">
                   <a:solidFill>
                     <a:srgbClr val="000000"/>
                   </a:solidFill>
@@ -811,7 +819,7 @@
             </a:ln>
             <a:extLst>
               <a:ext uri="{91240B29-F687-4f45-9708-019B960494DF}">
-                <a14:hiddenLine xmlns="" xmlns:a14="http://schemas.microsoft.com/office/drawing/2010/main" w="9525">
+                <a14:hiddenLine xmlns:a14="http://schemas.microsoft.com/office/drawing/2010/main" xmlns="" w="9525">
                   <a:solidFill>
                     <a:srgbClr val="000000"/>
                   </a:solidFill>
@@ -873,7 +881,7 @@
             </a:ln>
             <a:extLst>
               <a:ext uri="{91240B29-F687-4f45-9708-019B960494DF}">
-                <a14:hiddenLine xmlns="" xmlns:a14="http://schemas.microsoft.com/office/drawing/2010/main" w="9525">
+                <a14:hiddenLine xmlns:a14="http://schemas.microsoft.com/office/drawing/2010/main" xmlns="" w="9525">
                   <a:solidFill>
                     <a:srgbClr val="000000"/>
                   </a:solidFill>
@@ -963,7 +971,7 @@
             </a:ln>
             <a:extLst>
               <a:ext uri="{91240B29-F687-4f45-9708-019B960494DF}">
-                <a14:hiddenLine xmlns="" xmlns:a14="http://schemas.microsoft.com/office/drawing/2010/main" w="9525">
+                <a14:hiddenLine xmlns:a14="http://schemas.microsoft.com/office/drawing/2010/main" xmlns="" w="9525">
                   <a:solidFill>
                     <a:srgbClr val="000000"/>
                   </a:solidFill>
@@ -1053,7 +1061,7 @@
             </a:ln>
             <a:extLst>
               <a:ext uri="{91240B29-F687-4f45-9708-019B960494DF}">
-                <a14:hiddenLine xmlns="" xmlns:a14="http://schemas.microsoft.com/office/drawing/2010/main" w="9525">
+                <a14:hiddenLine xmlns:a14="http://schemas.microsoft.com/office/drawing/2010/main" xmlns="" w="9525">
                   <a:solidFill>
                     <a:srgbClr val="000000"/>
                   </a:solidFill>
@@ -1115,7 +1123,7 @@
             </a:ln>
             <a:extLst>
               <a:ext uri="{91240B29-F687-4f45-9708-019B960494DF}">
-                <a14:hiddenLine xmlns="" xmlns:a14="http://schemas.microsoft.com/office/drawing/2010/main" w="9525">
+                <a14:hiddenLine xmlns:a14="http://schemas.microsoft.com/office/drawing/2010/main" xmlns="" w="9525">
                   <a:solidFill>
                     <a:srgbClr val="000000"/>
                   </a:solidFill>
@@ -1225,7 +1233,7 @@
             </a:ln>
             <a:extLst>
               <a:ext uri="{91240B29-F687-4f45-9708-019B960494DF}">
-                <a14:hiddenLine xmlns="" xmlns:a14="http://schemas.microsoft.com/office/drawing/2010/main" w="9525">
+                <a14:hiddenLine xmlns:a14="http://schemas.microsoft.com/office/drawing/2010/main" xmlns="" w="9525">
                   <a:solidFill>
                     <a:srgbClr val="000000"/>
                   </a:solidFill>
@@ -1287,7 +1295,7 @@
             </a:ln>
             <a:extLst>
               <a:ext uri="{91240B29-F687-4f45-9708-019B960494DF}">
-                <a14:hiddenLine xmlns="" xmlns:a14="http://schemas.microsoft.com/office/drawing/2010/main" w="9525">
+                <a14:hiddenLine xmlns:a14="http://schemas.microsoft.com/office/drawing/2010/main" xmlns="" w="9525">
                   <a:solidFill>
                     <a:srgbClr val="000000"/>
                   </a:solidFill>
@@ -1377,7 +1385,7 @@
             </a:ln>
             <a:extLst>
               <a:ext uri="{91240B29-F687-4f45-9708-019B960494DF}">
-                <a14:hiddenLine xmlns="" xmlns:a14="http://schemas.microsoft.com/office/drawing/2010/main" w="9525">
+                <a14:hiddenLine xmlns:a14="http://schemas.microsoft.com/office/drawing/2010/main" xmlns="" w="9525">
                   <a:solidFill>
                     <a:srgbClr val="000000"/>
                   </a:solidFill>
@@ -1467,7 +1475,7 @@
             </a:ln>
             <a:extLst>
               <a:ext uri="{91240B29-F687-4f45-9708-019B960494DF}">
-                <a14:hiddenLine xmlns="" xmlns:a14="http://schemas.microsoft.com/office/drawing/2010/main" w="9525">
+                <a14:hiddenLine xmlns:a14="http://schemas.microsoft.com/office/drawing/2010/main" xmlns="" w="9525">
                   <a:solidFill>
                     <a:srgbClr val="000000"/>
                   </a:solidFill>
@@ -1529,7 +1537,7 @@
             </a:ln>
             <a:extLst>
               <a:ext uri="{91240B29-F687-4f45-9708-019B960494DF}">
-                <a14:hiddenLine xmlns="" xmlns:a14="http://schemas.microsoft.com/office/drawing/2010/main" w="9525">
+                <a14:hiddenLine xmlns:a14="http://schemas.microsoft.com/office/drawing/2010/main" xmlns="" w="9525">
                   <a:solidFill>
                     <a:srgbClr val="000000"/>
                   </a:solidFill>
@@ -1619,7 +1627,7 @@
             </a:ln>
             <a:extLst>
               <a:ext uri="{91240B29-F687-4f45-9708-019B960494DF}">
-                <a14:hiddenLine xmlns="" xmlns:a14="http://schemas.microsoft.com/office/drawing/2010/main" w="9525">
+                <a14:hiddenLine xmlns:a14="http://schemas.microsoft.com/office/drawing/2010/main" xmlns="" w="9525">
                   <a:solidFill>
                     <a:srgbClr val="000000"/>
                   </a:solidFill>
@@ -1709,7 +1717,7 @@
             </a:ln>
             <a:extLst>
               <a:ext uri="{91240B29-F687-4f45-9708-019B960494DF}">
-                <a14:hiddenLine xmlns="" xmlns:a14="http://schemas.microsoft.com/office/drawing/2010/main" w="9525">
+                <a14:hiddenLine xmlns:a14="http://schemas.microsoft.com/office/drawing/2010/main" xmlns="" w="9525">
                   <a:solidFill>
                     <a:srgbClr val="000000"/>
                   </a:solidFill>
@@ -1765,7 +1773,7 @@
             </a:ln>
             <a:extLst>
               <a:ext uri="{91240B29-F687-4f45-9708-019B960494DF}">
-                <a14:hiddenLine xmlns="" xmlns:a14="http://schemas.microsoft.com/office/drawing/2010/main" w="9525">
+                <a14:hiddenLine xmlns:a14="http://schemas.microsoft.com/office/drawing/2010/main" xmlns="" w="9525">
                   <a:solidFill>
                     <a:srgbClr val="000000"/>
                   </a:solidFill>
@@ -1855,7 +1863,7 @@
             </a:ln>
             <a:extLst>
               <a:ext uri="{91240B29-F687-4f45-9708-019B960494DF}">
-                <a14:hiddenLine xmlns="" xmlns:a14="http://schemas.microsoft.com/office/drawing/2010/main" w="9525">
+                <a14:hiddenLine xmlns:a14="http://schemas.microsoft.com/office/drawing/2010/main" xmlns="" w="9525">
                   <a:solidFill>
                     <a:srgbClr val="000000"/>
                   </a:solidFill>
@@ -1911,7 +1919,7 @@
             </a:ln>
             <a:extLst>
               <a:ext uri="{91240B29-F687-4f45-9708-019B960494DF}">
-                <a14:hiddenLine xmlns="" xmlns:a14="http://schemas.microsoft.com/office/drawing/2010/main" w="9525">
+                <a14:hiddenLine xmlns:a14="http://schemas.microsoft.com/office/drawing/2010/main" xmlns="" w="9525">
                   <a:solidFill>
                     <a:srgbClr val="000000"/>
                   </a:solidFill>
@@ -2001,7 +2009,7 @@
             </a:ln>
             <a:extLst>
               <a:ext uri="{91240B29-F687-4f45-9708-019B960494DF}">
-                <a14:hiddenLine xmlns="" xmlns:a14="http://schemas.microsoft.com/office/drawing/2010/main" w="9525">
+                <a14:hiddenLine xmlns:a14="http://schemas.microsoft.com/office/drawing/2010/main" xmlns="" w="9525">
                   <a:solidFill>
                     <a:srgbClr val="000000"/>
                   </a:solidFill>
@@ -2069,7 +2077,7 @@
             </a:ln>
             <a:extLst>
               <a:ext uri="{91240B29-F687-4f45-9708-019B960494DF}">
-                <a14:hiddenLine xmlns="" xmlns:a14="http://schemas.microsoft.com/office/drawing/2010/main" w="9525">
+                <a14:hiddenLine xmlns:a14="http://schemas.microsoft.com/office/drawing/2010/main" xmlns="" w="9525">
                   <a:solidFill>
                     <a:srgbClr val="000000"/>
                   </a:solidFill>
@@ -2159,7 +2167,7 @@
             </a:ln>
             <a:extLst>
               <a:ext uri="{91240B29-F687-4f45-9708-019B960494DF}">
-                <a14:hiddenLine xmlns="" xmlns:a14="http://schemas.microsoft.com/office/drawing/2010/main" w="9525">
+                <a14:hiddenLine xmlns:a14="http://schemas.microsoft.com/office/drawing/2010/main" xmlns="" w="9525">
                   <a:solidFill>
                     <a:srgbClr val="000000"/>
                   </a:solidFill>
@@ -2227,7 +2235,7 @@
             </a:ln>
             <a:extLst>
               <a:ext uri="{91240B29-F687-4f45-9708-019B960494DF}">
-                <a14:hiddenLine xmlns="" xmlns:a14="http://schemas.microsoft.com/office/drawing/2010/main" w="9525">
+                <a14:hiddenLine xmlns:a14="http://schemas.microsoft.com/office/drawing/2010/main" xmlns="" w="9525">
                   <a:solidFill>
                     <a:srgbClr val="000000"/>
                   </a:solidFill>
@@ -2317,7 +2325,7 @@
             </a:ln>
             <a:extLst>
               <a:ext uri="{91240B29-F687-4f45-9708-019B960494DF}">
-                <a14:hiddenLine xmlns="" xmlns:a14="http://schemas.microsoft.com/office/drawing/2010/main" w="9525">
+                <a14:hiddenLine xmlns:a14="http://schemas.microsoft.com/office/drawing/2010/main" xmlns="" w="9525">
                   <a:solidFill>
                     <a:srgbClr val="000000"/>
                   </a:solidFill>
@@ -2351,7 +2359,7 @@
             </a:ln>
             <a:extLst>
               <a:ext uri="{91240B29-F687-4f45-9708-019B960494DF}">
-                <a14:hiddenLine xmlns="" xmlns:a14="http://schemas.microsoft.com/office/drawing/2010/main" w="9525">
+                <a14:hiddenLine xmlns:a14="http://schemas.microsoft.com/office/drawing/2010/main" xmlns="" w="9525">
                   <a:solidFill>
                     <a:srgbClr val="000000"/>
                   </a:solidFill>
@@ -2441,7 +2449,7 @@
             </a:ln>
             <a:extLst>
               <a:ext uri="{91240B29-F687-4f45-9708-019B960494DF}">
-                <a14:hiddenLine xmlns="" xmlns:a14="http://schemas.microsoft.com/office/drawing/2010/main" w="9525">
+                <a14:hiddenLine xmlns:a14="http://schemas.microsoft.com/office/drawing/2010/main" xmlns="" w="9525">
                   <a:solidFill>
                     <a:srgbClr val="000000"/>
                   </a:solidFill>
@@ -2503,7 +2511,7 @@
             </a:ln>
             <a:extLst>
               <a:ext uri="{91240B29-F687-4f45-9708-019B960494DF}">
-                <a14:hiddenLine xmlns="" xmlns:a14="http://schemas.microsoft.com/office/drawing/2010/main" w="9525">
+                <a14:hiddenLine xmlns:a14="http://schemas.microsoft.com/office/drawing/2010/main" xmlns="" w="9525">
                   <a:solidFill>
                     <a:srgbClr val="000000"/>
                   </a:solidFill>
@@ -2565,7 +2573,7 @@
             </a:ln>
             <a:extLst>
               <a:ext uri="{91240B29-F687-4f45-9708-019B960494DF}">
-                <a14:hiddenLine xmlns="" xmlns:a14="http://schemas.microsoft.com/office/drawing/2010/main" w="9525">
+                <a14:hiddenLine xmlns:a14="http://schemas.microsoft.com/office/drawing/2010/main" xmlns="" w="9525">
                   <a:solidFill>
                     <a:srgbClr val="000000"/>
                   </a:solidFill>
@@ -2655,7 +2663,7 @@
             </a:ln>
             <a:extLst>
               <a:ext uri="{91240B29-F687-4f45-9708-019B960494DF}">
-                <a14:hiddenLine xmlns="" xmlns:a14="http://schemas.microsoft.com/office/drawing/2010/main" w="9525">
+                <a14:hiddenLine xmlns:a14="http://schemas.microsoft.com/office/drawing/2010/main" xmlns="" w="9525">
                   <a:solidFill>
                     <a:srgbClr val="000000"/>
                   </a:solidFill>
@@ -2723,7 +2731,7 @@
             </a:ln>
             <a:extLst>
               <a:ext uri="{91240B29-F687-4f45-9708-019B960494DF}">
-                <a14:hiddenLine xmlns="" xmlns:a14="http://schemas.microsoft.com/office/drawing/2010/main" w="9525">
+                <a14:hiddenLine xmlns:a14="http://schemas.microsoft.com/office/drawing/2010/main" xmlns="" w="9525">
                   <a:solidFill>
                     <a:srgbClr val="000000"/>
                   </a:solidFill>
@@ -2785,7 +2793,7 @@
             </a:ln>
             <a:extLst>
               <a:ext uri="{91240B29-F687-4f45-9708-019B960494DF}">
-                <a14:hiddenLine xmlns="" xmlns:a14="http://schemas.microsoft.com/office/drawing/2010/main" w="9525">
+                <a14:hiddenLine xmlns:a14="http://schemas.microsoft.com/office/drawing/2010/main" xmlns="" w="9525">
                   <a:solidFill>
                     <a:srgbClr val="000000"/>
                   </a:solidFill>
@@ -2875,7 +2883,7 @@
             </a:ln>
             <a:extLst>
               <a:ext uri="{91240B29-F687-4f45-9708-019B960494DF}">
-                <a14:hiddenLine xmlns="" xmlns:a14="http://schemas.microsoft.com/office/drawing/2010/main" w="9525">
+                <a14:hiddenLine xmlns:a14="http://schemas.microsoft.com/office/drawing/2010/main" xmlns="" w="9525">
                   <a:solidFill>
                     <a:srgbClr val="000000"/>
                   </a:solidFill>
@@ -2937,7 +2945,7 @@
             </a:ln>
             <a:extLst>
               <a:ext uri="{91240B29-F687-4f45-9708-019B960494DF}">
-                <a14:hiddenLine xmlns="" xmlns:a14="http://schemas.microsoft.com/office/drawing/2010/main" w="9525">
+                <a14:hiddenLine xmlns:a14="http://schemas.microsoft.com/office/drawing/2010/main" xmlns="" w="9525">
                   <a:solidFill>
                     <a:srgbClr val="000000"/>
                   </a:solidFill>
@@ -3027,7 +3035,7 @@
             </a:ln>
             <a:extLst>
               <a:ext uri="{91240B29-F687-4f45-9708-019B960494DF}">
-                <a14:hiddenLine xmlns="" xmlns:a14="http://schemas.microsoft.com/office/drawing/2010/main" w="9525">
+                <a14:hiddenLine xmlns:a14="http://schemas.microsoft.com/office/drawing/2010/main" xmlns="" w="9525">
                   <a:solidFill>
                     <a:srgbClr val="000000"/>
                   </a:solidFill>
@@ -3089,7 +3097,7 @@
             </a:ln>
             <a:extLst>
               <a:ext uri="{91240B29-F687-4f45-9708-019B960494DF}">
-                <a14:hiddenLine xmlns="" xmlns:a14="http://schemas.microsoft.com/office/drawing/2010/main" w="9525">
+                <a14:hiddenLine xmlns:a14="http://schemas.microsoft.com/office/drawing/2010/main" xmlns="" w="9525">
                   <a:solidFill>
                     <a:srgbClr val="000000"/>
                   </a:solidFill>
@@ -3179,7 +3187,7 @@
             </a:ln>
             <a:extLst>
               <a:ext uri="{91240B29-F687-4f45-9708-019B960494DF}">
-                <a14:hiddenLine xmlns="" xmlns:a14="http://schemas.microsoft.com/office/drawing/2010/main" w="9525">
+                <a14:hiddenLine xmlns:a14="http://schemas.microsoft.com/office/drawing/2010/main" xmlns="" w="9525">
                   <a:solidFill>
                     <a:srgbClr val="000000"/>
                   </a:solidFill>
@@ -3213,7 +3221,7 @@
             </a:ln>
             <a:extLst>
               <a:ext uri="{91240B29-F687-4f45-9708-019B960494DF}">
-                <a14:hiddenLine xmlns="" xmlns:a14="http://schemas.microsoft.com/office/drawing/2010/main" w="9525">
+                <a14:hiddenLine xmlns:a14="http://schemas.microsoft.com/office/drawing/2010/main" xmlns="" w="9525">
                   <a:solidFill>
                     <a:srgbClr val="000000"/>
                   </a:solidFill>
@@ -3278,7 +3286,7 @@
             </a:ln>
             <a:extLst>
               <a:ext uri="{91240B29-F687-4f45-9708-019B960494DF}">
-                <a14:hiddenLine xmlns="" xmlns:a14="http://schemas.microsoft.com/office/drawing/2010/main" w="9525">
+                <a14:hiddenLine xmlns:a14="http://schemas.microsoft.com/office/drawing/2010/main" xmlns="" w="9525">
                   <a:solidFill>
                     <a:srgbClr val="000000"/>
                   </a:solidFill>
@@ -3368,7 +3376,7 @@
             </a:ln>
             <a:extLst>
               <a:ext uri="{91240B29-F687-4f45-9708-019B960494DF}">
-                <a14:hiddenLine xmlns="" xmlns:a14="http://schemas.microsoft.com/office/drawing/2010/main" w="9525">
+                <a14:hiddenLine xmlns:a14="http://schemas.microsoft.com/office/drawing/2010/main" xmlns="" w="9525">
                   <a:solidFill>
                     <a:srgbClr val="000000"/>
                   </a:solidFill>
@@ -3430,7 +3438,7 @@
             </a:ln>
             <a:extLst>
               <a:ext uri="{91240B29-F687-4f45-9708-019B960494DF}">
-                <a14:hiddenLine xmlns="" xmlns:a14="http://schemas.microsoft.com/office/drawing/2010/main" w="9525">
+                <a14:hiddenLine xmlns:a14="http://schemas.microsoft.com/office/drawing/2010/main" xmlns="" w="9525">
                   <a:solidFill>
                     <a:srgbClr val="000000"/>
                   </a:solidFill>
@@ -3520,7 +3528,7 @@
             </a:ln>
             <a:extLst>
               <a:ext uri="{91240B29-F687-4f45-9708-019B960494DF}">
-                <a14:hiddenLine xmlns="" xmlns:a14="http://schemas.microsoft.com/office/drawing/2010/main" w="9525">
+                <a14:hiddenLine xmlns:a14="http://schemas.microsoft.com/office/drawing/2010/main" xmlns="" w="9525">
                   <a:solidFill>
                     <a:srgbClr val="000000"/>
                   </a:solidFill>
@@ -3610,7 +3618,7 @@
             </a:ln>
             <a:extLst>
               <a:ext uri="{91240B29-F687-4f45-9708-019B960494DF}">
-                <a14:hiddenLine xmlns="" xmlns:a14="http://schemas.microsoft.com/office/drawing/2010/main" w="9525">
+                <a14:hiddenLine xmlns:a14="http://schemas.microsoft.com/office/drawing/2010/main" xmlns="" w="9525">
                   <a:solidFill>
                     <a:srgbClr val="000000"/>
                   </a:solidFill>
@@ -3675,7 +3683,7 @@
             </a:ln>
             <a:extLst>
               <a:ext uri="{91240B29-F687-4f45-9708-019B960494DF}">
-                <a14:hiddenLine xmlns="" xmlns:a14="http://schemas.microsoft.com/office/drawing/2010/main" w="9525">
+                <a14:hiddenLine xmlns:a14="http://schemas.microsoft.com/office/drawing/2010/main" xmlns="" w="9525">
                   <a:solidFill>
                     <a:srgbClr val="000000"/>
                   </a:solidFill>
@@ -3737,7 +3745,7 @@
             </a:ln>
             <a:extLst>
               <a:ext uri="{91240B29-F687-4f45-9708-019B960494DF}">
-                <a14:hiddenLine xmlns="" xmlns:a14="http://schemas.microsoft.com/office/drawing/2010/main" w="9525">
+                <a14:hiddenLine xmlns:a14="http://schemas.microsoft.com/office/drawing/2010/main" xmlns="" w="9525">
                   <a:solidFill>
                     <a:srgbClr val="000000"/>
                   </a:solidFill>
@@ -3827,7 +3835,7 @@
             </a:ln>
             <a:extLst>
               <a:ext uri="{91240B29-F687-4f45-9708-019B960494DF}">
-                <a14:hiddenLine xmlns="" xmlns:a14="http://schemas.microsoft.com/office/drawing/2010/main" w="9525">
+                <a14:hiddenLine xmlns:a14="http://schemas.microsoft.com/office/drawing/2010/main" xmlns="" w="9525">
                   <a:solidFill>
                     <a:srgbClr val="000000"/>
                   </a:solidFill>
@@ -3917,7 +3925,7 @@
             </a:ln>
             <a:extLst>
               <a:ext uri="{91240B29-F687-4f45-9708-019B960494DF}">
-                <a14:hiddenLine xmlns="" xmlns:a14="http://schemas.microsoft.com/office/drawing/2010/main" w="9525">
+                <a14:hiddenLine xmlns:a14="http://schemas.microsoft.com/office/drawing/2010/main" xmlns="" w="9525">
                   <a:solidFill>
                     <a:srgbClr val="000000"/>
                   </a:solidFill>
@@ -3979,7 +3987,7 @@
             </a:ln>
             <a:extLst>
               <a:ext uri="{91240B29-F687-4f45-9708-019B960494DF}">
-                <a14:hiddenLine xmlns="" xmlns:a14="http://schemas.microsoft.com/office/drawing/2010/main" w="9525">
+                <a14:hiddenLine xmlns:a14="http://schemas.microsoft.com/office/drawing/2010/main" xmlns="" w="9525">
                   <a:solidFill>
                     <a:srgbClr val="000000"/>
                   </a:solidFill>
@@ -4099,7 +4107,7 @@
             </a:ln>
             <a:extLst>
               <a:ext uri="{91240B29-F687-4f45-9708-019B960494DF}">
-                <a14:hiddenLine xmlns="" xmlns:a14="http://schemas.microsoft.com/office/drawing/2010/main" w="9525">
+                <a14:hiddenLine xmlns:a14="http://schemas.microsoft.com/office/drawing/2010/main" xmlns="" w="9525">
                   <a:solidFill>
                     <a:srgbClr val="000000"/>
                   </a:solidFill>
@@ -4167,7 +4175,7 @@
             </a:ln>
             <a:extLst>
               <a:ext uri="{91240B29-F687-4f45-9708-019B960494DF}">
-                <a14:hiddenLine xmlns="" xmlns:a14="http://schemas.microsoft.com/office/drawing/2010/main" w="9525">
+                <a14:hiddenLine xmlns:a14="http://schemas.microsoft.com/office/drawing/2010/main" xmlns="" w="9525">
                   <a:solidFill>
                     <a:srgbClr val="000000"/>
                   </a:solidFill>
@@ -4257,7 +4265,7 @@
             </a:ln>
             <a:extLst>
               <a:ext uri="{91240B29-F687-4f45-9708-019B960494DF}">
-                <a14:hiddenLine xmlns="" xmlns:a14="http://schemas.microsoft.com/office/drawing/2010/main" w="9525">
+                <a14:hiddenLine xmlns:a14="http://schemas.microsoft.com/office/drawing/2010/main" xmlns="" w="9525">
                   <a:solidFill>
                     <a:srgbClr val="000000"/>
                   </a:solidFill>
@@ -4397,7 +4405,7 @@
           <a:p>
             <a:fld id="{48A87A34-81AB-432B-8DAE-1953F412C126}" type="datetimeFigureOut">
               <a:rPr lang="en-US" dirty="0"/>
-              <a:t>5/26/2020</a:t>
+              <a:t>6/14/2020</a:t>
             </a:fld>
             <a:endParaRPr lang="en-US" dirty="0"/>
           </a:p>
@@ -4659,7 +4667,7 @@
           <a:p>
             <a:fld id="{48A87A34-81AB-432B-8DAE-1953F412C126}" type="datetimeFigureOut">
               <a:rPr lang="en-US" dirty="0"/>
-              <a:t>5/26/2020</a:t>
+              <a:t>6/14/2020</a:t>
             </a:fld>
             <a:endParaRPr lang="en-US" dirty="0"/>
           </a:p>
@@ -4850,7 +4858,7 @@
           <a:p>
             <a:fld id="{48A87A34-81AB-432B-8DAE-1953F412C126}" type="datetimeFigureOut">
               <a:rPr lang="en-US" dirty="0"/>
-              <a:t>5/26/2020</a:t>
+              <a:t>6/14/2020</a:t>
             </a:fld>
             <a:endParaRPr lang="en-US" dirty="0"/>
           </a:p>
@@ -5108,7 +5116,7 @@
           <a:p>
             <a:fld id="{48A87A34-81AB-432B-8DAE-1953F412C126}" type="datetimeFigureOut">
               <a:rPr lang="en-US" dirty="0"/>
-              <a:t>5/26/2020</a:t>
+              <a:t>6/14/2020</a:t>
             </a:fld>
             <a:endParaRPr lang="en-US" dirty="0"/>
           </a:p>
@@ -5537,7 +5545,7 @@
           <a:p>
             <a:fld id="{48A87A34-81AB-432B-8DAE-1953F412C126}" type="datetimeFigureOut">
               <a:rPr lang="en-US" dirty="0"/>
-              <a:t>5/26/2020</a:t>
+              <a:t>6/14/2020</a:t>
             </a:fld>
             <a:endParaRPr lang="en-US" dirty="0"/>
           </a:p>
@@ -6078,7 +6086,7 @@
           <a:p>
             <a:fld id="{48A87A34-81AB-432B-8DAE-1953F412C126}" type="datetimeFigureOut">
               <a:rPr lang="en-US" dirty="0"/>
-              <a:t>5/26/2020</a:t>
+              <a:t>6/14/2020</a:t>
             </a:fld>
             <a:endParaRPr lang="en-US" dirty="0"/>
           </a:p>
@@ -6793,7 +6801,7 @@
           <a:p>
             <a:fld id="{48A87A34-81AB-432B-8DAE-1953F412C126}" type="datetimeFigureOut">
               <a:rPr lang="en-US" dirty="0"/>
-              <a:t>5/26/2020</a:t>
+              <a:t>6/14/2020</a:t>
             </a:fld>
             <a:endParaRPr lang="en-US" dirty="0"/>
           </a:p>
@@ -6958,7 +6966,7 @@
           <a:p>
             <a:fld id="{48A87A34-81AB-432B-8DAE-1953F412C126}" type="datetimeFigureOut">
               <a:rPr lang="en-US" dirty="0"/>
-              <a:t>5/26/2020</a:t>
+              <a:t>6/14/2020</a:t>
             </a:fld>
             <a:endParaRPr lang="en-US" dirty="0"/>
           </a:p>
@@ -7133,7 +7141,7 @@
           <a:p>
             <a:fld id="{48A87A34-81AB-432B-8DAE-1953F412C126}" type="datetimeFigureOut">
               <a:rPr lang="en-US" dirty="0"/>
-              <a:t>5/26/2020</a:t>
+              <a:t>6/14/2020</a:t>
             </a:fld>
             <a:endParaRPr lang="en-US" dirty="0"/>
           </a:p>
@@ -7298,7 +7306,7 @@
           <a:p>
             <a:fld id="{48A87A34-81AB-432B-8DAE-1953F412C126}" type="datetimeFigureOut">
               <a:rPr lang="en-US" dirty="0"/>
-              <a:t>5/26/2020</a:t>
+              <a:t>6/14/2020</a:t>
             </a:fld>
             <a:endParaRPr lang="en-US" dirty="0"/>
           </a:p>
@@ -7543,7 +7551,7 @@
           <a:p>
             <a:fld id="{48A87A34-81AB-432B-8DAE-1953F412C126}" type="datetimeFigureOut">
               <a:rPr lang="en-US" dirty="0"/>
-              <a:t>5/26/2020</a:t>
+              <a:t>6/14/2020</a:t>
             </a:fld>
             <a:endParaRPr lang="en-US" dirty="0"/>
           </a:p>
@@ -7770,7 +7778,7 @@
           <a:p>
             <a:fld id="{48A87A34-81AB-432B-8DAE-1953F412C126}" type="datetimeFigureOut">
               <a:rPr lang="en-US" dirty="0"/>
-              <a:t>5/26/2020</a:t>
+              <a:t>6/14/2020</a:t>
             </a:fld>
             <a:endParaRPr lang="en-US" dirty="0"/>
           </a:p>
@@ -8146,7 +8154,7 @@
           <a:p>
             <a:fld id="{48A87A34-81AB-432B-8DAE-1953F412C126}" type="datetimeFigureOut">
               <a:rPr lang="en-US" dirty="0"/>
-              <a:t>5/26/2020</a:t>
+              <a:t>6/14/2020</a:t>
             </a:fld>
             <a:endParaRPr lang="en-US" dirty="0"/>
           </a:p>
@@ -8259,7 +8267,7 @@
           <a:p>
             <a:fld id="{48A87A34-81AB-432B-8DAE-1953F412C126}" type="datetimeFigureOut">
               <a:rPr lang="en-US" dirty="0"/>
-              <a:t>5/26/2020</a:t>
+              <a:t>6/14/2020</a:t>
             </a:fld>
             <a:endParaRPr lang="en-US" dirty="0"/>
           </a:p>
@@ -8349,7 +8357,7 @@
           <a:p>
             <a:fld id="{48A87A34-81AB-432B-8DAE-1953F412C126}" type="datetimeFigureOut">
               <a:rPr lang="en-US" dirty="0"/>
-              <a:t>5/26/2020</a:t>
+              <a:t>6/14/2020</a:t>
             </a:fld>
             <a:endParaRPr lang="en-US" dirty="0"/>
           </a:p>
@@ -8593,7 +8601,7 @@
           <a:p>
             <a:fld id="{48A87A34-81AB-432B-8DAE-1953F412C126}" type="datetimeFigureOut">
               <a:rPr lang="en-US" dirty="0"/>
-              <a:t>5/26/2020</a:t>
+              <a:t>6/14/2020</a:t>
             </a:fld>
             <a:endParaRPr lang="en-US" dirty="0"/>
           </a:p>
@@ -8868,7 +8876,7 @@
           <a:p>
             <a:fld id="{48A87A34-81AB-432B-8DAE-1953F412C126}" type="datetimeFigureOut">
               <a:rPr lang="en-US" dirty="0"/>
-              <a:t>5/26/2020</a:t>
+              <a:t>6/14/2020</a:t>
             </a:fld>
             <a:endParaRPr lang="en-US" dirty="0"/>
           </a:p>
@@ -8979,7 +8987,7 @@
           <a:noFill/>
           <a:extLst>
             <a:ext uri="{909E8E84-426E-40dd-AFC4-6F175D3DCCD1}">
-              <a14:hiddenFill xmlns="" xmlns:a14="http://schemas.microsoft.com/office/drawing/2010/main">
+              <a14:hiddenFill xmlns:a14="http://schemas.microsoft.com/office/drawing/2010/main" xmlns="">
                 <a:solidFill>
                   <a:srgbClr val="FFFFFF"/>
                 </a:solidFill>
@@ -9053,7 +9061,7 @@
               </a:ln>
               <a:extLst>
                 <a:ext uri="{91240B29-F687-4f45-9708-019B960494DF}">
-                  <a14:hiddenLine xmlns="" xmlns:a14="http://schemas.microsoft.com/office/drawing/2010/main" w="9525">
+                  <a14:hiddenLine xmlns:a14="http://schemas.microsoft.com/office/drawing/2010/main" xmlns="" w="9525">
                     <a:solidFill>
                       <a:srgbClr val="000000"/>
                     </a:solidFill>
@@ -9143,7 +9151,7 @@
               </a:ln>
               <a:extLst>
                 <a:ext uri="{91240B29-F687-4f45-9708-019B960494DF}">
-                  <a14:hiddenLine xmlns="" xmlns:a14="http://schemas.microsoft.com/office/drawing/2010/main" w="9525">
+                  <a14:hiddenLine xmlns:a14="http://schemas.microsoft.com/office/drawing/2010/main" xmlns="" w="9525">
                     <a:solidFill>
                       <a:srgbClr val="000000"/>
                     </a:solidFill>
@@ -9233,7 +9241,7 @@
               </a:ln>
               <a:extLst>
                 <a:ext uri="{91240B29-F687-4f45-9708-019B960494DF}">
-                  <a14:hiddenLine xmlns="" xmlns:a14="http://schemas.microsoft.com/office/drawing/2010/main" w="9525">
+                  <a14:hiddenLine xmlns:a14="http://schemas.microsoft.com/office/drawing/2010/main" xmlns="" w="9525">
                     <a:solidFill>
                       <a:srgbClr val="000000"/>
                     </a:solidFill>
@@ -9295,7 +9303,7 @@
               </a:ln>
               <a:extLst>
                 <a:ext uri="{91240B29-F687-4f45-9708-019B960494DF}">
-                  <a14:hiddenLine xmlns="" xmlns:a14="http://schemas.microsoft.com/office/drawing/2010/main" w="9525">
+                  <a14:hiddenLine xmlns:a14="http://schemas.microsoft.com/office/drawing/2010/main" xmlns="" w="9525">
                     <a:solidFill>
                       <a:srgbClr val="000000"/>
                     </a:solidFill>
@@ -9385,7 +9393,7 @@
               </a:ln>
               <a:extLst>
                 <a:ext uri="{91240B29-F687-4f45-9708-019B960494DF}">
-                  <a14:hiddenLine xmlns="" xmlns:a14="http://schemas.microsoft.com/office/drawing/2010/main" w="9525">
+                  <a14:hiddenLine xmlns:a14="http://schemas.microsoft.com/office/drawing/2010/main" xmlns="" w="9525">
                     <a:solidFill>
                       <a:srgbClr val="000000"/>
                     </a:solidFill>
@@ -9447,7 +9455,7 @@
               </a:ln>
               <a:extLst>
                 <a:ext uri="{91240B29-F687-4f45-9708-019B960494DF}">
-                  <a14:hiddenLine xmlns="" xmlns:a14="http://schemas.microsoft.com/office/drawing/2010/main" w="9525">
+                  <a14:hiddenLine xmlns:a14="http://schemas.microsoft.com/office/drawing/2010/main" xmlns="" w="9525">
                     <a:solidFill>
                       <a:srgbClr val="000000"/>
                     </a:solidFill>
@@ -9509,7 +9517,7 @@
               </a:ln>
               <a:extLst>
                 <a:ext uri="{91240B29-F687-4f45-9708-019B960494DF}">
-                  <a14:hiddenLine xmlns="" xmlns:a14="http://schemas.microsoft.com/office/drawing/2010/main" w="9525">
+                  <a14:hiddenLine xmlns:a14="http://schemas.microsoft.com/office/drawing/2010/main" xmlns="" w="9525">
                     <a:solidFill>
                       <a:srgbClr val="000000"/>
                     </a:solidFill>
@@ -9599,7 +9607,7 @@
               </a:ln>
               <a:extLst>
                 <a:ext uri="{91240B29-F687-4f45-9708-019B960494DF}">
-                  <a14:hiddenLine xmlns="" xmlns:a14="http://schemas.microsoft.com/office/drawing/2010/main" w="9525">
+                  <a14:hiddenLine xmlns:a14="http://schemas.microsoft.com/office/drawing/2010/main" xmlns="" w="9525">
                     <a:solidFill>
                       <a:srgbClr val="000000"/>
                     </a:solidFill>
@@ -9689,7 +9697,7 @@
               </a:ln>
               <a:extLst>
                 <a:ext uri="{91240B29-F687-4f45-9708-019B960494DF}">
-                  <a14:hiddenLine xmlns="" xmlns:a14="http://schemas.microsoft.com/office/drawing/2010/main" w="9525">
+                  <a14:hiddenLine xmlns:a14="http://schemas.microsoft.com/office/drawing/2010/main" xmlns="" w="9525">
                     <a:solidFill>
                       <a:srgbClr val="000000"/>
                     </a:solidFill>
@@ -9751,7 +9759,7 @@
               </a:ln>
               <a:extLst>
                 <a:ext uri="{91240B29-F687-4f45-9708-019B960494DF}">
-                  <a14:hiddenLine xmlns="" xmlns:a14="http://schemas.microsoft.com/office/drawing/2010/main" w="9525">
+                  <a14:hiddenLine xmlns:a14="http://schemas.microsoft.com/office/drawing/2010/main" xmlns="" w="9525">
                     <a:solidFill>
                       <a:srgbClr val="000000"/>
                     </a:solidFill>
@@ -9861,7 +9869,7 @@
               </a:ln>
               <a:extLst>
                 <a:ext uri="{91240B29-F687-4f45-9708-019B960494DF}">
-                  <a14:hiddenLine xmlns="" xmlns:a14="http://schemas.microsoft.com/office/drawing/2010/main" w="9525">
+                  <a14:hiddenLine xmlns:a14="http://schemas.microsoft.com/office/drawing/2010/main" xmlns="" w="9525">
                     <a:solidFill>
                       <a:srgbClr val="000000"/>
                     </a:solidFill>
@@ -9945,7 +9953,7 @@
               </a:ln>
               <a:extLst>
                 <a:ext uri="{91240B29-F687-4f45-9708-019B960494DF}">
-                  <a14:hiddenLine xmlns="" xmlns:a14="http://schemas.microsoft.com/office/drawing/2010/main" w="9525">
+                  <a14:hiddenLine xmlns:a14="http://schemas.microsoft.com/office/drawing/2010/main" xmlns="" w="9525">
                     <a:solidFill>
                       <a:srgbClr val="000000"/>
                     </a:solidFill>
@@ -10007,7 +10015,7 @@
               </a:ln>
               <a:extLst>
                 <a:ext uri="{91240B29-F687-4f45-9708-019B960494DF}">
-                  <a14:hiddenLine xmlns="" xmlns:a14="http://schemas.microsoft.com/office/drawing/2010/main" w="9525">
+                  <a14:hiddenLine xmlns:a14="http://schemas.microsoft.com/office/drawing/2010/main" xmlns="" w="9525">
                     <a:solidFill>
                       <a:srgbClr val="000000"/>
                     </a:solidFill>
@@ -10069,7 +10077,7 @@
               </a:ln>
               <a:extLst>
                 <a:ext uri="{91240B29-F687-4f45-9708-019B960494DF}">
-                  <a14:hiddenLine xmlns="" xmlns:a14="http://schemas.microsoft.com/office/drawing/2010/main" w="9525">
+                  <a14:hiddenLine xmlns:a14="http://schemas.microsoft.com/office/drawing/2010/main" xmlns="" w="9525">
                     <a:solidFill>
                       <a:srgbClr val="000000"/>
                     </a:solidFill>
@@ -10159,7 +10167,7 @@
               </a:ln>
               <a:extLst>
                 <a:ext uri="{91240B29-F687-4f45-9708-019B960494DF}">
-                  <a14:hiddenLine xmlns="" xmlns:a14="http://schemas.microsoft.com/office/drawing/2010/main" w="9525">
+                  <a14:hiddenLine xmlns:a14="http://schemas.microsoft.com/office/drawing/2010/main" xmlns="" w="9525">
                     <a:solidFill>
                       <a:srgbClr val="000000"/>
                     </a:solidFill>
@@ -10193,7 +10201,7 @@
               </a:ln>
               <a:extLst>
                 <a:ext uri="{91240B29-F687-4f45-9708-019B960494DF}">
-                  <a14:hiddenLine xmlns="" xmlns:a14="http://schemas.microsoft.com/office/drawing/2010/main" w="9525">
+                  <a14:hiddenLine xmlns:a14="http://schemas.microsoft.com/office/drawing/2010/main" xmlns="" w="9525">
                     <a:solidFill>
                       <a:srgbClr val="000000"/>
                     </a:solidFill>
@@ -10258,7 +10266,7 @@
               </a:ln>
               <a:extLst>
                 <a:ext uri="{91240B29-F687-4f45-9708-019B960494DF}">
-                  <a14:hiddenLine xmlns="" xmlns:a14="http://schemas.microsoft.com/office/drawing/2010/main" w="9525">
+                  <a14:hiddenLine xmlns:a14="http://schemas.microsoft.com/office/drawing/2010/main" xmlns="" w="9525">
                     <a:solidFill>
                       <a:srgbClr val="000000"/>
                     </a:solidFill>
@@ -10348,7 +10356,7 @@
               </a:ln>
               <a:extLst>
                 <a:ext uri="{91240B29-F687-4f45-9708-019B960494DF}">
-                  <a14:hiddenLine xmlns="" xmlns:a14="http://schemas.microsoft.com/office/drawing/2010/main" w="9525">
+                  <a14:hiddenLine xmlns:a14="http://schemas.microsoft.com/office/drawing/2010/main" xmlns="" w="9525">
                     <a:solidFill>
                       <a:srgbClr val="000000"/>
                     </a:solidFill>
@@ -10410,7 +10418,7 @@
               </a:ln>
               <a:extLst>
                 <a:ext uri="{91240B29-F687-4f45-9708-019B960494DF}">
-                  <a14:hiddenLine xmlns="" xmlns:a14="http://schemas.microsoft.com/office/drawing/2010/main" w="9525">
+                  <a14:hiddenLine xmlns:a14="http://schemas.microsoft.com/office/drawing/2010/main" xmlns="" w="9525">
                     <a:solidFill>
                       <a:srgbClr val="000000"/>
                     </a:solidFill>
@@ -10500,7 +10508,7 @@
               </a:ln>
               <a:extLst>
                 <a:ext uri="{91240B29-F687-4f45-9708-019B960494DF}">
-                  <a14:hiddenLine xmlns="" xmlns:a14="http://schemas.microsoft.com/office/drawing/2010/main" w="9525">
+                  <a14:hiddenLine xmlns:a14="http://schemas.microsoft.com/office/drawing/2010/main" xmlns="" w="9525">
                     <a:solidFill>
                       <a:srgbClr val="000000"/>
                     </a:solidFill>
@@ -10565,7 +10573,7 @@
               </a:ln>
               <a:extLst>
                 <a:ext uri="{91240B29-F687-4f45-9708-019B960494DF}">
-                  <a14:hiddenLine xmlns="" xmlns:a14="http://schemas.microsoft.com/office/drawing/2010/main" w="9525">
+                  <a14:hiddenLine xmlns:a14="http://schemas.microsoft.com/office/drawing/2010/main" xmlns="" w="9525">
                     <a:solidFill>
                       <a:srgbClr val="000000"/>
                     </a:solidFill>
@@ -10627,7 +10635,7 @@
               </a:ln>
               <a:extLst>
                 <a:ext uri="{91240B29-F687-4f45-9708-019B960494DF}">
-                  <a14:hiddenLine xmlns="" xmlns:a14="http://schemas.microsoft.com/office/drawing/2010/main" w="9525">
+                  <a14:hiddenLine xmlns:a14="http://schemas.microsoft.com/office/drawing/2010/main" xmlns="" w="9525">
                     <a:solidFill>
                       <a:srgbClr val="000000"/>
                     </a:solidFill>
@@ -10717,7 +10725,7 @@
               </a:ln>
               <a:extLst>
                 <a:ext uri="{91240B29-F687-4f45-9708-019B960494DF}">
-                  <a14:hiddenLine xmlns="" xmlns:a14="http://schemas.microsoft.com/office/drawing/2010/main" w="9525">
+                  <a14:hiddenLine xmlns:a14="http://schemas.microsoft.com/office/drawing/2010/main" xmlns="" w="9525">
                     <a:solidFill>
                       <a:srgbClr val="000000"/>
                     </a:solidFill>
@@ -10807,7 +10815,7 @@
               </a:ln>
               <a:extLst>
                 <a:ext uri="{91240B29-F687-4f45-9708-019B960494DF}">
-                  <a14:hiddenLine xmlns="" xmlns:a14="http://schemas.microsoft.com/office/drawing/2010/main" w="9525">
+                  <a14:hiddenLine xmlns:a14="http://schemas.microsoft.com/office/drawing/2010/main" xmlns="" w="9525">
                     <a:solidFill>
                       <a:srgbClr val="000000"/>
                     </a:solidFill>
@@ -10872,7 +10880,7 @@
               </a:ln>
               <a:extLst>
                 <a:ext uri="{91240B29-F687-4f45-9708-019B960494DF}">
-                  <a14:hiddenLine xmlns="" xmlns:a14="http://schemas.microsoft.com/office/drawing/2010/main" w="9525">
+                  <a14:hiddenLine xmlns:a14="http://schemas.microsoft.com/office/drawing/2010/main" xmlns="" w="9525">
                     <a:solidFill>
                       <a:srgbClr val="000000"/>
                     </a:solidFill>
@@ -10992,7 +11000,7 @@
               </a:ln>
               <a:extLst>
                 <a:ext uri="{91240B29-F687-4f45-9708-019B960494DF}">
-                  <a14:hiddenLine xmlns="" xmlns:a14="http://schemas.microsoft.com/office/drawing/2010/main" w="9525">
+                  <a14:hiddenLine xmlns:a14="http://schemas.microsoft.com/office/drawing/2010/main" xmlns="" w="9525">
                     <a:solidFill>
                       <a:srgbClr val="000000"/>
                     </a:solidFill>
@@ -11090,7 +11098,7 @@
               </a:ln>
               <a:extLst>
                 <a:ext uri="{91240B29-F687-4f45-9708-019B960494DF}">
-                  <a14:hiddenLine xmlns="" xmlns:a14="http://schemas.microsoft.com/office/drawing/2010/main" w="9525">
+                  <a14:hiddenLine xmlns:a14="http://schemas.microsoft.com/office/drawing/2010/main" xmlns="" w="9525">
                     <a:solidFill>
                       <a:srgbClr val="000000"/>
                     </a:solidFill>
@@ -11205,7 +11213,7 @@
               </a:ln>
               <a:extLst>
                 <a:ext uri="{91240B29-F687-4f45-9708-019B960494DF}">
-                  <a14:hiddenLine xmlns="" xmlns:a14="http://schemas.microsoft.com/office/drawing/2010/main" w="9525">
+                  <a14:hiddenLine xmlns:a14="http://schemas.microsoft.com/office/drawing/2010/main" xmlns="" w="9525">
                     <a:solidFill>
                       <a:srgbClr val="000000"/>
                     </a:solidFill>
@@ -11295,7 +11303,7 @@
               </a:ln>
               <a:extLst>
                 <a:ext uri="{91240B29-F687-4f45-9708-019B960494DF}">
-                  <a14:hiddenLine xmlns="" xmlns:a14="http://schemas.microsoft.com/office/drawing/2010/main" w="9525">
+                  <a14:hiddenLine xmlns:a14="http://schemas.microsoft.com/office/drawing/2010/main" xmlns="" w="9525">
                     <a:solidFill>
                       <a:srgbClr val="000000"/>
                     </a:solidFill>
@@ -11360,7 +11368,7 @@
               </a:ln>
               <a:extLst>
                 <a:ext uri="{91240B29-F687-4f45-9708-019B960494DF}">
-                  <a14:hiddenLine xmlns="" xmlns:a14="http://schemas.microsoft.com/office/drawing/2010/main" w="9525">
+                  <a14:hiddenLine xmlns:a14="http://schemas.microsoft.com/office/drawing/2010/main" xmlns="" w="9525">
                     <a:solidFill>
                       <a:srgbClr val="000000"/>
                     </a:solidFill>
@@ -11450,7 +11458,7 @@
               </a:ln>
               <a:extLst>
                 <a:ext uri="{91240B29-F687-4f45-9708-019B960494DF}">
-                  <a14:hiddenLine xmlns="" xmlns:a14="http://schemas.microsoft.com/office/drawing/2010/main" w="9525">
+                  <a14:hiddenLine xmlns:a14="http://schemas.microsoft.com/office/drawing/2010/main" xmlns="" w="9525">
                     <a:solidFill>
                       <a:srgbClr val="000000"/>
                     </a:solidFill>
@@ -11518,7 +11526,7 @@
               </a:ln>
               <a:extLst>
                 <a:ext uri="{91240B29-F687-4f45-9708-019B960494DF}">
-                  <a14:hiddenLine xmlns="" xmlns:a14="http://schemas.microsoft.com/office/drawing/2010/main" w="9525">
+                  <a14:hiddenLine xmlns:a14="http://schemas.microsoft.com/office/drawing/2010/main" xmlns="" w="9525">
                     <a:solidFill>
                       <a:srgbClr val="000000"/>
                     </a:solidFill>
@@ -11608,7 +11616,7 @@
               </a:ln>
               <a:extLst>
                 <a:ext uri="{91240B29-F687-4f45-9708-019B960494DF}">
-                  <a14:hiddenLine xmlns="" xmlns:a14="http://schemas.microsoft.com/office/drawing/2010/main" w="9525">
+                  <a14:hiddenLine xmlns:a14="http://schemas.microsoft.com/office/drawing/2010/main" xmlns="" w="9525">
                     <a:solidFill>
                       <a:srgbClr val="000000"/>
                     </a:solidFill>
@@ -11676,7 +11684,7 @@
               </a:ln>
               <a:extLst>
                 <a:ext uri="{91240B29-F687-4f45-9708-019B960494DF}">
-                  <a14:hiddenLine xmlns="" xmlns:a14="http://schemas.microsoft.com/office/drawing/2010/main" w="9525">
+                  <a14:hiddenLine xmlns:a14="http://schemas.microsoft.com/office/drawing/2010/main" xmlns="" w="9525">
                     <a:solidFill>
                       <a:srgbClr val="000000"/>
                     </a:solidFill>
@@ -11766,7 +11774,7 @@
               </a:ln>
               <a:extLst>
                 <a:ext uri="{91240B29-F687-4f45-9708-019B960494DF}">
-                  <a14:hiddenLine xmlns="" xmlns:a14="http://schemas.microsoft.com/office/drawing/2010/main" w="9525">
+                  <a14:hiddenLine xmlns:a14="http://schemas.microsoft.com/office/drawing/2010/main" xmlns="" w="9525">
                     <a:solidFill>
                       <a:srgbClr val="000000"/>
                     </a:solidFill>
@@ -11800,7 +11808,7 @@
               </a:ln>
               <a:extLst>
                 <a:ext uri="{91240B29-F687-4f45-9708-019B960494DF}">
-                  <a14:hiddenLine xmlns="" xmlns:a14="http://schemas.microsoft.com/office/drawing/2010/main" w="9525">
+                  <a14:hiddenLine xmlns:a14="http://schemas.microsoft.com/office/drawing/2010/main" xmlns="" w="9525">
                     <a:solidFill>
                       <a:srgbClr val="000000"/>
                     </a:solidFill>
@@ -11941,7 +11949,7 @@
             <a:fld id="{48A87A34-81AB-432B-8DAE-1953F412C126}" type="datetimeFigureOut">
               <a:rPr lang="en-US" dirty="0"/>
               <a:pPr/>
-              <a:t>5/26/2020</a:t>
+              <a:t>6/14/2020</a:t>
             </a:fld>
             <a:endParaRPr lang="en-US" dirty="0"/>
           </a:p>
@@ -12367,7 +12375,12 @@
             <p:ph type="ctrTitle"/>
           </p:nvPr>
         </p:nvSpPr>
-        <p:spPr/>
+        <p:spPr>
+          <a:xfrm>
+            <a:off x="1876424" y="2455816"/>
+            <a:ext cx="8482422" cy="858203"/>
+          </a:xfrm>
+        </p:spPr>
         <p:txBody>
           <a:bodyPr/>
           <a:lstStyle/>
@@ -12405,7 +12418,15 @@
           <a:p>
             <a:r>
               <a:rPr lang="es-MX" dirty="0" smtClean="0"/>
-              <a:t>Grupo 7: </a:t>
+              <a:t>Grupo </a:t>
+            </a:r>
+            <a:r>
+              <a:rPr lang="es-MX" dirty="0"/>
+              <a:t>6</a:t>
+            </a:r>
+            <a:r>
+              <a:rPr lang="es-MX" dirty="0" smtClean="0"/>
+              <a:t>: </a:t>
             </a:r>
             <a:r>
               <a:rPr lang="es-MX" dirty="0" err="1" smtClean="0"/>
@@ -12479,102 +12500,317 @@
         </p:nvSpPr>
         <p:spPr>
           <a:xfrm>
-            <a:off x="1285105" y="239695"/>
-            <a:ext cx="4083730" cy="700831"/>
+            <a:off x="3771107" y="122130"/>
+            <a:ext cx="4972004" cy="700831"/>
           </a:xfrm>
         </p:spPr>
         <p:txBody>
-          <a:bodyPr/>
+          <a:bodyPr>
+            <a:normAutofit/>
+          </a:bodyPr>
           <a:lstStyle/>
           <a:p>
             <a:r>
               <a:rPr lang="es-MX" dirty="0" smtClean="0"/>
-              <a:t>Limpieza de datos</a:t>
+              <a:t>Análisis de los datos</a:t>
             </a:r>
             <a:endParaRPr lang="es-MX" dirty="0"/>
           </a:p>
         </p:txBody>
       </p:sp>
+      <p:pic>
+        <p:nvPicPr>
+          <p:cNvPr id="3" name="Imagen 2"/>
+          <p:cNvPicPr>
+            <a:picLocks noChangeAspect="1"/>
+          </p:cNvPicPr>
+          <p:nvPr/>
+        </p:nvPicPr>
+        <p:blipFill>
+          <a:blip r:embed="rId2"/>
+          <a:stretch>
+            <a:fillRect/>
+          </a:stretch>
+        </p:blipFill>
+        <p:spPr>
+          <a:xfrm>
+            <a:off x="910803" y="1913428"/>
+            <a:ext cx="10957326" cy="3486422"/>
+          </a:xfrm>
+          <a:prstGeom prst="rect">
+            <a:avLst/>
+          </a:prstGeom>
+        </p:spPr>
+      </p:pic>
       <p:sp>
         <p:nvSpPr>
-          <p:cNvPr id="4" name="CuadroTexto 5"/>
-          <p:cNvSpPr>
-            <a:extLst>
-              <a:ext uri="smNativeData">
-                <pr:smNativeData xmlns="" xmlns:p14="http://schemas.microsoft.com/office/powerpoint/2010/main" xmlns:pr="smNativeData" val="SMDATA_13_SgSuXhMAAAAlAAAAZAAAAE0AAAAAkAAAAEgAAACQAAAASAAAAAAAAAAAAAAAAAAAAAEAAABQAAAAAAAAAAAA4D8AAAAAAADgPwAAAAAAAOA/AAAAAAAA4D8AAAAAAADgPwAAAAAAAOA/AAAAAAAA4D8AAAAAAADgPwAAAAAAAOA/AAAAAAAA4D8CAAAAjAAAAAAAAAAAAAAAprcnDP///wgAAAAAAAAAAAAAAAAAAAAAAAAAAAAAAAAAAAAAZAAAAAEAAABAAAAAAAAAAAAAAAAAAAAAAAAAAAAAAAAAAAAAAAAAAAAAAAAAAAAAAAAAAAAAAAAAAAAAAAAAAAAAAAAAAAAAAAAAAAAAAAAAAAAAAAAAAAAAAAAAAAAAFAAAADwAAAAAAAAAAAAAAAAAAAAPAAAAAQAAACMAAAAjAAAAIwAAAB4AAAAAAAAAZAAAAGQAAAAAAAAAZAAAAGQAAAAVAAAAYAAAAAAAAAAAAAAADwAAACADAAAAAAAAAAAAAAEAAACgMgAAVgcAAKr4//8BAAAAf39/AAEAAABkAAAAAAAAABQAAABAHwAAAAAAACYAAAAAAAAAwOD//wAAAAAmAAAAZAAAABYAAABMAAAAAAAAAAAAAAAEAAAAAAAAAAEAAADd3d0KAAAAACgAAAAoAAAAZAAAAGQAAAAAAAAAzMzMAAAAAABQAAAAUAAAAGQAAABkAAAAAAAAABcAAAAUAAAAAAAAAAAAAAD/fwAA/38AAAAAAAAJAAAABAAAAAYAAAAMAAAAEAAAAAAAAAAAAAAAAAAAAAAAAAAeAAAAaAAAAAAAAAAAAAAAAAAAAAAAAAAAAAAAECcAABAnAAAAAAAAAAAAAAAAAAAAAAAAAAAAAAAAAAAAAAAAAAAAABQAAAAAAAAAwMD/AAAAAABkAAAAMgAAAAAAAABkAAAAAAAAAH9/fwAKAAAAHwAAAFQAAACmtycF////AQAAAAAAAAAAAAAAAAAAAAAAAAAAAAAAAAAAAAAAAAAAAAAAAH9/fwDd3d0DzMzMAMDA/wB/f38AAAAAAAAAAAAAAAAAAAAAAAAAAAAhAAAAGAAAABQAAADnBAAAXAkAAHQkAABsKQAAACAAACYAAAAIAAAA//////////8="/>
-              </a:ext>
-            </a:extLst>
-          </p:cNvSpPr>
+          <p:cNvPr id="6" name="CuadroTexto 5"/>
+          <p:cNvSpPr txBox="1"/>
           <p:nvPr/>
         </p:nvSpPr>
         <p:spPr>
           <a:xfrm>
-            <a:off x="1005930" y="940526"/>
-            <a:ext cx="10306504" cy="5499463"/>
+            <a:off x="1306285" y="1045029"/>
+            <a:ext cx="10039467" cy="646331"/>
           </a:xfrm>
           <a:prstGeom prst="rect">
             <a:avLst/>
           </a:prstGeom>
           <a:noFill/>
-          <a:ln>
-            <a:noFill/>
-          </a:ln>
-          <a:effectLst/>
         </p:spPr>
         <p:txBody>
-          <a:bodyPr vert="horz" wrap="square" lIns="91440" tIns="45720" rIns="91440" bIns="45720" numCol="1" spcCol="215900" anchor="t"/>
+          <a:bodyPr wrap="square" rtlCol="0">
+            <a:spAutoFit/>
+          </a:bodyPr>
           <a:lstStyle/>
           <a:p>
-            <a:pPr>
-              <a:lnSpc>
-                <a:spcPct val="200000"/>
-              </a:lnSpc>
-              <a:defRPr lang="es-es" sz="2100"/>
-            </a:pPr>
-            <a:r>
-              <a:rPr dirty="0"/>
-              <a:t>En el proceso de limpieza se realizo</a:t>
-            </a:r>
-            <a:r>
-              <a:rPr dirty="0" smtClean="0"/>
-              <a:t>:</a:t>
-            </a:r>
-            <a:endParaRPr dirty="0"/>
-          </a:p>
-          <a:p>
-            <a:pPr marL="342900" indent="-342900">
-              <a:lnSpc>
-                <a:spcPct val="200000"/>
-              </a:lnSpc>
-              <a:buFont typeface="Arial" panose="020B0604020202020204" pitchFamily="34" charset="0"/>
-              <a:buChar char="•"/>
-              <a:defRPr lang="es-es" sz="2100"/>
-            </a:pPr>
-            <a:r>
-              <a:rPr u="sng" dirty="0" smtClean="0"/>
-              <a:t>En </a:t>
-            </a:r>
-            <a:r>
-              <a:rPr u="sng" dirty="0"/>
-              <a:t>cuanto a </a:t>
-            </a:r>
-            <a:r>
-              <a:rPr u="sng" dirty="0" smtClean="0"/>
-              <a:t>duplicados:</a:t>
-            </a:r>
-          </a:p>
-          <a:p>
-            <a:pPr>
-              <a:lnSpc>
-                <a:spcPct val="200000"/>
-              </a:lnSpc>
-              <a:defRPr lang="es-es" sz="2100"/>
-            </a:pPr>
-            <a:r>
-              <a:rPr lang="es-ES" dirty="0" smtClean="0"/>
-              <a:t>Encontramos información que es duplicada que puede ser obtenida haciendo cálculos sobre las columnas, por ejemplo para el caso de los montos de recargas y los packs el desglose a nivel semanal al sumarlo nos daba la columna de su acumulado mensual, por lo que decidimos quitar estas columnas para no repetir datos.</a:t>
-            </a:r>
-            <a:endParaRPr dirty="0"/>
+            <a:r>
+              <a:rPr lang="es-MX" dirty="0" smtClean="0"/>
+              <a:t>NETWORK_TECH: para esta categoría vemos que son muchos mas las cantidades de líneas que utilizan la tecnología LTE casi con un 70% del total de las líneas analizadas en esta caso. </a:t>
+            </a:r>
+            <a:endParaRPr lang="es-MX" dirty="0"/>
+          </a:p>
+        </p:txBody>
+      </p:sp>
+    </p:spTree>
+    <p:extLst>
+      <p:ext uri="{BB962C8B-B14F-4D97-AF65-F5344CB8AC3E}">
+        <p14:creationId xmlns:p14="http://schemas.microsoft.com/office/powerpoint/2010/main" val="1949714399"/>
+      </p:ext>
+    </p:extLst>
+  </p:cSld>
+  <p:clrMapOvr>
+    <a:masterClrMapping/>
+  </p:clrMapOvr>
+</p:sld>
+</file>
+
+<file path=ppt/slides/slide11.xml><?xml version="1.0" encoding="utf-8"?>
+<p:sld xmlns:a="http://schemas.openxmlformats.org/drawingml/2006/main" xmlns:r="http://schemas.openxmlformats.org/officeDocument/2006/relationships" xmlns:p="http://schemas.openxmlformats.org/presentationml/2006/main">
+  <p:cSld>
+    <p:spTree>
+      <p:nvGrpSpPr>
+        <p:cNvPr id="1" name=""/>
+        <p:cNvGrpSpPr/>
+        <p:nvPr/>
+      </p:nvGrpSpPr>
+      <p:grpSpPr>
+        <a:xfrm>
+          <a:off x="0" y="0"/>
+          <a:ext cx="0" cy="0"/>
+          <a:chOff x="0" y="0"/>
+          <a:chExt cx="0" cy="0"/>
+        </a:xfrm>
+      </p:grpSpPr>
+      <p:sp>
+        <p:nvSpPr>
+          <p:cNvPr id="2" name="Título 1"/>
+          <p:cNvSpPr>
+            <a:spLocks noGrp="1"/>
+          </p:cNvSpPr>
+          <p:nvPr>
+            <p:ph type="title"/>
+          </p:nvPr>
+        </p:nvSpPr>
+        <p:spPr>
+          <a:xfrm>
+            <a:off x="3771107" y="122130"/>
+            <a:ext cx="4972004" cy="700831"/>
+          </a:xfrm>
+        </p:spPr>
+        <p:txBody>
+          <a:bodyPr>
+            <a:normAutofit/>
+          </a:bodyPr>
+          <a:lstStyle/>
+          <a:p>
+            <a:r>
+              <a:rPr lang="es-MX" dirty="0" smtClean="0"/>
+              <a:t>Análisis de los datos</a:t>
+            </a:r>
+            <a:endParaRPr lang="es-MX" dirty="0"/>
+          </a:p>
+        </p:txBody>
+      </p:sp>
+      <p:sp>
+        <p:nvSpPr>
+          <p:cNvPr id="6" name="CuadroTexto 5"/>
+          <p:cNvSpPr txBox="1"/>
+          <p:nvPr/>
+        </p:nvSpPr>
+        <p:spPr>
+          <a:xfrm>
+            <a:off x="1306285" y="1045029"/>
+            <a:ext cx="10039467" cy="646331"/>
+          </a:xfrm>
+          <a:prstGeom prst="rect">
+            <a:avLst/>
+          </a:prstGeom>
+          <a:noFill/>
+        </p:spPr>
+        <p:txBody>
+          <a:bodyPr wrap="square" rtlCol="0">
+            <a:spAutoFit/>
+          </a:bodyPr>
+          <a:lstStyle/>
+          <a:p>
+            <a:r>
+              <a:rPr lang="es-MX" dirty="0" smtClean="0"/>
+              <a:t>DEVICE MODEL NAME y DEVICE VENDOR NAME: para esta categoría vemos que las mayoría de las líneas tienen un dispositivo marca Samsung con el modelo Galaxy </a:t>
+            </a:r>
+            <a:r>
+              <a:rPr lang="es-MX" dirty="0" err="1" smtClean="0"/>
+              <a:t>grand</a:t>
+            </a:r>
+            <a:r>
+              <a:rPr lang="es-MX" dirty="0" smtClean="0"/>
+              <a:t>. </a:t>
+            </a:r>
+            <a:endParaRPr lang="es-MX" dirty="0"/>
+          </a:p>
+        </p:txBody>
+      </p:sp>
+      <p:pic>
+        <p:nvPicPr>
+          <p:cNvPr id="4" name="Imagen 3"/>
+          <p:cNvPicPr>
+            <a:picLocks noChangeAspect="1"/>
+          </p:cNvPicPr>
+          <p:nvPr/>
+        </p:nvPicPr>
+        <p:blipFill>
+          <a:blip r:embed="rId2"/>
+          <a:stretch>
+            <a:fillRect/>
+          </a:stretch>
+        </p:blipFill>
+        <p:spPr>
+          <a:xfrm>
+            <a:off x="1306285" y="1913428"/>
+            <a:ext cx="5052902" cy="4435121"/>
+          </a:xfrm>
+          <a:prstGeom prst="rect">
+            <a:avLst/>
+          </a:prstGeom>
+        </p:spPr>
+      </p:pic>
+      <p:pic>
+        <p:nvPicPr>
+          <p:cNvPr id="5" name="Imagen 4"/>
+          <p:cNvPicPr>
+            <a:picLocks noChangeAspect="1"/>
+          </p:cNvPicPr>
+          <p:nvPr/>
+        </p:nvPicPr>
+        <p:blipFill>
+          <a:blip r:embed="rId3">
+            <a:extLst>
+              <a:ext uri="{28A0092B-C50C-407E-A947-70E740481C1C}">
+                <a14:useLocalDpi xmlns:a14="http://schemas.microsoft.com/office/drawing/2010/main" val="0"/>
+              </a:ext>
+            </a:extLst>
+          </a:blip>
+          <a:stretch>
+            <a:fillRect/>
+          </a:stretch>
+        </p:blipFill>
+        <p:spPr>
+          <a:xfrm>
+            <a:off x="6855530" y="1913428"/>
+            <a:ext cx="4193176" cy="4735202"/>
+          </a:xfrm>
+          <a:prstGeom prst="rect">
+            <a:avLst/>
+          </a:prstGeom>
+        </p:spPr>
+      </p:pic>
+    </p:spTree>
+    <p:extLst>
+      <p:ext uri="{BB962C8B-B14F-4D97-AF65-F5344CB8AC3E}">
+        <p14:creationId xmlns:p14="http://schemas.microsoft.com/office/powerpoint/2010/main" val="3417917796"/>
+      </p:ext>
+    </p:extLst>
+  </p:cSld>
+  <p:clrMapOvr>
+    <a:masterClrMapping/>
+  </p:clrMapOvr>
+</p:sld>
+</file>
+
+<file path=ppt/slides/slide12.xml><?xml version="1.0" encoding="utf-8"?>
+<p:sld xmlns:a="http://schemas.openxmlformats.org/drawingml/2006/main" xmlns:r="http://schemas.openxmlformats.org/officeDocument/2006/relationships" xmlns:p="http://schemas.openxmlformats.org/presentationml/2006/main">
+  <p:cSld>
+    <p:spTree>
+      <p:nvGrpSpPr>
+        <p:cNvPr id="1" name=""/>
+        <p:cNvGrpSpPr/>
+        <p:nvPr/>
+      </p:nvGrpSpPr>
+      <p:grpSpPr>
+        <a:xfrm>
+          <a:off x="0" y="0"/>
+          <a:ext cx="0" cy="0"/>
+          <a:chOff x="0" y="0"/>
+          <a:chExt cx="0" cy="0"/>
+        </a:xfrm>
+      </p:grpSpPr>
+      <p:sp>
+        <p:nvSpPr>
+          <p:cNvPr id="2" name="Título 1"/>
+          <p:cNvSpPr>
+            <a:spLocks noGrp="1"/>
+          </p:cNvSpPr>
+          <p:nvPr>
+            <p:ph type="title"/>
+          </p:nvPr>
+        </p:nvSpPr>
+        <p:spPr>
+          <a:xfrm>
+            <a:off x="3771107" y="122130"/>
+            <a:ext cx="4972004" cy="700831"/>
+          </a:xfrm>
+        </p:spPr>
+        <p:txBody>
+          <a:bodyPr>
+            <a:normAutofit/>
+          </a:bodyPr>
+          <a:lstStyle/>
+          <a:p>
+            <a:r>
+              <a:rPr lang="es-MX" dirty="0" smtClean="0"/>
+              <a:t>Análisis de los datos</a:t>
+            </a:r>
+            <a:endParaRPr lang="es-MX" dirty="0"/>
+          </a:p>
+        </p:txBody>
+      </p:sp>
+      <p:sp>
+        <p:nvSpPr>
+          <p:cNvPr id="6" name="CuadroTexto 5"/>
+          <p:cNvSpPr txBox="1"/>
+          <p:nvPr/>
+        </p:nvSpPr>
+        <p:spPr>
+          <a:xfrm>
+            <a:off x="1132794" y="923627"/>
+            <a:ext cx="4702628" cy="1200329"/>
+          </a:xfrm>
+          <a:prstGeom prst="rect">
+            <a:avLst/>
+          </a:prstGeom>
+          <a:noFill/>
+        </p:spPr>
+        <p:txBody>
+          <a:bodyPr wrap="square" rtlCol="0">
+            <a:spAutoFit/>
+          </a:bodyPr>
+          <a:lstStyle/>
+          <a:p>
+            <a:r>
+              <a:rPr lang="es-MX" dirty="0" smtClean="0"/>
+              <a:t>Trafico de datos: para el trafico de datos analizamos la correlación que tienen agrupados por tipo a través de las semanas en la que tuvimos los datos para analizarlos. </a:t>
+            </a:r>
+            <a:endParaRPr lang="es-MX" dirty="0"/>
           </a:p>
         </p:txBody>
       </p:sp>
@@ -12600,8 +12836,8 @@
         </p:blipFill>
         <p:spPr>
           <a:xfrm>
-            <a:off x="7797573" y="590110"/>
-            <a:ext cx="2867025" cy="1600200"/>
+            <a:off x="5835422" y="822961"/>
+            <a:ext cx="5510330" cy="5812970"/>
           </a:xfrm>
           <a:prstGeom prst="rect">
             <a:avLst/>
@@ -12611,7 +12847,1715 @@
     </p:spTree>
     <p:extLst>
       <p:ext uri="{BB962C8B-B14F-4D97-AF65-F5344CB8AC3E}">
-        <p14:creationId xmlns:p14="http://schemas.microsoft.com/office/powerpoint/2010/main" val="578151812"/>
+        <p14:creationId xmlns:p14="http://schemas.microsoft.com/office/powerpoint/2010/main" val="2920431495"/>
+      </p:ext>
+    </p:extLst>
+  </p:cSld>
+  <p:clrMapOvr>
+    <a:masterClrMapping/>
+  </p:clrMapOvr>
+</p:sld>
+</file>
+
+<file path=ppt/slides/slide13.xml><?xml version="1.0" encoding="utf-8"?>
+<p:sld xmlns:a="http://schemas.openxmlformats.org/drawingml/2006/main" xmlns:r="http://schemas.openxmlformats.org/officeDocument/2006/relationships" xmlns:p="http://schemas.openxmlformats.org/presentationml/2006/main">
+  <p:cSld>
+    <p:spTree>
+      <p:nvGrpSpPr>
+        <p:cNvPr id="1" name=""/>
+        <p:cNvGrpSpPr/>
+        <p:nvPr/>
+      </p:nvGrpSpPr>
+      <p:grpSpPr>
+        <a:xfrm>
+          <a:off x="0" y="0"/>
+          <a:ext cx="0" cy="0"/>
+          <a:chOff x="0" y="0"/>
+          <a:chExt cx="0" cy="0"/>
+        </a:xfrm>
+      </p:grpSpPr>
+      <p:sp>
+        <p:nvSpPr>
+          <p:cNvPr id="2" name="Título 1"/>
+          <p:cNvSpPr>
+            <a:spLocks noGrp="1"/>
+          </p:cNvSpPr>
+          <p:nvPr>
+            <p:ph type="title"/>
+          </p:nvPr>
+        </p:nvSpPr>
+        <p:spPr>
+          <a:xfrm>
+            <a:off x="3771107" y="122130"/>
+            <a:ext cx="4972004" cy="700831"/>
+          </a:xfrm>
+        </p:spPr>
+        <p:txBody>
+          <a:bodyPr>
+            <a:normAutofit/>
+          </a:bodyPr>
+          <a:lstStyle/>
+          <a:p>
+            <a:r>
+              <a:rPr lang="es-MX" dirty="0" smtClean="0"/>
+              <a:t>Análisis de los datos</a:t>
+            </a:r>
+            <a:endParaRPr lang="es-MX" dirty="0"/>
+          </a:p>
+        </p:txBody>
+      </p:sp>
+      <p:sp>
+        <p:nvSpPr>
+          <p:cNvPr id="6" name="CuadroTexto 5"/>
+          <p:cNvSpPr txBox="1"/>
+          <p:nvPr/>
+        </p:nvSpPr>
+        <p:spPr>
+          <a:xfrm>
+            <a:off x="1075940" y="914401"/>
+            <a:ext cx="3195613" cy="1754326"/>
+          </a:xfrm>
+          <a:prstGeom prst="rect">
+            <a:avLst/>
+          </a:prstGeom>
+          <a:noFill/>
+        </p:spPr>
+        <p:txBody>
+          <a:bodyPr wrap="square" rtlCol="0">
+            <a:spAutoFit/>
+          </a:bodyPr>
+          <a:lstStyle/>
+          <a:p>
+            <a:r>
+              <a:rPr lang="es-MX" u="sng" dirty="0" smtClean="0"/>
+              <a:t>Llamadas de voz:  </a:t>
+            </a:r>
+            <a:r>
+              <a:rPr lang="es-MX" dirty="0" smtClean="0"/>
+              <a:t>Hay una fuerte correlación entre las llamadas de voz por mes, esto nos llevo a poder agrupar las llamadas en diferentes columnas mensuales.</a:t>
+            </a:r>
+            <a:endParaRPr lang="es-MX" dirty="0"/>
+          </a:p>
+        </p:txBody>
+      </p:sp>
+      <p:pic>
+        <p:nvPicPr>
+          <p:cNvPr id="4" name="Imagen 3"/>
+          <p:cNvPicPr>
+            <a:picLocks noChangeAspect="1"/>
+          </p:cNvPicPr>
+          <p:nvPr/>
+        </p:nvPicPr>
+        <p:blipFill>
+          <a:blip r:embed="rId2">
+            <a:extLst>
+              <a:ext uri="{28A0092B-C50C-407E-A947-70E740481C1C}">
+                <a14:useLocalDpi xmlns:a14="http://schemas.microsoft.com/office/drawing/2010/main" val="0"/>
+              </a:ext>
+            </a:extLst>
+          </a:blip>
+          <a:stretch>
+            <a:fillRect/>
+          </a:stretch>
+        </p:blipFill>
+        <p:spPr>
+          <a:xfrm>
+            <a:off x="4441942" y="822961"/>
+            <a:ext cx="6792116" cy="5814732"/>
+          </a:xfrm>
+          <a:prstGeom prst="rect">
+            <a:avLst/>
+          </a:prstGeom>
+        </p:spPr>
+      </p:pic>
+    </p:spTree>
+    <p:extLst>
+      <p:ext uri="{BB962C8B-B14F-4D97-AF65-F5344CB8AC3E}">
+        <p14:creationId xmlns:p14="http://schemas.microsoft.com/office/powerpoint/2010/main" val="154171763"/>
+      </p:ext>
+    </p:extLst>
+  </p:cSld>
+  <p:clrMapOvr>
+    <a:masterClrMapping/>
+  </p:clrMapOvr>
+</p:sld>
+</file>
+
+<file path=ppt/slides/slide14.xml><?xml version="1.0" encoding="utf-8"?>
+<p:sld xmlns:a="http://schemas.openxmlformats.org/drawingml/2006/main" xmlns:r="http://schemas.openxmlformats.org/officeDocument/2006/relationships" xmlns:p="http://schemas.openxmlformats.org/presentationml/2006/main">
+  <p:cSld>
+    <p:spTree>
+      <p:nvGrpSpPr>
+        <p:cNvPr id="1" name=""/>
+        <p:cNvGrpSpPr/>
+        <p:nvPr/>
+      </p:nvGrpSpPr>
+      <p:grpSpPr>
+        <a:xfrm>
+          <a:off x="0" y="0"/>
+          <a:ext cx="0" cy="0"/>
+          <a:chOff x="0" y="0"/>
+          <a:chExt cx="0" cy="0"/>
+        </a:xfrm>
+      </p:grpSpPr>
+      <p:sp>
+        <p:nvSpPr>
+          <p:cNvPr id="2" name="Título 1"/>
+          <p:cNvSpPr>
+            <a:spLocks noGrp="1"/>
+          </p:cNvSpPr>
+          <p:nvPr>
+            <p:ph type="title"/>
+          </p:nvPr>
+        </p:nvSpPr>
+        <p:spPr>
+          <a:xfrm>
+            <a:off x="3771107" y="122130"/>
+            <a:ext cx="4972004" cy="700831"/>
+          </a:xfrm>
+        </p:spPr>
+        <p:txBody>
+          <a:bodyPr>
+            <a:normAutofit/>
+          </a:bodyPr>
+          <a:lstStyle/>
+          <a:p>
+            <a:r>
+              <a:rPr lang="es-MX" dirty="0" smtClean="0"/>
+              <a:t>Análisis de los datos</a:t>
+            </a:r>
+            <a:endParaRPr lang="es-MX" dirty="0"/>
+          </a:p>
+        </p:txBody>
+      </p:sp>
+      <p:sp>
+        <p:nvSpPr>
+          <p:cNvPr id="6" name="CuadroTexto 5"/>
+          <p:cNvSpPr txBox="1"/>
+          <p:nvPr/>
+        </p:nvSpPr>
+        <p:spPr>
+          <a:xfrm>
+            <a:off x="1075940" y="1133703"/>
+            <a:ext cx="3626689" cy="2031325"/>
+          </a:xfrm>
+          <a:prstGeom prst="rect">
+            <a:avLst/>
+          </a:prstGeom>
+          <a:noFill/>
+        </p:spPr>
+        <p:txBody>
+          <a:bodyPr wrap="square" rtlCol="0">
+            <a:spAutoFit/>
+          </a:bodyPr>
+          <a:lstStyle/>
+          <a:p>
+            <a:r>
+              <a:rPr lang="es-MX" u="sng" dirty="0" smtClean="0"/>
+              <a:t>Días desde la ultima recarga: </a:t>
+            </a:r>
+            <a:r>
+              <a:rPr lang="es-MX" dirty="0" smtClean="0"/>
+              <a:t> Observamos que los días desde la ultima recarga tienen sus valores concentrados entre 0 y 25, estos datos nos sirven además para conocer sobre los clientes en cuanto a su comportamiento.</a:t>
+            </a:r>
+            <a:endParaRPr lang="es-MX" dirty="0"/>
+          </a:p>
+        </p:txBody>
+      </p:sp>
+      <p:pic>
+        <p:nvPicPr>
+          <p:cNvPr id="3" name="Imagen 2"/>
+          <p:cNvPicPr>
+            <a:picLocks noChangeAspect="1"/>
+          </p:cNvPicPr>
+          <p:nvPr/>
+        </p:nvPicPr>
+        <p:blipFill>
+          <a:blip r:embed="rId2">
+            <a:extLst>
+              <a:ext uri="{28A0092B-C50C-407E-A947-70E740481C1C}">
+                <a14:useLocalDpi xmlns:a14="http://schemas.microsoft.com/office/drawing/2010/main" val="0"/>
+              </a:ext>
+            </a:extLst>
+          </a:blip>
+          <a:stretch>
+            <a:fillRect/>
+          </a:stretch>
+        </p:blipFill>
+        <p:spPr>
+          <a:xfrm>
+            <a:off x="5106766" y="1133703"/>
+            <a:ext cx="6205668" cy="5110341"/>
+          </a:xfrm>
+          <a:prstGeom prst="rect">
+            <a:avLst/>
+          </a:prstGeom>
+        </p:spPr>
+      </p:pic>
+    </p:spTree>
+    <p:extLst>
+      <p:ext uri="{BB962C8B-B14F-4D97-AF65-F5344CB8AC3E}">
+        <p14:creationId xmlns:p14="http://schemas.microsoft.com/office/powerpoint/2010/main" val="2348464952"/>
+      </p:ext>
+    </p:extLst>
+  </p:cSld>
+  <p:clrMapOvr>
+    <a:masterClrMapping/>
+  </p:clrMapOvr>
+</p:sld>
+</file>
+
+<file path=ppt/slides/slide15.xml><?xml version="1.0" encoding="utf-8"?>
+<p:sld xmlns:a="http://schemas.openxmlformats.org/drawingml/2006/main" xmlns:r="http://schemas.openxmlformats.org/officeDocument/2006/relationships" xmlns:p="http://schemas.openxmlformats.org/presentationml/2006/main">
+  <p:cSld>
+    <p:spTree>
+      <p:nvGrpSpPr>
+        <p:cNvPr id="1" name=""/>
+        <p:cNvGrpSpPr/>
+        <p:nvPr/>
+      </p:nvGrpSpPr>
+      <p:grpSpPr>
+        <a:xfrm>
+          <a:off x="0" y="0"/>
+          <a:ext cx="0" cy="0"/>
+          <a:chOff x="0" y="0"/>
+          <a:chExt cx="0" cy="0"/>
+        </a:xfrm>
+      </p:grpSpPr>
+      <p:sp>
+        <p:nvSpPr>
+          <p:cNvPr id="2" name="Título 1"/>
+          <p:cNvSpPr>
+            <a:spLocks noGrp="1"/>
+          </p:cNvSpPr>
+          <p:nvPr>
+            <p:ph type="title"/>
+          </p:nvPr>
+        </p:nvSpPr>
+        <p:spPr>
+          <a:xfrm>
+            <a:off x="3610293" y="305009"/>
+            <a:ext cx="4972004" cy="700831"/>
+          </a:xfrm>
+        </p:spPr>
+        <p:txBody>
+          <a:bodyPr>
+            <a:normAutofit fontScale="90000"/>
+          </a:bodyPr>
+          <a:lstStyle/>
+          <a:p>
+            <a:r>
+              <a:rPr lang="es-MX" dirty="0" smtClean="0"/>
+              <a:t>Features para el modelo</a:t>
+            </a:r>
+            <a:endParaRPr lang="es-MX" dirty="0"/>
+          </a:p>
+        </p:txBody>
+      </p:sp>
+      <p:pic>
+        <p:nvPicPr>
+          <p:cNvPr id="4" name="Picture 3"/>
+          <p:cNvPicPr>
+            <a:picLocks noChangeAspect="1"/>
+            <a:extLst>
+              <a:ext uri="smNativeData">
+                <pr:smNativeData xmlns:pr="smNativeData" xmlns:p14="http://schemas.microsoft.com/office/powerpoint/2010/main" xmlns="" val="SMDATA_15_SgSuXhMAAAAlAAAAEQAAAC0AAAAAkAAAAEgAAACQAAAASAAAAAAAAAAAAAAAAAAAAAEAAABQAAAAAAAAAAAA4D8AAAAAAADgPwAAAAAAAOA/AAAAAAAA4D8AAAAAAADgPwAAAAAAAOA/AAAAAAAA4D8AAAAAAADgPwAAAAAAAOA/AAAAAAAA4D8CAAAAjAAAAAAAAAAAAAAAprcnDP///wgAAAAAAAAAAAAAAAAAAAAAAAAAAAAAAAAAAAAAZAAAAAEAAABAAAAAAAAAAAAAAAAAAAAAAAAAAAAAAAAAAAAAAAAAAAAAAAAAAAAAAAAAAAAAAAAAAAAAAAAAAAAAAAAAAAAAAAAAAAAAAAAAAAAAAAAAAAAAAAAAAAAAFAAAADwAAAAAAAAAAAAAAAAAAAkUAAAAAQAAABQAAAAUAAAAFAAAAAEAAAAAAAAAZAAAAGQAAAAAAAAAZAAAAGQAAAAVAAAAYAAAAAAAAAAAAAAADwAAACADAAAAAAAAAAAAAAEAAACgMgAAVgcAAKr4//8BAAAAf39/AAEAAABkAAAAAAAAABQAAABAHwAAAAAAACYAAAAAAAAAwOD//wAAAAAmAAAAZAAAABYAAABMAAAAAAAAAAAAAAAEAAAAAAAAAAEAAADd3d0KAAAAACgAAAAoAAAAZAAAAGQAAAAAAAAAzMzMAAAAAABQAAAAUAAAAGQAAABkAAAAAAAAAAcAAAA4AAAAAAAAAAAAAAAAAAAA////AAAAAAAAAAAAAAAAAAAAAAAAAAAAAAAAAAAAAABkAAAAZAAAAAAAAAAjAAAABAAAAGQAAAAXAAAAFAAAAAAAAAAAAAAA/38AAP9/AAAAAAAACQAAAAQAAAAAAAAADAAAABAAAAAAAAAAAAAAAAAAAAAAAAAAHgAAAGgAAAAAAAAAAAAAAAAAAAAAAAAAAAAAABAnAAAQJwAAAAAAAAAAAAAAAAAAAAAAAAAAAAAAAAAAAAAAAAAAAAAUAAAAAAAAAMDA/wAAAAAAZAAAADIAAAAAAAAAZAAAAAAAAAB/f38ACgAAAB8AAABUAAAAprcnBf///wEAAAAAAAAAAAAAAAAAAAAAAAAAAAAAAAAAAAAAAAAAAAAAAAJ/f38A3d3dA8zMzADAwP8Af39/AAAAAAAAAAAAAAAAAP///wAAAAAAIQAAABgAAAAUAAAArwYAACkLAAAwDwAAQhIAABAAAAAmAAAACAAAAP//////////"/>
+              </a:ext>
+            </a:extLst>
+          </p:cNvPicPr>
+          <p:nvPr/>
+        </p:nvPicPr>
+        <p:blipFill>
+          <a:blip r:embed="rId2"/>
+          <a:stretch>
+            <a:fillRect/>
+          </a:stretch>
+        </p:blipFill>
+        <p:spPr>
+          <a:xfrm>
+            <a:off x="1769654" y="1532572"/>
+            <a:ext cx="1382395" cy="1153795"/>
+          </a:xfrm>
+          <a:prstGeom prst="rect">
+            <a:avLst/>
+          </a:prstGeom>
+          <a:noFill/>
+          <a:ln>
+            <a:noFill/>
+          </a:ln>
+          <a:effectLst/>
+        </p:spPr>
+      </p:pic>
+      <p:pic>
+        <p:nvPicPr>
+          <p:cNvPr id="5" name="Picture 6"/>
+          <p:cNvPicPr>
+            <a:picLocks noChangeAspect="1"/>
+            <a:extLst>
+              <a:ext uri="smNativeData">
+                <pr:smNativeData xmlns:pr="smNativeData" xmlns:p14="http://schemas.microsoft.com/office/powerpoint/2010/main" xmlns="" val="SMDATA_15_SgSuXhMAAAAlAAAAEQAAAC0AAAAAkAAAAEgAAACQAAAASAAAAAAAAAAAAAAAAAAAAAEAAABQAAAAAAAAAAAA4D8AAAAAAADgPwAAAAAAAOA/AAAAAAAA4D8AAAAAAADgPwAAAAAAAOA/AAAAAAAA4D8AAAAAAADgPwAAAAAAAOA/AAAAAAAA4D8CAAAAjAAAAAAAAAAAAAAAprcnDP///wgAAAAAAAAAAAAAAAAAAAAAAAAAAAAAAAAAAAAAZAAAAAEAAABAAAAAAAAAAAAAAAAAAAAAAAAAAAAAAAAAAAAAAAAAAAAAAAAAAAAAAAAAAAAAAAAAAAAAAAAAAAAAAAAAAAAAAAAAAAAAAAAAAAAAAAAAAAAAAAAAAAAAFAAAADwAAAAAAAAAAAAAAAAAAAkUAAAAAQAAABQAAAAUAAAAFAAAAAEAAAAAAAAAZAAAAGQAAAAAAAAAZAAAAGQAAAAVAAAAYAAAAAAAAAAAAAAADwAAACADAAAAAAAAAAAAAAEAAACgMgAAVgcAAKr4//8BAAAAf39/AAEAAABkAAAAAAAAABQAAABAHwAAAAAAACYAAAAAAAAAwOD//wAAAAAmAAAAZAAAABYAAABMAAAAAAAAAAAAAAAEAAAAAAAAAAEAAADd3d0KAAAAACgAAAAoAAAAZAAAAGQAAAAAAAAAzMzMAAAAAABQAAAAUAAAAGQAAABkAAAAAAAAAAcAAAA4AAAAAAAAAAAAAAAAAAAA////AAAAAAAAAAAAAAAAAAAAAAAAAAAAAAAAAAAAAABkAAAAZAAAAAAAAAAjAAAABAAAAGQAAAAXAAAAFAAAAAAAAAAAAAAA/38AAP9/AAAAAAAACQAAAAQAAAD4+Pj/DAAAABAAAAAAAAAAAAAAAAAAAAAAAAAAHgAAAGgAAAAAAAAAAAAAAAAAAAAAAAAAAAAAABAnAAAQJwAAAAAAAAAAAAAAAAAAAAAAAAAAAAAAAAAAAAAAAAAAAAAUAAAAAAAAAMDA/wAAAAAAZAAAADIAAAAAAAAAZAAAAAAAAAB/f38ACgAAAB8AAABUAAAAprcnBf///wEAAAAAAAAAAAAAAAAAAAAAAAAAAAAAAAAAAAAAAAAAAAAAAAJ/f38A3d3dA8zMzADAwP8Af39/AAAAAAAAAAAAAAAAAP///wAAAAAAIQAAABgAAAAUAAAA1RcAAJ4KAABrIAAA3A8AABAAAAAmAAAACAAAAP//////////"/>
+              </a:ext>
+            </a:extLst>
+          </p:cNvPicPr>
+          <p:nvPr/>
+        </p:nvPicPr>
+        <p:blipFill>
+          <a:blip r:embed="rId3"/>
+          <a:stretch>
+            <a:fillRect/>
+          </a:stretch>
+        </p:blipFill>
+        <p:spPr>
+          <a:xfrm>
+            <a:off x="5398430" y="1683385"/>
+            <a:ext cx="1395730" cy="852170"/>
+          </a:xfrm>
+          <a:prstGeom prst="rect">
+            <a:avLst/>
+          </a:prstGeom>
+          <a:noFill/>
+          <a:ln>
+            <a:noFill/>
+          </a:ln>
+          <a:effectLst/>
+        </p:spPr>
+      </p:pic>
+      <p:pic>
+        <p:nvPicPr>
+          <p:cNvPr id="6" name="Picture 4"/>
+          <p:cNvPicPr>
+            <a:picLocks noChangeAspect="1"/>
+            <a:extLst>
+              <a:ext uri="smNativeData">
+                <pr:smNativeData xmlns:pr="smNativeData" xmlns:p14="http://schemas.microsoft.com/office/powerpoint/2010/main" xmlns="" val="SMDATA_15_SgSuXhMAAAAlAAAAEQAAAC0AAAAAkAAAAEgAAACQAAAASAAAAAAAAAAAAAAAAAAAAAEAAABQAAAAAAAAAAAA4D8AAAAAAADgPwAAAAAAAOA/AAAAAAAA4D8AAAAAAADgPwAAAAAAAOA/AAAAAAAA4D8AAAAAAADgPwAAAAAAAOA/AAAAAAAA4D8CAAAAjAAAAAAAAAAAAAAAprcnDP///wgAAAAAAAAAAAAAAAAAAAAAAAAAAAAAAAAAAAAAZAAAAAEAAABAAAAAAAAAAAAAAAAAAAAAAAAAAAAAAAAAAAAAAAAAAAAAAAAAAAAAAAAAAAAAAAAAAAAAAAAAAAAAAAAAAAAAAAAAAAAAAAAAAAAAAAAAAAAAAAAAAAAAFAAAADwAAAAAAAAAAAAAAAAAAAkUAAAAAQAAABQAAAAUAAAAFAAAAAEAAAAAAAAAZAAAAGQAAAAAAAAAZAAAAGQAAAAVAAAAYAAAAAAAAAAAAAAADwAAACADAAAAAAAAAAAAAAEAAACgMgAAVgcAAKr4//8BAAAAf39/AAEAAABkAAAAAAAAABQAAABAHwAAAAAAACYAAAAAAAAAwOD//wAAAAAmAAAAZAAAABYAAABMAAAAAAAAAAAAAAAEAAAAAAAAAAEAAADd3d0KAAAAACgAAAAoAAAAZAAAAGQAAAAAAAAAzMzMAAAAAABQAAAAUAAAAGQAAABkAAAAAAAAAAcAAAA4AAAAAAAAAAAAAAAAAAAA////AAAAAAAAAAAAAAAAAAAAAAAAAAAAAAAAAAAAAABkAAAAZAAAAAAAAAAjAAAABAAAAGQAAAAXAAAAFAAAAAAAAAAAAAAA/38AAP9/AAAAAAAACQAAAAQAAAAAAAAADAAAABAAAAAAAAAAAAAAAAAAAAAAAAAAHgAAAGgAAAAAAAAAAAAAAAAAAAAAAAAAAAAAABAnAAAQJwAAAAAAAAAAAAAAAAAAAAAAAAAAAAAAAAAAAAAAAAAAAAAUAAAAAAAAAMDA/wAAAAAAZAAAADIAAAAAAAAAZAAAAAAAAAB/f38ACgAAAB8AAABUAAAAprcnBf///wEAAAAAAAAAAAAAAAAAAAAAAAAAAAAAAAAAAAAAAAAAAAAAAAJ/f38A3d3dA8zMzADAwP8Af39/AAAAAAAAAAAAAAAAAP///wAAAAAAIQAAABgAAAAUAAAAoykAAJsKAACbMQAAhxIAABAAAAAmAAAACAAAAP//////////"/>
+              </a:ext>
+            </a:extLst>
+          </p:cNvPicPr>
+          <p:nvPr/>
+        </p:nvPicPr>
+        <p:blipFill>
+          <a:blip r:embed="rId4"/>
+          <a:stretch>
+            <a:fillRect/>
+          </a:stretch>
+        </p:blipFill>
+        <p:spPr>
+          <a:xfrm>
+            <a:off x="9175341" y="1355407"/>
+            <a:ext cx="1295400" cy="1287780"/>
+          </a:xfrm>
+          <a:prstGeom prst="rect">
+            <a:avLst/>
+          </a:prstGeom>
+          <a:noFill/>
+          <a:ln>
+            <a:noFill/>
+          </a:ln>
+          <a:effectLst/>
+        </p:spPr>
+      </p:pic>
+      <p:pic>
+        <p:nvPicPr>
+          <p:cNvPr id="7" name="Picture 5"/>
+          <p:cNvPicPr>
+            <a:picLocks noChangeAspect="1"/>
+            <a:extLst>
+              <a:ext uri="smNativeData">
+                <pr:smNativeData xmlns:pr="smNativeData" xmlns:p14="http://schemas.microsoft.com/office/powerpoint/2010/main" xmlns="" val="SMDATA_15_SgSuXhMAAAAlAAAAEQAAAC0AAAAAkAAAAEgAAACQAAAASAAAAAAAAAAAAAAAAAAAAAEAAABQAAAAAAAAAAAA4D8AAAAAAADgPwAAAAAAAOA/AAAAAAAA4D8AAAAAAADgPwAAAAAAAOA/AAAAAAAA4D8AAAAAAADgPwAAAAAAAOA/AAAAAAAA4D8CAAAAjAAAAAAAAAAAAAAAprcnDP///wgAAAAAAAAAAAAAAAAAAAAAAAAAAAAAAAAAAAAAZAAAAAEAAABAAAAAAAAAAAAAAAAAAAAAAAAAAAAAAAAAAAAAAAAAAAAAAAAAAAAAAAAAAAAAAAAAAAAAAAAAAAAAAAAAAAAAAAAAAAAAAAAAAAAAAAAAAAAAAAAAAAAAFAAAADwAAAAAAAAAAAAAAAAAAAkUAAAAAQAAABQAAAAUAAAAFAAAAAEAAAAAAAAAZAAAAGQAAAAAAAAAZAAAAGQAAAAVAAAAYAAAAAAAAAAAAAAADwAAACADAAAAAAAAAAAAAAEAAACgMgAAVgcAAKr4//8BAAAAf39/AAEAAABkAAAAAAAAABQAAABAHwAAAAAAACYAAAAAAAAAwOD//wAAAAAmAAAAZAAAABYAAABMAAAAAAAAAAAAAAAEAAAAAAAAAAEAAADd3d0KAAAAACgAAAAoAAAAZAAAAGQAAAAAAAAAzMzMAAAAAABQAAAAUAAAAGQAAABkAAAAAAAAAAcAAAA4AAAAAAAAAAAAAAAAAAAA////AAAAAAAAAAAAAAAAAAAAAAAAAAAAAAAAAAAAAABkAAAAZAAAAAAAAAAjAAAABAAAAGQAAAAXAAAAFAAAAAAAAAAAAAAA/38AAP9/AAAAAAAACQAAAAQAAAB09d0FDAAAABAAAAAAAAAAAAAAAAAAAAAAAAAAHgAAAGgAAAAAAAAAAAAAAAAAAAAAAAAAAAAAABAnAAAQJwAAAAAAAAAAAAAAAAAAAAAAAAAAAAAAAAAAAAAAAAAAAAAUAAAAAAAAAMDA/wAAAAAAZAAAADIAAAAAAAAAZAAAAAAAAAB/f38ACgAAAB8AAABUAAAAprcnBf///wEAAAAAAAAAAAAAAAAAAAAAAAAAAAAAAAAAAAAAAAAAAAAAAAJ/f38A3d3dA8zMzADAwP8Af39/AAAAAAAAAAAAAAAAAP///wAAAAAAIQAAABgAAAAUAAAAFAUAAIkYAAAwDwAA8x8AABAAAAAmAAAACAAAAP//////////"/>
+              </a:ext>
+            </a:extLst>
+          </p:cNvPicPr>
+          <p:nvPr/>
+        </p:nvPicPr>
+        <p:blipFill>
+          <a:blip r:embed="rId5"/>
+          <a:stretch>
+            <a:fillRect/>
+          </a:stretch>
+        </p:blipFill>
+        <p:spPr>
+          <a:xfrm>
+            <a:off x="1508669" y="3674926"/>
+            <a:ext cx="1643380" cy="1205230"/>
+          </a:xfrm>
+          <a:prstGeom prst="rect">
+            <a:avLst/>
+          </a:prstGeom>
+          <a:noFill/>
+          <a:ln>
+            <a:noFill/>
+          </a:ln>
+          <a:effectLst/>
+        </p:spPr>
+      </p:pic>
+      <p:pic>
+        <p:nvPicPr>
+          <p:cNvPr id="9" name="Picture 8"/>
+          <p:cNvPicPr>
+            <a:picLocks noChangeAspect="1"/>
+            <a:extLst>
+              <a:ext uri="smNativeData">
+                <pr:smNativeData xmlns:pr="smNativeData" xmlns:p14="http://schemas.microsoft.com/office/powerpoint/2010/main" xmlns="" val="SMDATA_15_SgSuXhMAAAAlAAAAEQAAAC0AAAAAkAAAAEgAAACQAAAASAAAAAAAAAAAAAAAAAAAAAEAAABQAAAAAAAAAAAA4D8AAAAAAADgPwAAAAAAAOA/AAAAAAAA4D8AAAAAAADgPwAAAAAAAOA/AAAAAAAA4D8AAAAAAADgPwAAAAAAAOA/AAAAAAAA4D8CAAAAjAAAAAAAAAAAAAAAprcnDP///wgAAAAAAAAAAAAAAAAAAAAAAAAAAAAAAAAAAAAAZAAAAAEAAABAAAAAAAAAAAAAAAAAAAAAAAAAAAAAAAAAAAAAAAAAAAAAAAAAAAAAAAAAAAAAAAAAAAAAAAAAAAAAAAAAAAAAAAAAAAAAAAAAAAAAAAAAAAAAAAAAAAAAFAAAADwAAAAAAAAAAAAAAAAAAAkUAAAAAQAAABQAAAAUAAAAFAAAAAEAAAAAAAAAZAAAAGQAAAAAAAAAZAAAAGQAAAAVAAAAYAAAAAAAAAAAAAAADwAAACADAAAAAAAAAAAAAAEAAACgMgAAVgcAAKr4//8BAAAAf39/AAEAAABkAAAAAAAAABQAAABAHwAAAAAAACYAAAAAAAAAwOD//wAAAAAmAAAAZAAAABYAAABMAAAAAAAAAAAAAAAEAAAAAAAAAAEAAADd3d0KAAAAACgAAAAoAAAAZAAAAGQAAAAAAAAAzMzMAAAAAABQAAAAUAAAAGQAAABkAAAAAAAAAAcAAAA4AAAAAAAAAAAAAAAAAAAA////AAAAAAAAAAAAAAAAAAAAAAAAAAAAAAAAAAAAAABkAAAAZAAAAAAAAAAjAAAABAAAAGQAAAAXAAAAFAAAAAAAAAAAAAAA/38AAP9/AAAAAAAACQAAAAQAAADy1YH/DAAAABAAAAAAAAAAAAAAAAAAAAAAAAAAHgAAAGgAAAAAAAAAAAAAAAAAAAAAAAAAAAAAABAnAAAQJwAAAAAAAAAAAAAAAAAAAAAAAAAAAAAAAAAAAAAAAAAAAAAUAAAAAAAAAMDA/wAAAAAAZAAAADIAAAAAAAAAZAAAAAAAAAB/f38ACgAAAB8AAABUAAAAprcnBf///wEAAAAAAAAAAAAAAAAAAAAAAAAAAAAAAAAAAAAAAAAAAAAAAAJ/f38A3d3dA8zMzADAwP8Af39/AAAAAAAAAAAAAAAAAP///wAAAAAAIQAAABgAAAAUAAAAhRkAAA4hAADwHgAAzCcAABAAAAAmAAAACAAAAP//////////"/>
+              </a:ext>
+            </a:extLst>
+          </p:cNvPicPr>
+          <p:nvPr/>
+        </p:nvPicPr>
+        <p:blipFill>
+          <a:blip r:embed="rId6"/>
+          <a:stretch>
+            <a:fillRect/>
+          </a:stretch>
+        </p:blipFill>
+        <p:spPr>
+          <a:xfrm>
+            <a:off x="5723321" y="5334182"/>
+            <a:ext cx="880745" cy="1096010"/>
+          </a:xfrm>
+          <a:prstGeom prst="rect">
+            <a:avLst/>
+          </a:prstGeom>
+          <a:noFill/>
+          <a:ln>
+            <a:noFill/>
+          </a:ln>
+          <a:effectLst/>
+        </p:spPr>
+      </p:pic>
+      <p:pic>
+        <p:nvPicPr>
+          <p:cNvPr id="10" name="Picture 2"/>
+          <p:cNvPicPr>
+            <a:picLocks noChangeAspect="1"/>
+            <a:extLst>
+              <a:ext uri="smNativeData">
+                <pr:smNativeData xmlns:pr="smNativeData" xmlns:p14="http://schemas.microsoft.com/office/powerpoint/2010/main" xmlns="" val="SMDATA_15_SgSuXhMAAAAlAAAAEQAAAC0AAAAAkAAAAEgAAACQAAAASAAAAAAAAAAAAAAAAAAAAAEAAABQAAAAAAAAAAAA4D8AAAAAAADgPwAAAAAAAOA/AAAAAAAA4D8AAAAAAADgPwAAAAAAAOA/AAAAAAAA4D8AAAAAAADgPwAAAAAAAOA/AAAAAAAA4D8CAAAAjAAAAAAAAAAAAAAAprcnDP///wgAAAAAAAAAAAAAAAAAAAAAAAAAAAAAAAAAAAAAZAAAAAEAAABAAAAAAAAAAAAAAAAAAAAAAAAAAAAAAAAAAAAAAAAAAAAAAAAAAAAAAAAAAAAAAAAAAAAAAAAAAAAAAAAAAAAAAAAAAAAAAAAAAAAAAAAAAAAAAAAAAAAAFAAAADwAAAAAAAAAAAAAAAAAAAkUAAAAAQAAABQAAAAUAAAAFAAAAAEAAAAAAAAAZAAAAGQAAAAAAAAAZAAAAGQAAAAVAAAAYAAAAAAAAAAAAAAADwAAACADAAAAAAAAAAAAAAEAAACgMgAAVgcAAKr4//8BAAAAf39/AAEAAABkAAAAAAAAABQAAABAHwAAAAAAACYAAAAAAAAAwOD//wAAAAAmAAAAZAAAABYAAABMAAAAAAAAAAAAAAAEAAAAAAAAAAEAAADd3d0KAAAAACgAAAAoAAAAZAAAAGQAAAAAAAAAzMzMAAAAAABQAAAAUAAAAGQAAABkAAAAAAAAAAcAAAA4AAAAAAAAAAAAAAAAAAAA////AAAAAAAAAAAAAAAAAAAAAAAAAAAAAAAAAAAAAABkAAAAZAAAAAAAAAAjAAAABAAAAGQAAAAXAAAAFAAAAAAAAAAAAAAA/38AAP9/AAAAAAAACQAAAAQAAAD/////DAAAABAAAAAAAAAAAAAAAAAAAAAAAAAAHgAAAGgAAAAAAAAAAAAAAAAAAAAAAAAAAAAAABAnAAAQJwAAAAAAAAAAAAAAAAAAAAAAAAAAAAAAAAAAAAAAAAAAAAAUAAAAAAAAAMDA/wAAAAAAZAAAADIAAAAAAAAAZAAAAAAAAAB/f38ACgAAAB8AAABUAAAAprcnBf///wEAAAAAAAAAAAAAAAAAAAAAAAAAAAAAAAAAAAAAAAAAAAAAAAJ/f38A3d3dA8zMzADAwP8Af39/AAAAAAAAAAAAAAAAAP///wAAAAAAIQAAABgAAAAUAAAAjBgAAP8UAAC0HwAAFBwAABAAAAAmAAAACAAAAP//////////"/>
+              </a:ext>
+            </a:extLst>
+          </p:cNvPicPr>
+          <p:nvPr/>
+        </p:nvPicPr>
+        <p:blipFill>
+          <a:blip r:embed="rId7"/>
+          <a:stretch>
+            <a:fillRect/>
+          </a:stretch>
+        </p:blipFill>
+        <p:spPr>
+          <a:xfrm>
+            <a:off x="5514634" y="3359241"/>
+            <a:ext cx="1163320" cy="1151255"/>
+          </a:xfrm>
+          <a:prstGeom prst="rect">
+            <a:avLst/>
+          </a:prstGeom>
+          <a:noFill/>
+          <a:ln>
+            <a:noFill/>
+          </a:ln>
+          <a:effectLst/>
+        </p:spPr>
+      </p:pic>
+      <p:pic>
+        <p:nvPicPr>
+          <p:cNvPr id="11" name="Picture 7"/>
+          <p:cNvPicPr>
+            <a:picLocks noChangeAspect="1"/>
+            <a:extLst>
+              <a:ext uri="smNativeData">
+                <pr:smNativeData xmlns:pr="smNativeData" xmlns:p14="http://schemas.microsoft.com/office/powerpoint/2010/main" xmlns="" val="SMDATA_15_SgSuXhMAAAAlAAAAEQAAAC0AAAAAkAAAAEgAAACQAAAASAAAAAAAAAAAAAAAAAAAAAEAAABQAAAAAAAAAAAA4D8AAAAAAADgPwAAAAAAAOA/AAAAAAAA4D8AAAAAAADgPwAAAAAAAOA/AAAAAAAA4D8AAAAAAADgPwAAAAAAAOA/AAAAAAAA4D8CAAAAjAAAAAAAAAAAAAAAprcnDP///wgAAAAAAAAAAAAAAAAAAAAAAAAAAAAAAAAAAAAAZAAAAAEAAABAAAAAAAAAAAAAAAAAAAAAAAAAAAAAAAAAAAAAAAAAAAAAAAAAAAAAAAAAAAAAAAAAAAAAAAAAAAAAAAAAAAAAAAAAAAAAAAAAAAAAAAAAAAAAAAAAAAAAFAAAADwAAAAAAAAAAAAAAAAAAAkUAAAAAQAAABQAAAAUAAAAFAAAAAEAAAAAAAAAZAAAAGQAAAAAAAAAZAAAAGQAAAAVAAAAYAAAAAAAAAAAAAAADwAAACADAAAAAAAAAAAAAAEAAACgMgAAVgcAAKr4//8BAAAAf39/AAEAAABkAAAAAAAAABQAAABAHwAAAAAAACYAAAAAAAAAwOD//wAAAAAmAAAAZAAAABYAAABMAAAAAAAAAAAAAAAEAAAAAAAAAAEAAADd3d0KAAAAACgAAAAoAAAAZAAAAGQAAAAAAAAAzMzMAAAAAABQAAAAUAAAAGQAAABkAAAAAAAAAAcAAAA4AAAAAAAAAAAAAAAAAAAA////AAAAAAAAAAAAAAAAAAAAAAAAAAAAAAAAAAAAAABkAAAAZAAAAAAAAAAjAAAABAAAAGQAAAAXAAAAFAAAAAAAAAAAAAAA/38AAP9/AAAAAAAACQAAAAQAAAD4ymT/DAAAABAAAAAAAAAAAAAAAAAAAAAAAAAAHgAAAGgAAAAAAAAAAAAAAAAAAAAAAAAAAAAAABAnAAAQJwAAAAAAAAAAAAAAAAAAAAAAAAAAAAAAAAAAAAAAAAAAAAAUAAAAAAAAAMDA/wAAAAAAZAAAADIAAAAAAAAAZAAAAAAAAAB/f38ACgAAAB8AAABUAAAAprcnBf///wEAAAAAAAAAAAAAAAAAAAAAAAAAAAAAAAAAAAAAAAAAAAAAAAJ/f38A3d3dA8zMzADAwP8Af39/AAAAAAAAAAAAAAAAAP///wAAAAAAIQAAABgAAAAUAAAAoykAAFYZAAAsMwAAJh8AABAAAAAmAAAACAAAAP//////////"/>
+              </a:ext>
+            </a:extLst>
+          </p:cNvPicPr>
+          <p:nvPr/>
+        </p:nvPicPr>
+        <p:blipFill>
+          <a:blip r:embed="rId8"/>
+          <a:stretch>
+            <a:fillRect/>
+          </a:stretch>
+        </p:blipFill>
+        <p:spPr>
+          <a:xfrm>
+            <a:off x="9175341" y="3650106"/>
+            <a:ext cx="1550035" cy="944880"/>
+          </a:xfrm>
+          <a:prstGeom prst="rect">
+            <a:avLst/>
+          </a:prstGeom>
+          <a:noFill/>
+          <a:ln>
+            <a:noFill/>
+          </a:ln>
+          <a:effectLst/>
+        </p:spPr>
+      </p:pic>
+      <p:sp>
+        <p:nvSpPr>
+          <p:cNvPr id="12" name="Flecha derecha 11"/>
+          <p:cNvSpPr/>
+          <p:nvPr/>
+        </p:nvSpPr>
+        <p:spPr>
+          <a:xfrm rot="5400000">
+            <a:off x="5943508" y="4797629"/>
+            <a:ext cx="440373" cy="605428"/>
+          </a:xfrm>
+          <a:prstGeom prst="rightArrow">
+            <a:avLst/>
+          </a:prstGeom>
+        </p:spPr>
+        <p:style>
+          <a:lnRef idx="2">
+            <a:schemeClr val="accent1">
+              <a:shade val="50000"/>
+            </a:schemeClr>
+          </a:lnRef>
+          <a:fillRef idx="1">
+            <a:schemeClr val="accent1"/>
+          </a:fillRef>
+          <a:effectRef idx="0">
+            <a:schemeClr val="accent1"/>
+          </a:effectRef>
+          <a:fontRef idx="minor">
+            <a:schemeClr val="lt1"/>
+          </a:fontRef>
+        </p:style>
+        <p:txBody>
+          <a:bodyPr rtlCol="0" anchor="ctr"/>
+          <a:lstStyle/>
+          <a:p>
+            <a:pPr algn="ctr"/>
+            <a:endParaRPr lang="es-MX"/>
+          </a:p>
+        </p:txBody>
+      </p:sp>
+      <p:sp>
+        <p:nvSpPr>
+          <p:cNvPr id="13" name="Flecha derecha 12"/>
+          <p:cNvSpPr/>
+          <p:nvPr/>
+        </p:nvSpPr>
+        <p:spPr>
+          <a:xfrm>
+            <a:off x="3478111" y="3801880"/>
+            <a:ext cx="1575660" cy="605428"/>
+          </a:xfrm>
+          <a:prstGeom prst="rightArrow">
+            <a:avLst/>
+          </a:prstGeom>
+        </p:spPr>
+        <p:style>
+          <a:lnRef idx="2">
+            <a:schemeClr val="accent1">
+              <a:shade val="50000"/>
+            </a:schemeClr>
+          </a:lnRef>
+          <a:fillRef idx="1">
+            <a:schemeClr val="accent1"/>
+          </a:fillRef>
+          <a:effectRef idx="0">
+            <a:schemeClr val="accent1"/>
+          </a:effectRef>
+          <a:fontRef idx="minor">
+            <a:schemeClr val="lt1"/>
+          </a:fontRef>
+        </p:style>
+        <p:txBody>
+          <a:bodyPr rtlCol="0" anchor="ctr"/>
+          <a:lstStyle/>
+          <a:p>
+            <a:pPr algn="ctr"/>
+            <a:endParaRPr lang="es-MX"/>
+          </a:p>
+        </p:txBody>
+      </p:sp>
+      <p:sp>
+        <p:nvSpPr>
+          <p:cNvPr id="14" name="Flecha derecha 13"/>
+          <p:cNvSpPr/>
+          <p:nvPr/>
+        </p:nvSpPr>
+        <p:spPr>
+          <a:xfrm rot="1388439">
+            <a:off x="3478112" y="2569829"/>
+            <a:ext cx="1575660" cy="632817"/>
+          </a:xfrm>
+          <a:prstGeom prst="rightArrow">
+            <a:avLst/>
+          </a:prstGeom>
+        </p:spPr>
+        <p:style>
+          <a:lnRef idx="2">
+            <a:schemeClr val="accent1">
+              <a:shade val="50000"/>
+            </a:schemeClr>
+          </a:lnRef>
+          <a:fillRef idx="1">
+            <a:schemeClr val="accent1"/>
+          </a:fillRef>
+          <a:effectRef idx="0">
+            <a:schemeClr val="accent1"/>
+          </a:effectRef>
+          <a:fontRef idx="minor">
+            <a:schemeClr val="lt1"/>
+          </a:fontRef>
+        </p:style>
+        <p:txBody>
+          <a:bodyPr rtlCol="0" anchor="ctr"/>
+          <a:lstStyle/>
+          <a:p>
+            <a:pPr algn="ctr"/>
+            <a:endParaRPr lang="es-MX"/>
+          </a:p>
+        </p:txBody>
+      </p:sp>
+      <p:sp>
+        <p:nvSpPr>
+          <p:cNvPr id="15" name="Flecha derecha 14"/>
+          <p:cNvSpPr/>
+          <p:nvPr/>
+        </p:nvSpPr>
+        <p:spPr>
+          <a:xfrm rot="5400000">
+            <a:off x="5805848" y="2638482"/>
+            <a:ext cx="440373" cy="605428"/>
+          </a:xfrm>
+          <a:prstGeom prst="rightArrow">
+            <a:avLst/>
+          </a:prstGeom>
+        </p:spPr>
+        <p:style>
+          <a:lnRef idx="2">
+            <a:schemeClr val="accent1">
+              <a:shade val="50000"/>
+            </a:schemeClr>
+          </a:lnRef>
+          <a:fillRef idx="1">
+            <a:schemeClr val="accent1"/>
+          </a:fillRef>
+          <a:effectRef idx="0">
+            <a:schemeClr val="accent1"/>
+          </a:effectRef>
+          <a:fontRef idx="minor">
+            <a:schemeClr val="lt1"/>
+          </a:fontRef>
+        </p:style>
+        <p:txBody>
+          <a:bodyPr rtlCol="0" anchor="ctr"/>
+          <a:lstStyle/>
+          <a:p>
+            <a:pPr algn="ctr"/>
+            <a:endParaRPr lang="es-MX"/>
+          </a:p>
+        </p:txBody>
+      </p:sp>
+      <p:sp>
+        <p:nvSpPr>
+          <p:cNvPr id="16" name="Flecha derecha 15"/>
+          <p:cNvSpPr/>
+          <p:nvPr/>
+        </p:nvSpPr>
+        <p:spPr>
+          <a:xfrm rot="8666935">
+            <a:off x="7255023" y="2569828"/>
+            <a:ext cx="1575660" cy="632817"/>
+          </a:xfrm>
+          <a:prstGeom prst="rightArrow">
+            <a:avLst/>
+          </a:prstGeom>
+        </p:spPr>
+        <p:style>
+          <a:lnRef idx="2">
+            <a:schemeClr val="accent1">
+              <a:shade val="50000"/>
+            </a:schemeClr>
+          </a:lnRef>
+          <a:fillRef idx="1">
+            <a:schemeClr val="accent1"/>
+          </a:fillRef>
+          <a:effectRef idx="0">
+            <a:schemeClr val="accent1"/>
+          </a:effectRef>
+          <a:fontRef idx="minor">
+            <a:schemeClr val="lt1"/>
+          </a:fontRef>
+        </p:style>
+        <p:txBody>
+          <a:bodyPr rtlCol="0" anchor="ctr"/>
+          <a:lstStyle/>
+          <a:p>
+            <a:pPr algn="ctr"/>
+            <a:endParaRPr lang="es-MX"/>
+          </a:p>
+        </p:txBody>
+      </p:sp>
+      <p:sp>
+        <p:nvSpPr>
+          <p:cNvPr id="17" name="Flecha derecha 16"/>
+          <p:cNvSpPr/>
+          <p:nvPr/>
+        </p:nvSpPr>
+        <p:spPr>
+          <a:xfrm rot="10800000">
+            <a:off x="7217907" y="3791674"/>
+            <a:ext cx="1575660" cy="605428"/>
+          </a:xfrm>
+          <a:prstGeom prst="rightArrow">
+            <a:avLst/>
+          </a:prstGeom>
+        </p:spPr>
+        <p:style>
+          <a:lnRef idx="2">
+            <a:schemeClr val="accent1">
+              <a:shade val="50000"/>
+            </a:schemeClr>
+          </a:lnRef>
+          <a:fillRef idx="1">
+            <a:schemeClr val="accent1"/>
+          </a:fillRef>
+          <a:effectRef idx="0">
+            <a:schemeClr val="accent1"/>
+          </a:effectRef>
+          <a:fontRef idx="minor">
+            <a:schemeClr val="lt1"/>
+          </a:fontRef>
+        </p:style>
+        <p:txBody>
+          <a:bodyPr rtlCol="0" anchor="ctr"/>
+          <a:lstStyle/>
+          <a:p>
+            <a:pPr algn="ctr"/>
+            <a:endParaRPr lang="es-MX"/>
+          </a:p>
+        </p:txBody>
+      </p:sp>
+    </p:spTree>
+    <p:extLst>
+      <p:ext uri="{BB962C8B-B14F-4D97-AF65-F5344CB8AC3E}">
+        <p14:creationId xmlns:p14="http://schemas.microsoft.com/office/powerpoint/2010/main" val="3712186722"/>
+      </p:ext>
+    </p:extLst>
+  </p:cSld>
+  <p:clrMapOvr>
+    <a:masterClrMapping/>
+  </p:clrMapOvr>
+  <p:timing>
+    <p:tnLst>
+      <p:par>
+        <p:cTn id="1" dur="indefinite" restart="never" nodeType="tmRoot">
+          <p:childTnLst>
+            <p:seq concurrent="1" nextAc="seek">
+              <p:cTn id="2" dur="indefinite" nodeType="mainSeq">
+                <p:childTnLst>
+                  <p:par>
+                    <p:cTn id="3" fill="hold">
+                      <p:stCondLst>
+                        <p:cond delay="indefinite"/>
+                      </p:stCondLst>
+                      <p:childTnLst>
+                        <p:par>
+                          <p:cTn id="4" fill="hold">
+                            <p:stCondLst>
+                              <p:cond delay="0"/>
+                            </p:stCondLst>
+                            <p:childTnLst>
+                              <p:par>
+                                <p:cTn id="5" presetID="1" presetClass="entr" presetSubtype="0" fill="hold" grpId="0" nodeType="clickEffect">
+                                  <p:stCondLst>
+                                    <p:cond delay="0"/>
+                                  </p:stCondLst>
+                                  <p:childTnLst>
+                                    <p:set>
+                                      <p:cBhvr>
+                                        <p:cTn id="6" dur="1" fill="hold">
+                                          <p:stCondLst>
+                                            <p:cond delay="0"/>
+                                          </p:stCondLst>
+                                        </p:cTn>
+                                        <p:tgtEl>
+                                          <p:spTgt spid="4"/>
+                                        </p:tgtEl>
+                                        <p:attrNameLst>
+                                          <p:attrName>style.visibility</p:attrName>
+                                        </p:attrNameLst>
+                                      </p:cBhvr>
+                                      <p:to>
+                                        <p:strVal val="visible"/>
+                                      </p:to>
+                                    </p:set>
+                                  </p:childTnLst>
+                                </p:cTn>
+                              </p:par>
+                            </p:childTnLst>
+                          </p:cTn>
+                        </p:par>
+                      </p:childTnLst>
+                    </p:cTn>
+                  </p:par>
+                  <p:par>
+                    <p:cTn id="7" fill="hold">
+                      <p:stCondLst>
+                        <p:cond delay="indefinite"/>
+                      </p:stCondLst>
+                      <p:childTnLst>
+                        <p:par>
+                          <p:cTn id="8" fill="hold">
+                            <p:stCondLst>
+                              <p:cond delay="0"/>
+                            </p:stCondLst>
+                            <p:childTnLst>
+                              <p:par>
+                                <p:cTn id="9" presetID="1" presetClass="entr" presetSubtype="0" fill="hold" grpId="0" nodeType="clickEffect">
+                                  <p:stCondLst>
+                                    <p:cond delay="0"/>
+                                  </p:stCondLst>
+                                  <p:childTnLst>
+                                    <p:set>
+                                      <p:cBhvr>
+                                        <p:cTn id="10" dur="1" fill="hold">
+                                          <p:stCondLst>
+                                            <p:cond delay="0"/>
+                                          </p:stCondLst>
+                                        </p:cTn>
+                                        <p:tgtEl>
+                                          <p:spTgt spid="5"/>
+                                        </p:tgtEl>
+                                        <p:attrNameLst>
+                                          <p:attrName>style.visibility</p:attrName>
+                                        </p:attrNameLst>
+                                      </p:cBhvr>
+                                      <p:to>
+                                        <p:strVal val="visible"/>
+                                      </p:to>
+                                    </p:set>
+                                  </p:childTnLst>
+                                </p:cTn>
+                              </p:par>
+                            </p:childTnLst>
+                          </p:cTn>
+                        </p:par>
+                      </p:childTnLst>
+                    </p:cTn>
+                  </p:par>
+                  <p:par>
+                    <p:cTn id="11" fill="hold">
+                      <p:stCondLst>
+                        <p:cond delay="indefinite"/>
+                      </p:stCondLst>
+                      <p:childTnLst>
+                        <p:par>
+                          <p:cTn id="12" fill="hold">
+                            <p:stCondLst>
+                              <p:cond delay="0"/>
+                            </p:stCondLst>
+                            <p:childTnLst>
+                              <p:par>
+                                <p:cTn id="13" presetID="1" presetClass="entr" presetSubtype="0" fill="hold" grpId="0" nodeType="clickEffect">
+                                  <p:stCondLst>
+                                    <p:cond delay="0"/>
+                                  </p:stCondLst>
+                                  <p:childTnLst>
+                                    <p:set>
+                                      <p:cBhvr>
+                                        <p:cTn id="14" dur="1" fill="hold">
+                                          <p:stCondLst>
+                                            <p:cond delay="0"/>
+                                          </p:stCondLst>
+                                        </p:cTn>
+                                        <p:tgtEl>
+                                          <p:spTgt spid="6"/>
+                                        </p:tgtEl>
+                                        <p:attrNameLst>
+                                          <p:attrName>style.visibility</p:attrName>
+                                        </p:attrNameLst>
+                                      </p:cBhvr>
+                                      <p:to>
+                                        <p:strVal val="visible"/>
+                                      </p:to>
+                                    </p:set>
+                                  </p:childTnLst>
+                                </p:cTn>
+                              </p:par>
+                              <p:par>
+                                <p:cTn id="15" presetID="1" presetClass="entr" presetSubtype="0" fill="hold" grpId="0" nodeType="withEffect">
+                                  <p:stCondLst>
+                                    <p:cond delay="0"/>
+                                  </p:stCondLst>
+                                  <p:childTnLst>
+                                    <p:set>
+                                      <p:cBhvr>
+                                        <p:cTn id="16" dur="1" fill="hold">
+                                          <p:stCondLst>
+                                            <p:cond delay="0"/>
+                                          </p:stCondLst>
+                                        </p:cTn>
+                                        <p:tgtEl>
+                                          <p:spTgt spid="7"/>
+                                        </p:tgtEl>
+                                        <p:attrNameLst>
+                                          <p:attrName>style.visibility</p:attrName>
+                                        </p:attrNameLst>
+                                      </p:cBhvr>
+                                      <p:to>
+                                        <p:strVal val="visible"/>
+                                      </p:to>
+                                    </p:set>
+                                  </p:childTnLst>
+                                </p:cTn>
+                              </p:par>
+                              <p:par>
+                                <p:cTn id="17" presetID="1" presetClass="entr" presetSubtype="0" fill="hold" grpId="0" nodeType="withEffect">
+                                  <p:stCondLst>
+                                    <p:cond delay="0"/>
+                                  </p:stCondLst>
+                                  <p:childTnLst>
+                                    <p:set>
+                                      <p:cBhvr>
+                                        <p:cTn id="18" dur="1" fill="hold">
+                                          <p:stCondLst>
+                                            <p:cond delay="0"/>
+                                          </p:stCondLst>
+                                        </p:cTn>
+                                        <p:tgtEl>
+                                          <p:spTgt spid="9"/>
+                                        </p:tgtEl>
+                                        <p:attrNameLst>
+                                          <p:attrName>style.visibility</p:attrName>
+                                        </p:attrNameLst>
+                                      </p:cBhvr>
+                                      <p:to>
+                                        <p:strVal val="visible"/>
+                                      </p:to>
+                                    </p:set>
+                                  </p:childTnLst>
+                                </p:cTn>
+                              </p:par>
+                              <p:par>
+                                <p:cTn id="19" presetID="1" presetClass="entr" presetSubtype="0" fill="hold" grpId="0" nodeType="withEffect">
+                                  <p:stCondLst>
+                                    <p:cond delay="0"/>
+                                  </p:stCondLst>
+                                  <p:childTnLst>
+                                    <p:set>
+                                      <p:cBhvr>
+                                        <p:cTn id="20" dur="1" fill="hold">
+                                          <p:stCondLst>
+                                            <p:cond delay="0"/>
+                                          </p:stCondLst>
+                                        </p:cTn>
+                                        <p:tgtEl>
+                                          <p:spTgt spid="11"/>
+                                        </p:tgtEl>
+                                        <p:attrNameLst>
+                                          <p:attrName>style.visibility</p:attrName>
+                                        </p:attrNameLst>
+                                      </p:cBhvr>
+                                      <p:to>
+                                        <p:strVal val="visible"/>
+                                      </p:to>
+                                    </p:set>
+                                  </p:childTnLst>
+                                </p:cTn>
+                              </p:par>
+                            </p:childTnLst>
+                          </p:cTn>
+                        </p:par>
+                      </p:childTnLst>
+                    </p:cTn>
+                  </p:par>
+                </p:childTnLst>
+              </p:cTn>
+              <p:prevCondLst>
+                <p:cond evt="onPrev" delay="0">
+                  <p:tgtEl>
+                    <p:sldTgt/>
+                  </p:tgtEl>
+                </p:cond>
+              </p:prevCondLst>
+              <p:nextCondLst>
+                <p:cond evt="onNext" delay="0">
+                  <p:tgtEl>
+                    <p:sldTgt/>
+                  </p:tgtEl>
+                </p:cond>
+              </p:nextCondLst>
+            </p:seq>
+          </p:childTnLst>
+        </p:cTn>
+      </p:par>
+    </p:tnLst>
+    <p:bldLst>
+      <p:bldP spid="4" grpId="0" animBg="1" advAuto="0"/>
+      <p:bldP spid="5" grpId="0" animBg="1" advAuto="0"/>
+      <p:bldP spid="6" grpId="0" animBg="1" advAuto="0"/>
+      <p:bldP spid="7" grpId="0" animBg="1" advAuto="0"/>
+      <p:bldP spid="9" grpId="0" animBg="1" advAuto="0"/>
+      <p:bldP spid="11" grpId="0" animBg="1" advAuto="0"/>
+    </p:bldLst>
+  </p:timing>
+</p:sld>
+</file>
+
+<file path=ppt/slides/slide16.xml><?xml version="1.0" encoding="utf-8"?>
+<p:sld xmlns:a="http://schemas.openxmlformats.org/drawingml/2006/main" xmlns:r="http://schemas.openxmlformats.org/officeDocument/2006/relationships" xmlns:p="http://schemas.openxmlformats.org/presentationml/2006/main">
+  <p:cSld>
+    <p:spTree>
+      <p:nvGrpSpPr>
+        <p:cNvPr id="1" name=""/>
+        <p:cNvGrpSpPr/>
+        <p:nvPr/>
+      </p:nvGrpSpPr>
+      <p:grpSpPr>
+        <a:xfrm>
+          <a:off x="0" y="0"/>
+          <a:ext cx="0" cy="0"/>
+          <a:chOff x="0" y="0"/>
+          <a:chExt cx="0" cy="0"/>
+        </a:xfrm>
+      </p:grpSpPr>
+      <p:sp>
+        <p:nvSpPr>
+          <p:cNvPr id="2" name="Título 1"/>
+          <p:cNvSpPr>
+            <a:spLocks noGrp="1"/>
+          </p:cNvSpPr>
+          <p:nvPr>
+            <p:ph type="title"/>
+          </p:nvPr>
+        </p:nvSpPr>
+        <p:spPr>
+          <a:xfrm>
+            <a:off x="3832362" y="148255"/>
+            <a:ext cx="5864632" cy="700831"/>
+          </a:xfrm>
+        </p:spPr>
+        <p:txBody>
+          <a:bodyPr>
+            <a:normAutofit/>
+          </a:bodyPr>
+          <a:lstStyle/>
+          <a:p>
+            <a:r>
+              <a:rPr lang="es-MX" dirty="0" smtClean="0"/>
+              <a:t>Elección del modelo</a:t>
+            </a:r>
+            <a:endParaRPr lang="es-MX" dirty="0"/>
+          </a:p>
+        </p:txBody>
+      </p:sp>
+      <p:sp>
+        <p:nvSpPr>
+          <p:cNvPr id="4" name="CuadroTexto 5"/>
+          <p:cNvSpPr>
+            <a:extLst>
+              <a:ext uri="smNativeData">
+                <pr:smNativeData xmlns:pr="smNativeData" xmlns:p14="http://schemas.microsoft.com/office/powerpoint/2010/main" xmlns="" val="SMDATA_13_SgSuXhMAAAAlAAAAZAAAAE0AAAAAkAAAAEgAAACQAAAASAAAAAAAAAAAAAAAAAAAAAEAAABQAAAAAAAAAAAA4D8AAAAAAADgPwAAAAAAAOA/AAAAAAAA4D8AAAAAAADgPwAAAAAAAOA/AAAAAAAA4D8AAAAAAADgPwAAAAAAAOA/AAAAAAAA4D8CAAAAjAAAAAAAAAAAAAAAprcnDP///wgAAAAAAAAAAAAAAAAAAAAAAAAAAAAAAAAAAAAAZAAAAAEAAABAAAAAAAAAAAAAAAAAAAAAAAAAAAAAAAAAAAAAAAAAAAAAAAAAAAAAAAAAAAAAAAAAAAAAAAAAAAAAAAAAAAAAAAAAAAAAAAAAAAAAAAAAAAAAAAAAAAAAFAAAADwAAAAAAAAAAAAAAAAAAAAPAAAAAQAAACMAAAAjAAAAIwAAAB4AAAAAAAAAZAAAAGQAAAAAAAAAZAAAAGQAAAAVAAAAYAAAAAAAAAAAAAAADwAAACADAAAAAAAAAAAAAAEAAACgMgAAVgcAAKr4//8BAAAAf39/AAEAAABkAAAAAAAAABQAAABAHwAAAAAAACYAAAAAAAAAwOD//wAAAAAmAAAAZAAAABYAAABMAAAAAAAAAAAAAAAEAAAAAAAAAAEAAADd3d0KAAAAACgAAAAoAAAAZAAAAGQAAAAAAAAAzMzMAAAAAABQAAAAUAAAAGQAAABkAAAAAAAAABcAAAAUAAAAAAAAAAAAAAD/fwAA/38AAAAAAAAJAAAABAAAAAYAAAAMAAAAEAAAAAAAAAAAAAAAAAAAAAAAAAAeAAAAaAAAAAAAAAAAAAAAAAAAAAAAAAAAAAAAECcAABAnAAAAAAAAAAAAAAAAAAAAAAAAAAAAAAAAAAAAAAAAAAAAABQAAAAAAAAAwMD/AAAAAABkAAAAMgAAAAAAAABkAAAAAAAAAH9/fwAKAAAAHwAAAFQAAACmtycF////AQAAAAAAAAAAAAAAAAAAAAAAAAAAAAAAAAAAAAAAAAAAAAAAAH9/fwDd3d0DzMzMAMDA/wB/f38AAAAAAAAAAAAAAAAAAAAAAAAAAAAhAAAAGAAAABQAAADnBAAAXAkAAHQkAABsKQAAACAAACYAAAAIAAAA//////////8="/>
+              </a:ext>
+            </a:extLst>
+          </p:cNvSpPr>
+          <p:nvPr/>
+        </p:nvSpPr>
+        <p:spPr>
+          <a:xfrm>
+            <a:off x="1005930" y="940526"/>
+            <a:ext cx="10306504" cy="5499463"/>
+          </a:xfrm>
+          <a:prstGeom prst="rect">
+            <a:avLst/>
+          </a:prstGeom>
+          <a:noFill/>
+          <a:ln>
+            <a:noFill/>
+          </a:ln>
+          <a:effectLst/>
+        </p:spPr>
+        <p:txBody>
+          <a:bodyPr vert="horz" wrap="square" lIns="91440" tIns="45720" rIns="91440" bIns="45720" numCol="1" spcCol="215900" anchor="t"/>
+          <a:lstStyle/>
+          <a:p>
+            <a:pPr marL="342900" indent="-342900">
+              <a:lnSpc>
+                <a:spcPct val="200000"/>
+              </a:lnSpc>
+              <a:buFont typeface="Arial" panose="020B0604020202020204" pitchFamily="34" charset="0"/>
+              <a:buChar char="•"/>
+              <a:defRPr lang="es-es" sz="2100"/>
+            </a:pPr>
+            <a:r>
+              <a:rPr u="sng" dirty="0" smtClean="0"/>
+              <a:t>Se aprobaron 4 modelos de Machine </a:t>
+            </a:r>
+            <a:r>
+              <a:rPr u="sng" dirty="0" err="1" smtClean="0"/>
+              <a:t>Learning</a:t>
+            </a:r>
+            <a:r>
+              <a:rPr u="sng" dirty="0" smtClean="0"/>
+              <a:t> para la </a:t>
+            </a:r>
+            <a:r>
+              <a:rPr u="sng" dirty="0" err="1" smtClean="0"/>
+              <a:t>clasificacion</a:t>
+            </a:r>
+            <a:r>
+              <a:rPr u="sng" dirty="0" smtClean="0"/>
+              <a:t>:</a:t>
+            </a:r>
+          </a:p>
+          <a:p>
+            <a:pPr>
+              <a:lnSpc>
+                <a:spcPct val="200000"/>
+              </a:lnSpc>
+              <a:defRPr lang="es-es" sz="2100"/>
+            </a:pPr>
+            <a:r>
+              <a:rPr lang="es-ES" dirty="0" smtClean="0"/>
+              <a:t>El modelo elegido es  </a:t>
+            </a:r>
+            <a:r>
+              <a:rPr lang="es-ES" dirty="0" err="1" smtClean="0"/>
+              <a:t>xgboost</a:t>
+            </a:r>
+            <a:r>
+              <a:rPr lang="es-ES" dirty="0" smtClean="0"/>
+              <a:t>, y las variables utilizadas son las referidas a los datos de clientes, datos sobre packs, sobre trafico de datos y de recargas.</a:t>
+            </a:r>
+          </a:p>
+          <a:p>
+            <a:pPr>
+              <a:lnSpc>
+                <a:spcPct val="200000"/>
+              </a:lnSpc>
+              <a:defRPr lang="es-es" sz="2100"/>
+            </a:pPr>
+            <a:r>
+              <a:rPr lang="es-ES" dirty="0" smtClean="0"/>
+              <a:t>El modelo muestra diferentes métricas que nos indican cuan preciso es, además de que luego de ser entrenado nos muestra el porcentaje de aciertos y desaciertos con su respectivo error.</a:t>
+            </a:r>
+          </a:p>
+          <a:p>
+            <a:pPr marL="342900" indent="-342900">
+              <a:lnSpc>
+                <a:spcPct val="200000"/>
+              </a:lnSpc>
+              <a:buFont typeface="Arial" panose="020B0604020202020204" pitchFamily="34" charset="0"/>
+              <a:buChar char="•"/>
+              <a:defRPr lang="es-es" sz="2100"/>
+            </a:pPr>
+            <a:r>
+              <a:rPr lang="es-ES" u="sng" dirty="0" smtClean="0"/>
+              <a:t>En cada caso se obtuvieron las métricas:</a:t>
+            </a:r>
+          </a:p>
+          <a:p>
+            <a:pPr>
+              <a:lnSpc>
+                <a:spcPct val="200000"/>
+              </a:lnSpc>
+              <a:defRPr lang="es-es" sz="2100"/>
+            </a:pPr>
+            <a:r>
+              <a:rPr lang="es-ES" dirty="0" smtClean="0"/>
+              <a:t>Matriz de confusión, Curva ROC –AUC, </a:t>
+            </a:r>
+            <a:r>
+              <a:rPr lang="es-ES" dirty="0" err="1" smtClean="0"/>
+              <a:t>Accuracy</a:t>
+            </a:r>
+            <a:r>
+              <a:rPr lang="es-ES" dirty="0" smtClean="0"/>
+              <a:t>, </a:t>
+            </a:r>
+            <a:r>
+              <a:rPr lang="es-ES" dirty="0" err="1" smtClean="0"/>
+              <a:t>Precision</a:t>
+            </a:r>
+            <a:r>
+              <a:rPr lang="es-ES" dirty="0"/>
+              <a:t> </a:t>
+            </a:r>
+            <a:r>
+              <a:rPr lang="es-ES" dirty="0" smtClean="0"/>
+              <a:t>– </a:t>
+            </a:r>
+            <a:r>
+              <a:rPr lang="es-ES" dirty="0" err="1" smtClean="0"/>
+              <a:t>Recall</a:t>
+            </a:r>
+            <a:r>
+              <a:rPr lang="es-ES" dirty="0" smtClean="0"/>
+              <a:t> – F1 Score </a:t>
+            </a:r>
+          </a:p>
+          <a:p>
+            <a:pPr>
+              <a:lnSpc>
+                <a:spcPct val="200000"/>
+              </a:lnSpc>
+              <a:defRPr lang="es-es" sz="2100"/>
+            </a:pPr>
+            <a:endParaRPr lang="es-ES" dirty="0" smtClean="0"/>
+          </a:p>
+          <a:p>
+            <a:pPr>
+              <a:lnSpc>
+                <a:spcPct val="200000"/>
+              </a:lnSpc>
+              <a:defRPr lang="es-es" sz="2100"/>
+            </a:pPr>
+            <a:endParaRPr dirty="0" smtClean="0"/>
+          </a:p>
+        </p:txBody>
+      </p:sp>
+    </p:spTree>
+    <p:extLst>
+      <p:ext uri="{BB962C8B-B14F-4D97-AF65-F5344CB8AC3E}">
+        <p14:creationId xmlns:p14="http://schemas.microsoft.com/office/powerpoint/2010/main" val="158093924"/>
+      </p:ext>
+    </p:extLst>
+  </p:cSld>
+  <p:clrMapOvr>
+    <a:masterClrMapping/>
+  </p:clrMapOvr>
+</p:sld>
+</file>
+
+<file path=ppt/slides/slide17.xml><?xml version="1.0" encoding="utf-8"?>
+<p:sld xmlns:a="http://schemas.openxmlformats.org/drawingml/2006/main" xmlns:r="http://schemas.openxmlformats.org/officeDocument/2006/relationships" xmlns:p="http://schemas.openxmlformats.org/presentationml/2006/main">
+  <p:cSld>
+    <p:spTree>
+      <p:nvGrpSpPr>
+        <p:cNvPr id="1" name=""/>
+        <p:cNvGrpSpPr/>
+        <p:nvPr/>
+      </p:nvGrpSpPr>
+      <p:grpSpPr>
+        <a:xfrm>
+          <a:off x="0" y="0"/>
+          <a:ext cx="0" cy="0"/>
+          <a:chOff x="0" y="0"/>
+          <a:chExt cx="0" cy="0"/>
+        </a:xfrm>
+      </p:grpSpPr>
+      <p:sp>
+        <p:nvSpPr>
+          <p:cNvPr id="2" name="Título 1"/>
+          <p:cNvSpPr>
+            <a:spLocks noGrp="1"/>
+          </p:cNvSpPr>
+          <p:nvPr>
+            <p:ph type="title"/>
+          </p:nvPr>
+        </p:nvSpPr>
+        <p:spPr>
+          <a:xfrm>
+            <a:off x="4154508" y="-46363"/>
+            <a:ext cx="5864632" cy="700831"/>
+          </a:xfrm>
+        </p:spPr>
+        <p:txBody>
+          <a:bodyPr>
+            <a:normAutofit/>
+          </a:bodyPr>
+          <a:lstStyle/>
+          <a:p>
+            <a:r>
+              <a:rPr lang="es-MX" dirty="0" smtClean="0"/>
+              <a:t>Elección del modelo</a:t>
+            </a:r>
+            <a:endParaRPr lang="es-MX" dirty="0"/>
+          </a:p>
+        </p:txBody>
+      </p:sp>
+      <p:sp>
+        <p:nvSpPr>
+          <p:cNvPr id="4" name="CuadroTexto 5"/>
+          <p:cNvSpPr>
+            <a:extLst>
+              <a:ext uri="smNativeData">
+                <pr:smNativeData xmlns:pr="smNativeData" xmlns:p14="http://schemas.microsoft.com/office/powerpoint/2010/main" xmlns="" val="SMDATA_13_SgSuXhMAAAAlAAAAZAAAAE0AAAAAkAAAAEgAAACQAAAASAAAAAAAAAAAAAAAAAAAAAEAAABQAAAAAAAAAAAA4D8AAAAAAADgPwAAAAAAAOA/AAAAAAAA4D8AAAAAAADgPwAAAAAAAOA/AAAAAAAA4D8AAAAAAADgPwAAAAAAAOA/AAAAAAAA4D8CAAAAjAAAAAAAAAAAAAAAprcnDP///wgAAAAAAAAAAAAAAAAAAAAAAAAAAAAAAAAAAAAAZAAAAAEAAABAAAAAAAAAAAAAAAAAAAAAAAAAAAAAAAAAAAAAAAAAAAAAAAAAAAAAAAAAAAAAAAAAAAAAAAAAAAAAAAAAAAAAAAAAAAAAAAAAAAAAAAAAAAAAAAAAAAAAFAAAADwAAAAAAAAAAAAAAAAAAAAPAAAAAQAAACMAAAAjAAAAIwAAAB4AAAAAAAAAZAAAAGQAAAAAAAAAZAAAAGQAAAAVAAAAYAAAAAAAAAAAAAAADwAAACADAAAAAAAAAAAAAAEAAACgMgAAVgcAAKr4//8BAAAAf39/AAEAAABkAAAAAAAAABQAAABAHwAAAAAAACYAAAAAAAAAwOD//wAAAAAmAAAAZAAAABYAAABMAAAAAAAAAAAAAAAEAAAAAAAAAAEAAADd3d0KAAAAACgAAAAoAAAAZAAAAGQAAAAAAAAAzMzMAAAAAABQAAAAUAAAAGQAAABkAAAAAAAAABcAAAAUAAAAAAAAAAAAAAD/fwAA/38AAAAAAAAJAAAABAAAAAYAAAAMAAAAEAAAAAAAAAAAAAAAAAAAAAAAAAAeAAAAaAAAAAAAAAAAAAAAAAAAAAAAAAAAAAAAECcAABAnAAAAAAAAAAAAAAAAAAAAAAAAAAAAAAAAAAAAAAAAAAAAABQAAAAAAAAAwMD/AAAAAABkAAAAMgAAAAAAAABkAAAAAAAAAH9/fwAKAAAAHwAAAFQAAACmtycF////AQAAAAAAAAAAAAAAAAAAAAAAAAAAAAAAAAAAAAAAAAAAAAAAAH9/fwDd3d0DzMzMAMDA/wB/f38AAAAAAAAAAAAAAAAAAAAAAAAAAAAhAAAAGAAAABQAAADnBAAAXAkAAHQkAABsKQAAACAAACYAAAAIAAAA//////////8="/>
+              </a:ext>
+            </a:extLst>
+          </p:cNvSpPr>
+          <p:nvPr/>
+        </p:nvSpPr>
+        <p:spPr>
+          <a:xfrm>
+            <a:off x="1254124" y="242344"/>
+            <a:ext cx="10306504" cy="5499463"/>
+          </a:xfrm>
+          <a:prstGeom prst="rect">
+            <a:avLst/>
+          </a:prstGeom>
+          <a:noFill/>
+          <a:ln>
+            <a:noFill/>
+          </a:ln>
+          <a:effectLst/>
+        </p:spPr>
+        <p:txBody>
+          <a:bodyPr vert="horz" wrap="square" lIns="91440" tIns="45720" rIns="91440" bIns="45720" numCol="1" spcCol="215900" anchor="t"/>
+          <a:lstStyle/>
+          <a:p>
+            <a:pPr marL="342900" indent="-342900">
+              <a:lnSpc>
+                <a:spcPct val="200000"/>
+              </a:lnSpc>
+              <a:buFont typeface="Arial" panose="020B0604020202020204" pitchFamily="34" charset="0"/>
+              <a:buChar char="•"/>
+              <a:defRPr lang="es-es" sz="2100"/>
+            </a:pPr>
+            <a:r>
+              <a:rPr u="sng" dirty="0" err="1" smtClean="0"/>
+              <a:t>Decision</a:t>
+            </a:r>
+            <a:r>
+              <a:rPr u="sng" dirty="0" smtClean="0"/>
+              <a:t> </a:t>
+            </a:r>
+            <a:r>
+              <a:rPr u="sng" dirty="0" err="1" smtClean="0"/>
+              <a:t>XGBoost</a:t>
+            </a:r>
+            <a:r>
+              <a:rPr u="sng" dirty="0" smtClean="0"/>
+              <a:t>:</a:t>
+            </a:r>
+            <a:endParaRPr u="sng" dirty="0" smtClean="0"/>
+          </a:p>
+          <a:p>
+            <a:pPr>
+              <a:lnSpc>
+                <a:spcPct val="200000"/>
+              </a:lnSpc>
+              <a:defRPr lang="es-es" sz="2100"/>
+            </a:pPr>
+            <a:r>
+              <a:rPr lang="es-ES" dirty="0" smtClean="0"/>
+              <a:t>	</a:t>
+            </a:r>
+          </a:p>
+          <a:p>
+            <a:pPr>
+              <a:lnSpc>
+                <a:spcPct val="200000"/>
+              </a:lnSpc>
+              <a:defRPr lang="es-es" sz="2100"/>
+            </a:pPr>
+            <a:endParaRPr dirty="0" smtClean="0"/>
+          </a:p>
+        </p:txBody>
+      </p:sp>
+      <p:sp>
+        <p:nvSpPr>
+          <p:cNvPr id="6" name="CuadroTexto 5"/>
+          <p:cNvSpPr txBox="1"/>
+          <p:nvPr/>
+        </p:nvSpPr>
+        <p:spPr>
+          <a:xfrm>
+            <a:off x="513202" y="2169305"/>
+            <a:ext cx="3839244" cy="369332"/>
+          </a:xfrm>
+          <a:prstGeom prst="rect">
+            <a:avLst/>
+          </a:prstGeom>
+          <a:noFill/>
+        </p:spPr>
+        <p:txBody>
+          <a:bodyPr wrap="square" rtlCol="0">
+            <a:spAutoFit/>
+          </a:bodyPr>
+          <a:lstStyle/>
+          <a:p>
+            <a:r>
+              <a:rPr lang="es-MX" dirty="0" smtClean="0"/>
+              <a:t>Reporte de Clasificación</a:t>
+            </a:r>
+            <a:endParaRPr lang="es-MX" dirty="0"/>
+          </a:p>
+        </p:txBody>
+      </p:sp>
+      <p:sp>
+        <p:nvSpPr>
+          <p:cNvPr id="8" name="CuadroTexto 7"/>
+          <p:cNvSpPr txBox="1"/>
+          <p:nvPr/>
+        </p:nvSpPr>
+        <p:spPr>
+          <a:xfrm>
+            <a:off x="9292676" y="2478390"/>
+            <a:ext cx="2049634" cy="369332"/>
+          </a:xfrm>
+          <a:prstGeom prst="rect">
+            <a:avLst/>
+          </a:prstGeom>
+          <a:noFill/>
+        </p:spPr>
+        <p:txBody>
+          <a:bodyPr wrap="square" rtlCol="0">
+            <a:spAutoFit/>
+          </a:bodyPr>
+          <a:lstStyle/>
+          <a:p>
+            <a:r>
+              <a:rPr lang="es-MX" dirty="0" smtClean="0"/>
+              <a:t>Matriz de confusión</a:t>
+            </a:r>
+            <a:endParaRPr lang="es-MX" dirty="0"/>
+          </a:p>
+        </p:txBody>
+      </p:sp>
+      <p:sp>
+        <p:nvSpPr>
+          <p:cNvPr id="11" name="CuadroTexto 10"/>
+          <p:cNvSpPr txBox="1"/>
+          <p:nvPr/>
+        </p:nvSpPr>
+        <p:spPr>
+          <a:xfrm>
+            <a:off x="1595863" y="4614881"/>
+            <a:ext cx="743445" cy="369332"/>
+          </a:xfrm>
+          <a:prstGeom prst="rect">
+            <a:avLst/>
+          </a:prstGeom>
+          <a:noFill/>
+        </p:spPr>
+        <p:txBody>
+          <a:bodyPr wrap="square" rtlCol="0">
+            <a:spAutoFit/>
+          </a:bodyPr>
+          <a:lstStyle/>
+          <a:p>
+            <a:r>
+              <a:rPr lang="es-MX" dirty="0" smtClean="0"/>
+              <a:t>ROC</a:t>
+            </a:r>
+            <a:endParaRPr lang="es-MX" dirty="0"/>
+          </a:p>
+        </p:txBody>
+      </p:sp>
+      <p:pic>
+        <p:nvPicPr>
+          <p:cNvPr id="12" name="Imagen 11"/>
+          <p:cNvPicPr>
+            <a:picLocks noChangeAspect="1"/>
+          </p:cNvPicPr>
+          <p:nvPr/>
+        </p:nvPicPr>
+        <p:blipFill>
+          <a:blip r:embed="rId2"/>
+          <a:stretch>
+            <a:fillRect/>
+          </a:stretch>
+        </p:blipFill>
+        <p:spPr>
+          <a:xfrm>
+            <a:off x="9292676" y="2921034"/>
+            <a:ext cx="2078291" cy="706619"/>
+          </a:xfrm>
+          <a:prstGeom prst="rect">
+            <a:avLst/>
+          </a:prstGeom>
+        </p:spPr>
+      </p:pic>
+      <p:pic>
+        <p:nvPicPr>
+          <p:cNvPr id="13" name="Imagen 12"/>
+          <p:cNvPicPr>
+            <a:picLocks noChangeAspect="1"/>
+          </p:cNvPicPr>
+          <p:nvPr/>
+        </p:nvPicPr>
+        <p:blipFill>
+          <a:blip r:embed="rId3"/>
+          <a:stretch>
+            <a:fillRect/>
+          </a:stretch>
+        </p:blipFill>
+        <p:spPr>
+          <a:xfrm>
+            <a:off x="3032619" y="1131900"/>
+            <a:ext cx="6041739" cy="2074809"/>
+          </a:xfrm>
+          <a:prstGeom prst="rect">
+            <a:avLst/>
+          </a:prstGeom>
+        </p:spPr>
+      </p:pic>
+      <p:pic>
+        <p:nvPicPr>
+          <p:cNvPr id="14" name="Imagen 13"/>
+          <p:cNvPicPr>
+            <a:picLocks noChangeAspect="1"/>
+          </p:cNvPicPr>
+          <p:nvPr/>
+        </p:nvPicPr>
+        <p:blipFill>
+          <a:blip r:embed="rId4"/>
+          <a:stretch>
+            <a:fillRect/>
+          </a:stretch>
+        </p:blipFill>
+        <p:spPr>
+          <a:xfrm>
+            <a:off x="3032619" y="3439714"/>
+            <a:ext cx="5614992" cy="3334668"/>
+          </a:xfrm>
+          <a:prstGeom prst="rect">
+            <a:avLst/>
+          </a:prstGeom>
+        </p:spPr>
+      </p:pic>
+    </p:spTree>
+    <p:extLst>
+      <p:ext uri="{BB962C8B-B14F-4D97-AF65-F5344CB8AC3E}">
+        <p14:creationId xmlns:p14="http://schemas.microsoft.com/office/powerpoint/2010/main" val="1681186164"/>
+      </p:ext>
+    </p:extLst>
+  </p:cSld>
+  <p:clrMapOvr>
+    <a:masterClrMapping/>
+  </p:clrMapOvr>
+</p:sld>
+</file>
+
+<file path=ppt/slides/slide18.xml><?xml version="1.0" encoding="utf-8"?>
+<p:sld xmlns:a="http://schemas.openxmlformats.org/drawingml/2006/main" xmlns:r="http://schemas.openxmlformats.org/officeDocument/2006/relationships" xmlns:p="http://schemas.openxmlformats.org/presentationml/2006/main">
+  <p:cSld>
+    <p:spTree>
+      <p:nvGrpSpPr>
+        <p:cNvPr id="1" name=""/>
+        <p:cNvGrpSpPr/>
+        <p:nvPr/>
+      </p:nvGrpSpPr>
+      <p:grpSpPr>
+        <a:xfrm>
+          <a:off x="0" y="0"/>
+          <a:ext cx="0" cy="0"/>
+          <a:chOff x="0" y="0"/>
+          <a:chExt cx="0" cy="0"/>
+        </a:xfrm>
+      </p:grpSpPr>
+      <p:sp>
+        <p:nvSpPr>
+          <p:cNvPr id="2" name="Título 1"/>
+          <p:cNvSpPr>
+            <a:spLocks noGrp="1"/>
+          </p:cNvSpPr>
+          <p:nvPr>
+            <p:ph type="title"/>
+          </p:nvPr>
+        </p:nvSpPr>
+        <p:spPr>
+          <a:xfrm>
+            <a:off x="5934535" y="220100"/>
+            <a:ext cx="1083698" cy="700831"/>
+          </a:xfrm>
+        </p:spPr>
+        <p:txBody>
+          <a:bodyPr>
+            <a:normAutofit/>
+          </a:bodyPr>
+          <a:lstStyle/>
+          <a:p>
+            <a:r>
+              <a:rPr lang="es-MX" dirty="0" smtClean="0"/>
+              <a:t>FIN</a:t>
+            </a:r>
+            <a:endParaRPr lang="es-MX" dirty="0"/>
+          </a:p>
+        </p:txBody>
+      </p:sp>
+      <p:sp>
+        <p:nvSpPr>
+          <p:cNvPr id="10" name="Rectangle 3"/>
+          <p:cNvSpPr>
+            <a:extLst>
+              <a:ext uri="smNativeData">
+                <pr:smNativeData xmlns:pr="smNativeData" xmlns:p14="http://schemas.microsoft.com/office/powerpoint/2010/main" xmlns="" val="SMDATA_13_SgSuXhMAAAAlAAAAZAAAAE0AAAAAkAAAAEgAAACQAAAASAAAAAAAAAAAAAAAAAAAAAEAAABQAAAAAAAAAAAA4D8AAAAAAADgPwAAAAAAAOA/AAAAAAAA4D8AAAAAAADgPwAAAAAAAOA/AAAAAAAA4D8AAAAAAADgPwAAAAAAAOA/AAAAAAAA4D8CAAAAjAAAAAAAAAAAAAAAprcnDP///wgAAAAAAAAAAAAAAAAAAAAAAAAAAAAAAAAAAAAAZAAAAAEAAABAAAAAAAAAAAAAAAAAAAAAAAAAAAAAAAAAAAAAAAAAAAAAAAAAAAAAAAAAAAAAAAAAAAAAAAAAAAAAAAAAAAAAAAAAAAAAAAAAAAAAAAAAAAAAAAAAAAAAFAAAADwAAAAAAAAAAAAAAAAAAAAPAAAAAQAAACMAAAAjAAAAIwAAAB4AAAAAAAAAZAAAAGQAAAAAAAAAZAAAAGQAAAAVAAAAYAAAAAAAAAAAAAAADwAAACADAAAAAAAAAAAAAAEAAACgMgAAVgcAAKr4//8BAAAAf39/AAEAAABkAAAAAAAAABQAAABAHwAAAAAAACYAAAAAAAAAwOD//wAAAAAmAAAAZAAAABYAAABMAAAAAAAAAAAAAAAEAAAAAAAAAAEAAADd3d0KAAAAACgAAAAoAAAAZAAAAGQAAAAAAAAAzMzMAAAAAABQAAAAUAAAAGQAAABkAAAAAAAAABcAAAAUAAAAAAAAAAAAAAD/fwAA/38AAAAAAAAJAAAABAAAAPDw8P8MAAAAEAAAAAAAAAAAAAAAAAAAAAAAAAAeAAAAaAAAAAAAAAAAAAAAAAAAAAAAAAAAAAAAECcAABAnAAAAAAAAAAAAAAAAAAAAAAAAAAAAAAAAAAAAAAAAAAAAABQAAAAAAAAAwMD/AAAAAABkAAAAMgAAAAAAAABkAAAAAAAAAH9/fwAKAAAAHwAAAFQAAACmtycF////AQAAAAAAAAAAAAAAAAAAAAAAAAAAAAAAAAAAAAAAAAAAAAAAAH9/fwDd3d0DzMzMAMDA/wB/f38AAAAAAAAAAAAAAAAAAAAAAAAAAAAhAAAAGAAAABQAAAB+BgAAUg0AAMIxAAAAEwAAECAAACYAAAAIAAAA//////////8="/>
+              </a:ext>
+            </a:extLst>
+          </p:cNvSpPr>
+          <p:nvPr/>
+        </p:nvSpPr>
+        <p:spPr>
+          <a:xfrm>
+            <a:off x="2959754" y="1446893"/>
+            <a:ext cx="7033260" cy="923290"/>
+          </a:xfrm>
+          <a:prstGeom prst="rect">
+            <a:avLst/>
+          </a:prstGeom>
+          <a:noFill/>
+          <a:ln>
+            <a:noFill/>
+          </a:ln>
+          <a:effectLst/>
+        </p:spPr>
+        <p:txBody>
+          <a:bodyPr vert="horz" wrap="none" lIns="91440" tIns="45720" rIns="91440" bIns="45720" numCol="1" spcCol="215900" anchor="t"/>
+          <a:lstStyle/>
+          <a:p>
+            <a:pPr algn="ctr">
+              <a:defRPr lang="en-us"/>
+            </a:pPr>
+            <a:r>
+              <a:rPr lang="en-us" sz="5400" b="1" dirty="0">
+                <a:effectLst>
+                  <a:outerShdw dist="63500" dir="3600000" algn="tl" rotWithShape="0">
+                    <a:srgbClr val="000000">
+                      <a:alpha val="40000"/>
+                    </a:srgbClr>
+                  </a:outerShdw>
+                </a:effectLst>
+              </a:rPr>
+              <a:t>MUCHAS GRACIAS !</a:t>
+            </a:r>
+          </a:p>
+        </p:txBody>
+      </p:sp>
+      <p:pic>
+        <p:nvPicPr>
+          <p:cNvPr id="11" name="Picture 2"/>
+          <p:cNvPicPr>
+            <a:picLocks noChangeAspect="1"/>
+            <a:extLst>
+              <a:ext uri="smNativeData">
+                <pr:smNativeData xmlns:pr="smNativeData" xmlns:p14="http://schemas.microsoft.com/office/powerpoint/2010/main" xmlns="" val="SMDATA_15_SgSuXhMAAAAlAAAAEQAAAC0AAAAAkAAAAEgAAACQAAAASAAAAAAAAAAAAAAAAAAAAAEAAABQAAAAAAAAAAAA4D8AAAAAAADgPwAAAAAAAOA/AAAAAAAA4D8AAAAAAADgPwAAAAAAAOA/AAAAAAAA4D8AAAAAAADgPwAAAAAAAOA/AAAAAAAA4D8CAAAAjAAAAAAAAAAAAAAAprcnDP///wgAAAAAAAAAAAAAAAAAAAAAAAAAAAAAAAAAAAAAZAAAAAEAAABAAAAAAAAAAAAAAAAAAAAAAAAAAAAAAAAAAAAAAAAAAAAAAAAAAAAAAAAAAAAAAAAAAAAAAAAAAAAAAAAAAAAAAAAAAAAAAAAAAAAAAAAAAAAAAAAAAAAAFAAAADwAAAAAAAAAAAAAAAAAAAkUAAAAAQAAABQAAAAUAAAAFAAAAAEAAAAAAAAAZAAAAGQAAAAAAAAAZAAAAGQAAAAVAAAAYAAAAAAAAAAAAAAADwAAACADAAAAAAAAAAAAAAEAAACgMgAAVgcAAKr4//8BAAAAf39/AAEAAABkAAAAAAAAABQAAABAHwAAAAAAACYAAAAAAAAAwOD//wAAAAAmAAAAZAAAABYAAABMAAAAAAAAAAAAAAAEAAAAAAAAAAEAAADd3d0KAAAAACgAAAAoAAAAZAAAAGQAAAAAAAAAzMzMAAAAAABQAAAAUAAAAGQAAABkAAAAAAAAAAcAAAA4AAAAAAAAAAAAAAAAAAAA////AAAAAAAAAAAAAAAAAAAAAAAAAAAAAAAAAAAAAABkAAAAZAAAAAAAAAAjAAAABAAAAGQAAAAXAAAAFAAAAAAAAAAAAAAA/38AAP9/AAAAAAAACQAAAAQAAAAAAAAADAAAABAAAAAAAAAAAAAAAAAAAAAAAAAAHgAAAGgAAAAAAAAAAAAAAAAAAAAAAAAAAAAAABAnAAAQJwAAAAAAAAAAAAAAAAAAAAAAAAAAAAAAAAAAAAAAAAAAAAAUAAAAAAAAAMDA/wAAAAAAZAAAADIAAAAAAAAAZAAAAAAAAAB/f38ACgAAAB8AAABUAAAAprcnBf///wEAAAAAAAAAAAAAAAAAAAAAAAAAAAAAAAAAAAAAAAAAAAAAAAJ/f38A3d3dA8zMzADAwP8Af39/AAAAAAAAAAAAAAAAAP///wAAAAAAIQAAABgAAAAUAAAAcA8AAEQVAADQKAAAQCYAABAAAAAmAAAACAAAAP//////////"/>
+              </a:ext>
+            </a:extLst>
+          </p:cNvPicPr>
+          <p:nvPr/>
+        </p:nvPicPr>
+        <p:blipFill>
+          <a:blip r:embed="rId2"/>
+          <a:stretch>
+            <a:fillRect/>
+          </a:stretch>
+        </p:blipFill>
+        <p:spPr>
+          <a:xfrm>
+            <a:off x="4413904" y="2896145"/>
+            <a:ext cx="4124960" cy="2760980"/>
+          </a:xfrm>
+          <a:prstGeom prst="rect">
+            <a:avLst/>
+          </a:prstGeom>
+          <a:noFill/>
+          <a:ln>
+            <a:noFill/>
+          </a:ln>
+          <a:effectLst/>
+        </p:spPr>
+      </p:pic>
+    </p:spTree>
+    <p:extLst>
+      <p:ext uri="{BB962C8B-B14F-4D97-AF65-F5344CB8AC3E}">
+        <p14:creationId xmlns:p14="http://schemas.microsoft.com/office/powerpoint/2010/main" val="2844472451"/>
       </p:ext>
     </p:extLst>
   </p:cSld>
@@ -12648,7 +14592,12 @@
             <p:ph type="title"/>
           </p:nvPr>
         </p:nvSpPr>
-        <p:spPr/>
+        <p:spPr>
+          <a:xfrm>
+            <a:off x="4392341" y="331135"/>
+            <a:ext cx="3378336" cy="700831"/>
+          </a:xfrm>
+        </p:spPr>
         <p:txBody>
           <a:bodyPr/>
           <a:lstStyle/>
@@ -12673,27 +14622,51 @@
         </p:nvSpPr>
         <p:spPr>
           <a:xfrm>
-            <a:off x="1049973" y="2856252"/>
-            <a:ext cx="5899466" cy="1146855"/>
+            <a:off x="867093" y="1735659"/>
+            <a:ext cx="5842543" cy="3345793"/>
           </a:xfrm>
         </p:spPr>
         <p:txBody>
           <a:bodyPr>
-            <a:normAutofit fontScale="92500" lnSpcReduction="20000"/>
+            <a:normAutofit/>
           </a:bodyPr>
           <a:lstStyle/>
           <a:p>
             <a:r>
+              <a:rPr lang="es-es" dirty="0" smtClean="0"/>
+              <a:t>En esta presentaci</a:t>
+            </a:r>
+            <a:r>
+              <a:rPr lang="es-ES" dirty="0" smtClean="0"/>
+              <a:t>ó</a:t>
+            </a:r>
+            <a:r>
+              <a:rPr lang="es-es" dirty="0" smtClean="0"/>
+              <a:t>n analizaremos un caso </a:t>
+            </a:r>
+            <a:r>
               <a:rPr lang="es-es" dirty="0"/>
-              <a:t>Caso de uso de Machine </a:t>
-            </a:r>
-            <a:r>
-              <a:rPr lang="es-es" dirty="0" err="1"/>
+              <a:t>de uso de Machine </a:t>
+            </a:r>
+            <a:r>
+              <a:rPr lang="es-es" dirty="0" err="1" smtClean="0"/>
               <a:t>Learning</a:t>
             </a:r>
             <a:r>
+              <a:rPr lang="es-es" dirty="0" smtClean="0"/>
+              <a:t> implement</a:t>
+            </a:r>
+            <a:r>
+              <a:rPr lang="es-ES" dirty="0" smtClean="0"/>
+              <a:t>á</a:t>
+            </a:r>
+            <a:r>
+              <a:rPr lang="es-es" dirty="0" smtClean="0"/>
+              <a:t>ndolo en </a:t>
+            </a:r>
+            <a:r>
               <a:rPr lang="es-es" dirty="0"/>
-              <a:t> en la implementación de un Modelo de </a:t>
+              <a:t>un Modelo de </a:t>
             </a:r>
             <a:r>
               <a:rPr lang="es-es" dirty="0" err="1"/>
@@ -12736,7 +14709,7 @@
         </p:blipFill>
         <p:spPr>
           <a:xfrm>
-            <a:off x="7424330" y="2562528"/>
+            <a:off x="7245215" y="1735659"/>
             <a:ext cx="3740648" cy="1734301"/>
           </a:xfrm>
           <a:prstGeom prst="rect">
@@ -12784,7 +14757,12 @@
             <p:ph type="title"/>
           </p:nvPr>
         </p:nvSpPr>
-        <p:spPr/>
+        <p:spPr>
+          <a:xfrm>
+            <a:off x="4864032" y="262305"/>
+            <a:ext cx="2699067" cy="1478570"/>
+          </a:xfrm>
+        </p:spPr>
         <p:txBody>
           <a:bodyPr/>
           <a:lstStyle/>
@@ -12809,8 +14787,8 @@
         </p:nvSpPr>
         <p:spPr>
           <a:xfrm>
-            <a:off x="1141413" y="2981007"/>
-            <a:ext cx="9905999" cy="1747747"/>
+            <a:off x="1167539" y="1740875"/>
+            <a:ext cx="5612084" cy="3676695"/>
           </a:xfrm>
         </p:spPr>
         <p:txBody>
@@ -12854,8 +14832,8 @@
         </p:blipFill>
         <p:spPr>
           <a:xfrm>
-            <a:off x="7190014" y="749164"/>
-            <a:ext cx="3429000" cy="1933575"/>
+            <a:off x="7341030" y="1848894"/>
+            <a:ext cx="3902528" cy="2200592"/>
           </a:xfrm>
           <a:prstGeom prst="rect">
             <a:avLst/>
@@ -12904,8 +14882,8 @@
         </p:nvSpPr>
         <p:spPr>
           <a:xfrm>
-            <a:off x="1402669" y="662270"/>
-            <a:ext cx="3169330" cy="1478570"/>
+            <a:off x="5034144" y="350982"/>
+            <a:ext cx="2150428" cy="952120"/>
           </a:xfrm>
         </p:spPr>
         <p:txBody>
@@ -12932,13 +14910,13 @@
         </p:nvSpPr>
         <p:spPr>
           <a:xfrm>
-            <a:off x="1402669" y="2491824"/>
-            <a:ext cx="5507581" cy="1852250"/>
+            <a:off x="775652" y="1303102"/>
+            <a:ext cx="7062062" cy="3804475"/>
           </a:xfrm>
         </p:spPr>
         <p:txBody>
           <a:bodyPr>
-            <a:normAutofit/>
+            <a:normAutofit fontScale="92500"/>
           </a:bodyPr>
           <a:lstStyle/>
           <a:p>
@@ -12948,7 +14926,39 @@
             </a:r>
             <a:r>
               <a:rPr lang="es-es" dirty="0"/>
-              <a:t>que se pretende es saber qué clientes no realizarán una recarga en el período de tiempo definido anteriormente.</a:t>
+              <a:t>que se pretende es saber qué clientes no realizarán una recarga en el período de tiempo definido </a:t>
+            </a:r>
+            <a:r>
+              <a:rPr lang="es-es" dirty="0" smtClean="0"/>
+              <a:t>anteriormente</a:t>
+            </a:r>
+            <a:r>
+              <a:rPr lang="es-es" dirty="0"/>
+              <a:t> </a:t>
+            </a:r>
+            <a:r>
+              <a:rPr lang="es-es" dirty="0" smtClean="0"/>
+              <a:t>para saber cuales son los que tienen mayor porcentaje de dejar de utilizar el servicio de la empresa telef</a:t>
+            </a:r>
+            <a:r>
+              <a:rPr lang="es-ES" dirty="0" smtClean="0"/>
+              <a:t>ó</a:t>
+            </a:r>
+            <a:r>
+              <a:rPr lang="es-es" dirty="0" smtClean="0"/>
+              <a:t>nica. </a:t>
+            </a:r>
+          </a:p>
+          <a:p>
+            <a:pPr marL="0" indent="0">
+              <a:buNone/>
+            </a:pPr>
+            <a:endParaRPr lang="es-es" dirty="0" smtClean="0"/>
+          </a:p>
+          <a:p>
+            <a:r>
+              <a:rPr lang="es-ES" dirty="0" smtClean="0"/>
+              <a:t>Es de utilidad para aplicar diferentes políticas de retención y de marketing para que los clientes permanezcan con la empresa.</a:t>
             </a:r>
             <a:endParaRPr lang="es-ar" dirty="0"/>
           </a:p>
@@ -12979,8 +14989,38 @@
         </p:blipFill>
         <p:spPr>
           <a:xfrm>
-            <a:off x="7485018" y="2262794"/>
+            <a:off x="7837714" y="1303102"/>
             <a:ext cx="3701904" cy="2081280"/>
+          </a:xfrm>
+          <a:prstGeom prst="rect">
+            <a:avLst/>
+          </a:prstGeom>
+        </p:spPr>
+      </p:pic>
+      <p:pic>
+        <p:nvPicPr>
+          <p:cNvPr id="5" name="Imagen 4"/>
+          <p:cNvPicPr>
+            <a:picLocks noChangeAspect="1"/>
+          </p:cNvPicPr>
+          <p:nvPr/>
+        </p:nvPicPr>
+        <p:blipFill>
+          <a:blip r:embed="rId3">
+            <a:extLst>
+              <a:ext uri="{28A0092B-C50C-407E-A947-70E740481C1C}">
+                <a14:useLocalDpi xmlns:a14="http://schemas.microsoft.com/office/drawing/2010/main" val="0"/>
+              </a:ext>
+            </a:extLst>
+          </a:blip>
+          <a:stretch>
+            <a:fillRect/>
+          </a:stretch>
+        </p:blipFill>
+        <p:spPr>
+          <a:xfrm>
+            <a:off x="7825850" y="3889465"/>
+            <a:ext cx="3713768" cy="2079710"/>
           </a:xfrm>
           <a:prstGeom prst="rect">
             <a:avLst/>
@@ -13029,8 +15069,8 @@
         </p:nvSpPr>
         <p:spPr>
           <a:xfrm>
-            <a:off x="1807619" y="484516"/>
-            <a:ext cx="2072050" cy="1478570"/>
+            <a:off x="4981894" y="251528"/>
+            <a:ext cx="1640975" cy="717268"/>
           </a:xfrm>
         </p:spPr>
         <p:txBody>
@@ -13052,7 +15092,7 @@
             <a:picLocks noChangeAspect="1"/>
             <a:extLst>
               <a:ext uri="smNativeData">
-                <pr:smNativeData xmlns="" xmlns:p14="http://schemas.microsoft.com/office/powerpoint/2010/main" xmlns:pr="smNativeData" val="SMDATA_15_SgSuXhMAAAAlAAAAEQAAAC0AAAAAkAAAAEgAAACQAAAASAAAAAAAAAAAAAAAAAAAAAEAAABQAAAAAAAAAAAA4D8AAAAAAADgPwAAAAAAAOA/AAAAAAAA4D8AAAAAAADgPwAAAAAAAOA/AAAAAAAA4D8AAAAAAADgPwAAAAAAAOA/AAAAAAAA4D8CAAAAjAAAAAAAAAAAAAAAprcnDP///wgAAAAAAAAAAAAAAAAAAAAAAAAAAAAAAAAAAAAAZAAAAAEAAABAAAAAAAAAAAAAAAAAAAAAAAAAAAAAAAAAAAAAAAAAAAAAAAAAAAAAAAAAAAAAAAAAAAAAAAAAAAAAAAAAAAAAAAAAAAAAAAAAAAAAAAAAAAAAAAAAAAAAFAAAADwAAAAAAAAAAAAAAAAAAAkUAAAAAQAAABQAAAAUAAAAFAAAAAEAAAAAAAAAZAAAAGQAAAAAAAAAZAAAAGQAAAAVAAAAYAAAAAAAAAAAAAAADwAAACADAAAAAAAAAAAAAAEAAACgMgAAVgcAAKr4//8BAAAAf39/AAEAAABkAAAAAAAAABQAAABAHwAAAAAAACYAAAAAAAAAwOD//wAAAAAmAAAAZAAAABYAAABMAAAAAAAAAAAAAAAEAAAAAAAAAAEAAADd3d0KAAAAACgAAAAoAAAAZAAAAGQAAAAAAAAAzMzMAAAAAABQAAAAUAAAAGQAAABkAAAAAAAAAAcAAAA4AAAAAAAAAAAAAAAAAAAA////AAAAAAAAAAAAAAAAAAAAAAAAAAAAAAAAAAAAAABkAAAAZAAAAAAAAAAjAAAABAAAAGQAAAAXAAAAFAAAAAAAAAAAAAAA/38AAP9/AAAAAAAACQAAAAQAAAAAAAAADAAAABAAAAAAAAAAAAAAAAAAAAAAAAAAHgAAAGgAAAAAAAAAAAAAAAAAAAAAAAAAAAAAABAnAAAQJwAAAAAAAAAAAAAAAAAAAAAAAAAAAAAAAAAAAAAAAAAAAAAUAAAAAAAAAMDA/wAAAAAAZAAAADIAAAAAAAAAZAAAAAAAAAB/f38ACgAAAB8AAABUAAAAprcnBf///wEAAAAAAAAAAAAAAAAAAAAAAAAAAAAAAAAAAAAAAAAAAAAAAAJ/f38A3d3dA8zMzADAwP8Af39/AAAAAAAAAAAAAAAAAP///wAAAAAAIQAAABgAAAAUAAAAoQoAAPERAABJFwAAmR4AABAAAAAmAAAACAAAAP//////////"/>
+                <pr:smNativeData xmlns:pr="smNativeData" xmlns:p14="http://schemas.microsoft.com/office/powerpoint/2010/main" xmlns="" val="SMDATA_15_SgSuXhMAAAAlAAAAEQAAAC0AAAAAkAAAAEgAAACQAAAASAAAAAAAAAAAAAAAAAAAAAEAAABQAAAAAAAAAAAA4D8AAAAAAADgPwAAAAAAAOA/AAAAAAAA4D8AAAAAAADgPwAAAAAAAOA/AAAAAAAA4D8AAAAAAADgPwAAAAAAAOA/AAAAAAAA4D8CAAAAjAAAAAAAAAAAAAAAprcnDP///wgAAAAAAAAAAAAAAAAAAAAAAAAAAAAAAAAAAAAAZAAAAAEAAABAAAAAAAAAAAAAAAAAAAAAAAAAAAAAAAAAAAAAAAAAAAAAAAAAAAAAAAAAAAAAAAAAAAAAAAAAAAAAAAAAAAAAAAAAAAAAAAAAAAAAAAAAAAAAAAAAAAAAFAAAADwAAAAAAAAAAAAAAAAAAAkUAAAAAQAAABQAAAAUAAAAFAAAAAEAAAAAAAAAZAAAAGQAAAAAAAAAZAAAAGQAAAAVAAAAYAAAAAAAAAAAAAAADwAAACADAAAAAAAAAAAAAAEAAACgMgAAVgcAAKr4//8BAAAAf39/AAEAAABkAAAAAAAAABQAAABAHwAAAAAAACYAAAAAAAAAwOD//wAAAAAmAAAAZAAAABYAAABMAAAAAAAAAAAAAAAEAAAAAAAAAAEAAADd3d0KAAAAACgAAAAoAAAAZAAAAGQAAAAAAAAAzMzMAAAAAABQAAAAUAAAAGQAAABkAAAAAAAAAAcAAAA4AAAAAAAAAAAAAAAAAAAA////AAAAAAAAAAAAAAAAAAAAAAAAAAAAAAAAAAAAAABkAAAAZAAAAAAAAAAjAAAABAAAAGQAAAAXAAAAFAAAAAAAAAAAAAAA/38AAP9/AAAAAAAACQAAAAQAAAAAAAAADAAAABAAAAAAAAAAAAAAAAAAAAAAAAAAHgAAAGgAAAAAAAAAAAAAAAAAAAAAAAAAAAAAABAnAAAQJwAAAAAAAAAAAAAAAAAAAAAAAAAAAAAAAAAAAAAAAAAAAAAUAAAAAAAAAMDA/wAAAAAAZAAAADIAAAAAAAAAZAAAAAAAAAB/f38ACgAAAB8AAABUAAAAprcnBf///wEAAAAAAAAAAAAAAAAAAAAAAAAAAAAAAAAAAAAAAAAAAAAAAAJ/f38A3d3dA8zMzADAwP8Af39/AAAAAAAAAAAAAAAAAP///wAAAAAAIQAAABgAAAAUAAAAoQoAAPERAABJFwAAmR4AABAAAAAmAAAACAAAAP//////////"/>
               </a:ext>
             </a:extLst>
           </p:cNvPicPr>
@@ -13066,7 +15106,7 @@
         </p:blipFill>
         <p:spPr>
           <a:xfrm>
-            <a:off x="4004732" y="2512199"/>
+            <a:off x="4017795" y="2161726"/>
             <a:ext cx="802399" cy="802399"/>
           </a:xfrm>
           <a:prstGeom prst="rect">
@@ -13086,7 +15126,7 @@
             <a:picLocks noChangeAspect="1"/>
             <a:extLst>
               <a:ext uri="smNativeData">
-                <pr:smNativeData xmlns="" xmlns:p14="http://schemas.microsoft.com/office/powerpoint/2010/main" xmlns:pr="smNativeData" val="SMDATA_15_SgSuXhMAAAAlAAAAEQAAAC0AAAAAkAAAAEgAAACQAAAASAAAAAAAAAAAAAAAAAAAAAEAAABQAAAAAAAAAAAA4D8AAAAAAADgPwAAAAAAAOA/AAAAAAAA4D8AAAAAAADgPwAAAAAAAOA/AAAAAAAA4D8AAAAAAADgPwAAAAAAAOA/AAAAAAAA4D8CAAAAjAAAAAAAAAAAAAAAprcnDP///wgAAAAAAAAAAAAAAAAAAAAAAAAAAAAAAAAAAAAAZAAAAAEAAABAAAAAAAAAAAAAAAAAAAAAAAAAAAAAAAAAAAAAAAAAAAAAAAAAAAAAAAAAAAAAAAAAAAAAAAAAAAAAAAAAAAAAAAAAAAAAAAAAAAAAAAAAAAAAAAAAAAAAFAAAADwAAAAAAAAAAAAAAAAAAAkUAAAAAQAAABQAAAAUAAAAFAAAAAEAAAAAAAAAZAAAAGQAAAAAAAAAZAAAAGQAAAAVAAAAYAAAAAAAAAAAAAAADwAAACADAAAAAAAAAAAAAAEAAACgMgAAVgcAAKr4//8BAAAAf39/AAEAAABkAAAAAAAAABQAAABAHwAAAAAAACYAAAAAAAAAwOD//wAAAAAmAAAAZAAAABYAAABMAAAAAAAAAAAAAAAEAAAAAAAAAAEAAADd3d0KAAAAACgAAAAoAAAAZAAAAGQAAAAAAAAAzMzMAAAAAABQAAAAUAAAAGQAAABkAAAAAAAAAAcAAAA4AAAAAAAAAAAAAAAAAAAA////AAAAAAAAAAAAAAAAAAAAAAAAAAAAAAAAAAAAAABkAAAAZAAAAAAAAAAjAAAABAAAAGQAAAAXAAAAFAAAAAAAAAAAAAAA/38AAP9/AAAAAAAACQAAAAQAAAAAAAAADAAAABAAAAAAAAAAAAAAAAAAAAAAAAAAHgAAAGgAAAAAAAAAAAAAAAAAAAAAAAAAAAAAABAnAAAQJwAAAAAAAAAAAAAAAAAAAAAAAAAAAAAAAAAAAAAAAAAAAAAUAAAAAAAAAMDA/wAAAAAAZAAAADIAAAAAAAAAZAAAAAAAAAB/f38ACgAAAB8AAABUAAAAprcnBf///wEAAAAAAAAAAAAAAAAAAAAAAAAAAAAAAAAAAAAAAAAAAAAAAAJ/f38A3d3dA8zMzADAwP8Af39/AAAAAAAAAAAAAAAAAP///wAAAAAAIQAAABgAAAAUAAAAfyAAAPERAAAnLQAAmR4AABAAAAAmAAAACAAAAP//////////"/>
+                <pr:smNativeData xmlns:pr="smNativeData" xmlns:p14="http://schemas.microsoft.com/office/powerpoint/2010/main" xmlns="" val="SMDATA_15_SgSuXhMAAAAlAAAAEQAAAC0AAAAAkAAAAEgAAACQAAAASAAAAAAAAAAAAAAAAAAAAAEAAABQAAAAAAAAAAAA4D8AAAAAAADgPwAAAAAAAOA/AAAAAAAA4D8AAAAAAADgPwAAAAAAAOA/AAAAAAAA4D8AAAAAAADgPwAAAAAAAOA/AAAAAAAA4D8CAAAAjAAAAAAAAAAAAAAAprcnDP///wgAAAAAAAAAAAAAAAAAAAAAAAAAAAAAAAAAAAAAZAAAAAEAAABAAAAAAAAAAAAAAAAAAAAAAAAAAAAAAAAAAAAAAAAAAAAAAAAAAAAAAAAAAAAAAAAAAAAAAAAAAAAAAAAAAAAAAAAAAAAAAAAAAAAAAAAAAAAAAAAAAAAAFAAAADwAAAAAAAAAAAAAAAAAAAkUAAAAAQAAABQAAAAUAAAAFAAAAAEAAAAAAAAAZAAAAGQAAAAAAAAAZAAAAGQAAAAVAAAAYAAAAAAAAAAAAAAADwAAACADAAAAAAAAAAAAAAEAAACgMgAAVgcAAKr4//8BAAAAf39/AAEAAABkAAAAAAAAABQAAABAHwAAAAAAACYAAAAAAAAAwOD//wAAAAAmAAAAZAAAABYAAABMAAAAAAAAAAAAAAAEAAAAAAAAAAEAAADd3d0KAAAAACgAAAAoAAAAZAAAAGQAAAAAAAAAzMzMAAAAAABQAAAAUAAAAGQAAABkAAAAAAAAAAcAAAA4AAAAAAAAAAAAAAAAAAAA////AAAAAAAAAAAAAAAAAAAAAAAAAAAAAAAAAAAAAABkAAAAZAAAAAAAAAAjAAAABAAAAGQAAAAXAAAAFAAAAAAAAAAAAAAA/38AAP9/AAAAAAAACQAAAAQAAAAAAAAADAAAABAAAAAAAAAAAAAAAAAAAAAAAAAAHgAAAGgAAAAAAAAAAAAAAAAAAAAAAAAAAAAAABAnAAAQJwAAAAAAAAAAAAAAAAAAAAAAAAAAAAAAAAAAAAAAAAAAAAAUAAAAAAAAAMDA/wAAAAAAZAAAADIAAAAAAAAAZAAAAAAAAAB/f38ACgAAAB8AAABUAAAAprcnBf///wEAAAAAAAAAAAAAAAAAAAAAAAAAAAAAAAAAAAAAAAAAAAAAAAJ/f38A3d3dA8zMzADAwP8Af39/AAAAAAAAAAAAAAAAAP///wAAAAAAIQAAABgAAAAUAAAAfyAAAPERAAAnLQAAmR4AABAAAAAmAAAACAAAAP//////////"/>
               </a:ext>
             </a:extLst>
           </p:cNvPicPr>
@@ -13100,7 +15140,7 @@
         </p:blipFill>
         <p:spPr>
           <a:xfrm>
-            <a:off x="8235731" y="2512199"/>
+            <a:off x="8784371" y="2161726"/>
             <a:ext cx="777641" cy="777641"/>
           </a:xfrm>
           <a:prstGeom prst="rect">
@@ -13119,7 +15159,7 @@
           <p:cNvSpPr>
             <a:extLst>
               <a:ext uri="smNativeData">
-                <pr:smNativeData xmlns="" xmlns:p14="http://schemas.microsoft.com/office/powerpoint/2010/main" xmlns:pr="smNativeData" val="SMDATA_13_SgSuXhMAAAAlAAAAZAAAAE0AAAAAkAAAAEgAAACQAAAASAAAAAAAAAAAAAAAAAAAAAEAAABQAAAAAAAAAAAA4D8AAAAAAADgPwAAAAAAAOA/AAAAAAAA4D8AAAAAAADgPwAAAAAAAOA/AAAAAAAA4D8AAAAAAADgPwAAAAAAAOA/AAAAAAAA4D8CAAAAjAAAAAAAAAAAAAAAprcnDP///wgAAAAAAAAAAAAAAAAAAAAAAAAAAAAAAAAAAAAAZAAAAAEAAABAAAAAAAAAAAAAAAAAAAAAAAAAAAAAAAAAAAAAAAAAAAAAAAAAAAAAAAAAAAAAAAAAAAAAAAAAAAAAAAAAAAAAAAAAAAAAAAAAAAAAAAAAAAAAAAAAAAAAFAAAADwAAAAAAAAAAAAAAAAAAAAPAAAAAQAAACMAAAAjAAAAIwAAAB4AAAAAAAAAZAAAAGQAAAAAAAAAZAAAAGQAAAAVAAAAYAAAAAAAAAAAAAAADwAAACADAAAAAAAAAAAAAAEAAACgMgAAVgcAAKr4//8BAAAAf39/AAEAAABkAAAAAAAAABQAAABAHwAAAAAAACYAAAAAAAAAwOD//wAAAAAmAAAAZAAAABYAAABMAAAAAAAAAAAAAAAEAAAAAAAAAAEAAADd3d0KAAAAACgAAAAoAAAAZAAAAGQAAAAAAAAAzMzMAAAAAABQAAAAUAAAAGQAAABkAAAAAAAAABcAAAAUAAAAAAAAAAAAAAD/fwAA/38AAAAAAAAJAAAABAAAAP7+/v4MAAAAEAAAAAAAAAAAAAAAAAAAAAAAAAAeAAAAaAAAAAAAAAAAAAAAAAAAAAAAAAAAAAAAECcAABAnAAAAAAAAAAAAAAAAAAAAAAAAAAAAAAAAAAAAAAAAAAAAABQAAAAAAAAAwMD/AAAAAABkAAAAMgAAAAAAAABkAAAAAAAAAH9/fwAKAAAAHwAAAFQAAACmtycF////AQAAAAAAAAAAAAAAAAAAAAAAAAAAAAAAAAAAAAAAAAAAAAAAAH9/fwDd3d0DzMzMAMDA/wB/f38AAAAAAAAAAAAAAAAAAAAAAAAAAAAhAAAAGAAAABQAAADICQAAVA0AAIQZAADiDwAAECAAACYAAAAIAAAA//////////8="/>
+                <pr:smNativeData xmlns:pr="smNativeData" xmlns:p14="http://schemas.microsoft.com/office/powerpoint/2010/main" xmlns="" val="SMDATA_13_SgSuXhMAAAAlAAAAZAAAAE0AAAAAkAAAAEgAAACQAAAASAAAAAAAAAAAAAAAAAAAAAEAAABQAAAAAAAAAAAA4D8AAAAAAADgPwAAAAAAAOA/AAAAAAAA4D8AAAAAAADgPwAAAAAAAOA/AAAAAAAA4D8AAAAAAADgPwAAAAAAAOA/AAAAAAAA4D8CAAAAjAAAAAAAAAAAAAAAprcnDP///wgAAAAAAAAAAAAAAAAAAAAAAAAAAAAAAAAAAAAAZAAAAAEAAABAAAAAAAAAAAAAAAAAAAAAAAAAAAAAAAAAAAAAAAAAAAAAAAAAAAAAAAAAAAAAAAAAAAAAAAAAAAAAAAAAAAAAAAAAAAAAAAAAAAAAAAAAAAAAAAAAAAAAFAAAADwAAAAAAAAAAAAAAAAAAAAPAAAAAQAAACMAAAAjAAAAIwAAAB4AAAAAAAAAZAAAAGQAAAAAAAAAZAAAAGQAAAAVAAAAYAAAAAAAAAAAAAAADwAAACADAAAAAAAAAAAAAAEAAACgMgAAVgcAAKr4//8BAAAAf39/AAEAAABkAAAAAAAAABQAAABAHwAAAAAAACYAAAAAAAAAwOD//wAAAAAmAAAAZAAAABYAAABMAAAAAAAAAAAAAAAEAAAAAAAAAAEAAADd3d0KAAAAACgAAAAoAAAAZAAAAGQAAAAAAAAAzMzMAAAAAABQAAAAUAAAAGQAAABkAAAAAAAAABcAAAAUAAAAAAAAAAAAAAD/fwAA/38AAAAAAAAJAAAABAAAAP7+/v4MAAAAEAAAAAAAAAAAAAAAAAAAAAAAAAAeAAAAaAAAAAAAAAAAAAAAAAAAAAAAAAAAAAAAECcAABAnAAAAAAAAAAAAAAAAAAAAAAAAAAAAAAAAAAAAAAAAAAAAABQAAAAAAAAAwMD/AAAAAABkAAAAMgAAAAAAAABkAAAAAAAAAH9/fwAKAAAAHwAAAFQAAACmtycF////AQAAAAAAAAAAAAAAAAAAAAAAAAAAAAAAAAAAAAAAAAAAAAAAAH9/fwDd3d0DzMzMAMDA/wB/f38AAAAAAAAAAAAAAAAAAAAAAAAAAAAhAAAAGAAAABQAAADICQAAVA0AAIQZAADiDwAAECAAACYAAAAIAAAA//////////8="/>
               </a:ext>
             </a:extLst>
           </p:cNvSpPr>
@@ -13127,7 +15167,7 @@
         </p:nvSpPr>
         <p:spPr>
           <a:xfrm>
-            <a:off x="3357155" y="1746436"/>
+            <a:off x="3357155" y="1357616"/>
             <a:ext cx="2557780" cy="415290"/>
           </a:xfrm>
           <a:prstGeom prst="rect">
@@ -13160,7 +15200,7 @@
           <p:cNvSpPr>
             <a:extLst>
               <a:ext uri="smNativeData">
-                <pr:smNativeData xmlns="" xmlns:p14="http://schemas.microsoft.com/office/powerpoint/2010/main" xmlns:pr="smNativeData" val="SMDATA_13_SgSuXhMAAAAlAAAAZAAAAE0AAAAAkAAAAEgAAACQAAAASAAAAAAAAAAAAAAAAAAAAAEAAABQAAAAAAAAAAAA4D8AAAAAAADgPwAAAAAAAOA/AAAAAAAA4D8AAAAAAADgPwAAAAAAAOA/AAAAAAAA4D8AAAAAAADgPwAAAAAAAOA/AAAAAAAA4D8CAAAAjAAAAAAAAAAAAAAAprcnDP///wgAAAAAAAAAAAAAAAAAAAAAAAAAAAAAAAAAAAAAZAAAAAEAAABAAAAAAAAAAAAAAAAAAAAAAAAAAAAAAAAAAAAAAAAAAAAAAAAAAAAAAAAAAAAAAAAAAAAAAAAAAAAAAAAAAAAAAAAAAAAAAAAAAAAAAAAAAAAAAAAAAAAAFAAAADwAAAAAAAAAAAAAAAAAAAAPAAAAAQAAACMAAAAjAAAAIwAAAB4AAAAAAAAAZAAAAGQAAAAAAAAAZAAAAGQAAAAVAAAAYAAAAAAAAAAAAAAADwAAACADAAAAAAAAAAAAAAEAAACgMgAAVgcAAKr4//8BAAAAf39/AAEAAABkAAAAAAAAABQAAABAHwAAAAAAACYAAAAAAAAAwOD//wAAAAAmAAAAZAAAABYAAABMAAAAAAAAAAAAAAAEAAAAAAAAAAEAAADd3d0KAAAAACgAAAAoAAAAZAAAAGQAAAAAAAAAzMzMAAAAAABQAAAAUAAAAGQAAABkAAAAAAAAABcAAAAUAAAAAAAAAAAAAAD/fwAA/38AAAAAAAAJAAAABAAAAP////8MAAAAEAAAAAAAAAAAAAAAAAAAAAAAAAAeAAAAaAAAAAAAAAAAAAAAAAAAAAAAAAAAAAAAECcAABAnAAAAAAAAAAAAAAAAAAAAAAAAAAAAAAAAAAAAAAAAAAAAABQAAAAAAAAAwMD/AAAAAABkAAAAMgAAAAAAAABkAAAAAAAAAH9/fwAKAAAAHwAAAFQAAACmtycF////AQAAAAAAAAAAAAAAAAAAAAAAAAAAAAAAAAAAAAAAAAAAAAAAAH9/fwDd3d0DzMzMAMDA/wB/f38AAAAAAAAAAAAAAAAAAAAAAAAAAAAhAAAAGAAAABQAAADnHAAAVA0AAKc0AADiDwAAECAAACYAAAAIAAAA//////////8="/>
+                <pr:smNativeData xmlns:pr="smNativeData" xmlns:p14="http://schemas.microsoft.com/office/powerpoint/2010/main" xmlns="" val="SMDATA_13_SgSuXhMAAAAlAAAAZAAAAE0AAAAAkAAAAEgAAACQAAAASAAAAAAAAAAAAAAAAAAAAAEAAABQAAAAAAAAAAAA4D8AAAAAAADgPwAAAAAAAOA/AAAAAAAA4D8AAAAAAADgPwAAAAAAAOA/AAAAAAAA4D8AAAAAAADgPwAAAAAAAOA/AAAAAAAA4D8CAAAAjAAAAAAAAAAAAAAAprcnDP///wgAAAAAAAAAAAAAAAAAAAAAAAAAAAAAAAAAAAAAZAAAAAEAAABAAAAAAAAAAAAAAAAAAAAAAAAAAAAAAAAAAAAAAAAAAAAAAAAAAAAAAAAAAAAAAAAAAAAAAAAAAAAAAAAAAAAAAAAAAAAAAAAAAAAAAAAAAAAAAAAAAAAAFAAAADwAAAAAAAAAAAAAAAAAAAAPAAAAAQAAACMAAAAjAAAAIwAAAB4AAAAAAAAAZAAAAGQAAAAAAAAAZAAAAGQAAAAVAAAAYAAAAAAAAAAAAAAADwAAACADAAAAAAAAAAAAAAEAAACgMgAAVgcAAKr4//8BAAAAf39/AAEAAABkAAAAAAAAABQAAABAHwAAAAAAACYAAAAAAAAAwOD//wAAAAAmAAAAZAAAABYAAABMAAAAAAAAAAAAAAAEAAAAAAAAAAEAAADd3d0KAAAAACgAAAAoAAAAZAAAAGQAAAAAAAAAzMzMAAAAAABQAAAAUAAAAGQAAABkAAAAAAAAABcAAAAUAAAAAAAAAAAAAAD/fwAA/38AAAAAAAAJAAAABAAAAP////8MAAAAEAAAAAAAAAAAAAAAAAAAAAAAAAAeAAAAaAAAAAAAAAAAAAAAAAAAAAAAAAAAAAAAECcAABAnAAAAAAAAAAAAAAAAAAAAAAAAAAAAAAAAAAAAAAAAAAAAABQAAAAAAAAAwMD/AAAAAABkAAAAMgAAAAAAAABkAAAAAAAAAH9/fwAKAAAAHwAAAFQAAACmtycF////AQAAAAAAAAAAAAAAAAAAAAAAAAAAAAAAAAAAAAAAAAAAAAAAAH9/fwDd3d0DzMzMAMDA/wB/f38AAAAAAAAAAAAAAAAAAAAAAAAAAAAhAAAAGAAAABQAAADnHAAAVA0AAKc0AADiDwAAECAAACYAAAAIAAAA//////////8="/>
               </a:ext>
             </a:extLst>
           </p:cNvSpPr>
@@ -13168,7 +15208,7 @@
         </p:nvSpPr>
         <p:spPr>
           <a:xfrm>
-            <a:off x="6678136" y="1746436"/>
+            <a:off x="7344342" y="1357616"/>
             <a:ext cx="3338059" cy="415290"/>
           </a:xfrm>
           <a:prstGeom prst="rect">
@@ -13261,7 +15301,7 @@
         </p:nvSpPr>
         <p:spPr>
           <a:xfrm>
-            <a:off x="1447901" y="41860"/>
+            <a:off x="4047579" y="-85707"/>
             <a:ext cx="4644460" cy="846858"/>
           </a:xfrm>
         </p:spPr>
@@ -13284,7 +15324,7 @@
             <a:spLocks noGrp="1"/>
             <a:extLst>
               <a:ext uri="smNativeData">
-                <pr:smNativeData xmlns="" xmlns:p14="http://schemas.microsoft.com/office/powerpoint/2010/main" xmlns:pr="smNativeData" val="SMDATA_13_SgSuXhMAAAAlAAAAZAAAAE0AAAAAkAAAAEgAAACQAAAASAAAAAAAAAAAAAAAAAAAAAEAAABQAAAAAAAAAAAA4D8AAAAAAADgPwAAAAAAAOA/AAAAAAAA4D8AAAAAAADgPwAAAAAAAOA/AAAAAAAA4D8AAAAAAADgPwAAAAAAAOA/AAAAAAAA4D8CAAAAjAAAAAAAAAAAAAAAprcnDP///wgAAAAAAAAAAAAAAAAAAAAAAAAAAAAAAAAAAAAAZAAAAAEAAABAAAAAAAAAAAAAAAAAAAAAAAAAAAAAAAAAAAAAAAAAAAAAAAAAAAAAAAAAAAAAAAAAAAAAAAAAAAAAAAAAAAAAAAAAAAAAAAAAAAAAAAAAAAAAAAAAAAAAFAAAADwAAAAAAAAAAAAAAAAAAAAPAAAAAQAAACMAAAAjAAAAIwAAAB4AAAAAAAAAZAAAAGQAAAAAAAAAZAAAAGQAAAAVAAAAYAAAAAAAAAAAAAAADwAAACADAAAAAAAAAAAAAAEAAACgMgAAVgcAAKr4//8BAAAAf39/AAEAAABkAAAAAAAAABQAAABAHwAAAAAAACYAAAAAAAAAwOD//wAAAAAmAAAAZAAAABYAAABMAAAAAAAAAAAAAAAEAAAAAAAAAAEAAADd3d0KAAAAACgAAAAoAAAAZAAAAGQAAAAAAAAAzMzMAAAAAABQAAAAUAAAAGQAAABkAAAAAAAAABcAAAAUAAAAAAAAAAAAAAD/fwAA/38AAAAAAAAJAAAABAAAAAAAAAAMAAAAEAAAAAAAAAAAAAAAAAAAAAAAAAAeAAAAaAAAAAAAAAAAAAAAAAAAAAAAAAAAAAAAECcAABAnAAAAAAAAAAAAAAAAAAAAAAAAAAAAAAAAAAAAAAAAAAAAABQAAAAAAAAAwMD/AAAAAABkAAAAMgAAAAAAAABkAAAAAAAAAH9/fwAKAAAAHwAAAFQAAACmtycF////AQAAAAAAAAAAAAAAAAAAAAAAAAAAAAAAAAAAAAAAAAAAAAAAAH9/fwDd3d0DzMzMAMDA/wB/f38AAAAAAAAAAAAAAAAAAAAAAAAAAAAhAAAAGAAAABQAAADnBAAAEAgAAHQkAABwKAAAECAAACYAAAAIAAAA//////////8="/>
+                <pr:smNativeData xmlns:pr="smNativeData" xmlns:p14="http://schemas.microsoft.com/office/powerpoint/2010/main" xmlns="" val="SMDATA_13_SgSuXhMAAAAlAAAAZAAAAE0AAAAAkAAAAEgAAACQAAAASAAAAAAAAAAAAAAAAAAAAAEAAABQAAAAAAAAAAAA4D8AAAAAAADgPwAAAAAAAOA/AAAAAAAA4D8AAAAAAADgPwAAAAAAAOA/AAAAAAAA4D8AAAAAAADgPwAAAAAAAOA/AAAAAAAA4D8CAAAAjAAAAAAAAAAAAAAAprcnDP///wgAAAAAAAAAAAAAAAAAAAAAAAAAAAAAAAAAAAAAZAAAAAEAAABAAAAAAAAAAAAAAAAAAAAAAAAAAAAAAAAAAAAAAAAAAAAAAAAAAAAAAAAAAAAAAAAAAAAAAAAAAAAAAAAAAAAAAAAAAAAAAAAAAAAAAAAAAAAAAAAAAAAAFAAAADwAAAAAAAAAAAAAAAAAAAAPAAAAAQAAACMAAAAjAAAAIwAAAB4AAAAAAAAAZAAAAGQAAAAAAAAAZAAAAGQAAAAVAAAAYAAAAAAAAAAAAAAADwAAACADAAAAAAAAAAAAAAEAAACgMgAAVgcAAKr4//8BAAAAf39/AAEAAABkAAAAAAAAABQAAABAHwAAAAAAACYAAAAAAAAAwOD//wAAAAAmAAAAZAAAABYAAABMAAAAAAAAAAAAAAAEAAAAAAAAAAEAAADd3d0KAAAAACgAAAAoAAAAZAAAAGQAAAAAAAAAzMzMAAAAAABQAAAAUAAAAGQAAABkAAAAAAAAABcAAAAUAAAAAAAAAAAAAAD/fwAA/38AAAAAAAAJAAAABAAAAAAAAAAMAAAAEAAAAAAAAAAAAAAAAAAAAAAAAAAeAAAAaAAAAAAAAAAAAAAAAAAAAAAAAAAAAAAAECcAABAnAAAAAAAAAAAAAAAAAAAAAAAAAAAAAAAAAAAAAAAAAAAAABQAAAAAAAAAwMD/AAAAAABkAAAAMgAAAAAAAABkAAAAAAAAAH9/fwAKAAAAHwAAAFQAAACmtycF////AQAAAAAAAAAAAAAAAAAAAAAAAAAAAAAAAAAAAAAAAAAAAAAAAH9/fwDd3d0DzMzMAMDA/wB/f38AAAAAAAAAAAAAAAAAAAAAAAAAAAAhAAAAGAAAABQAAADnBAAAEAgAAHQkAABwKAAAECAAACYAAAAIAAAA//////////8="/>
               </a:ext>
             </a:extLst>
           </p:cNvSpPr>
@@ -13295,7 +15335,7 @@
         <p:spPr>
           <a:xfrm>
             <a:off x="1839351" y="636022"/>
-            <a:ext cx="7258005" cy="4833256"/>
+            <a:ext cx="4297957" cy="6039098"/>
           </a:xfrm>
           <a:prstGeom prst="rect">
             <a:avLst/>
@@ -13443,48 +15483,6 @@
               <a:t>Otros</a:t>
             </a:r>
             <a:endParaRPr lang="es-ar" sz="2100" dirty="0"/>
-          </a:p>
-        </p:txBody>
-      </p:sp>
-      <p:sp>
-        <p:nvSpPr>
-          <p:cNvPr id="5" name="Rectángulo 4"/>
-          <p:cNvSpPr/>
-          <p:nvPr/>
-        </p:nvSpPr>
-        <p:spPr>
-          <a:xfrm>
-            <a:off x="7027818" y="538249"/>
-            <a:ext cx="2286000" cy="646331"/>
-          </a:xfrm>
-          <a:prstGeom prst="rect">
-            <a:avLst/>
-          </a:prstGeom>
-        </p:spPr>
-        <p:txBody>
-          <a:bodyPr wrap="square">
-            <a:spAutoFit/>
-          </a:bodyPr>
-          <a:lstStyle/>
-          <a:p>
-            <a:pPr algn="ctr">
-              <a:defRPr lang="en-us"/>
-            </a:pPr>
-            <a:r>
-              <a:rPr lang="es-es" b="1" dirty="0" err="1"/>
-              <a:t>Dataset</a:t>
-            </a:r>
-            <a:endParaRPr lang="es-es" b="1" dirty="0"/>
-          </a:p>
-          <a:p>
-            <a:pPr algn="ctr">
-              <a:defRPr lang="en-us"/>
-            </a:pPr>
-            <a:r>
-              <a:rPr lang="es-es" dirty="0"/>
-              <a:t>226 CAMPOS</a:t>
-            </a:r>
-            <a:endParaRPr lang="es-ar" dirty="0"/>
           </a:p>
         </p:txBody>
       </p:sp>
@@ -13608,6 +15606,49 @@
           </a:prstGeom>
         </p:spPr>
       </p:pic>
+      <p:sp>
+        <p:nvSpPr>
+          <p:cNvPr id="3" name="Elipse 2"/>
+          <p:cNvSpPr/>
+          <p:nvPr/>
+        </p:nvSpPr>
+        <p:spPr>
+          <a:xfrm>
+            <a:off x="9001612" y="179201"/>
+            <a:ext cx="2131855" cy="887782"/>
+          </a:xfrm>
+          <a:prstGeom prst="ellipse">
+            <a:avLst/>
+          </a:prstGeom>
+          <a:solidFill>
+            <a:schemeClr val="bg2"/>
+          </a:solidFill>
+        </p:spPr>
+        <p:style>
+          <a:lnRef idx="2">
+            <a:schemeClr val="accent1">
+              <a:shade val="50000"/>
+            </a:schemeClr>
+          </a:lnRef>
+          <a:fillRef idx="1">
+            <a:schemeClr val="accent1"/>
+          </a:fillRef>
+          <a:effectRef idx="0">
+            <a:schemeClr val="accent1"/>
+          </a:effectRef>
+          <a:fontRef idx="minor">
+            <a:schemeClr val="lt1"/>
+          </a:fontRef>
+        </p:style>
+        <p:txBody>
+          <a:bodyPr rtlCol="0" anchor="ctr"/>
+          <a:lstStyle/>
+          <a:p>
+            <a:pPr algn="ctr"/>
+            <a:endParaRPr lang="es-MX"/>
+          </a:p>
+        </p:txBody>
+      </p:sp>
       <p:pic>
         <p:nvPicPr>
           <p:cNvPr id="11" name="Imagen 10"/>
@@ -13638,6 +15679,47 @@
           </a:prstGeom>
         </p:spPr>
       </p:pic>
+      <p:sp>
+        <p:nvSpPr>
+          <p:cNvPr id="5" name="Rectángulo 4"/>
+          <p:cNvSpPr/>
+          <p:nvPr/>
+        </p:nvSpPr>
+        <p:spPr>
+          <a:xfrm>
+            <a:off x="8924540" y="261749"/>
+            <a:ext cx="2286000" cy="646331"/>
+          </a:xfrm>
+          <a:prstGeom prst="rect">
+            <a:avLst/>
+          </a:prstGeom>
+        </p:spPr>
+        <p:txBody>
+          <a:bodyPr wrap="square">
+            <a:spAutoFit/>
+          </a:bodyPr>
+          <a:lstStyle/>
+          <a:p>
+            <a:pPr algn="ctr">
+              <a:defRPr lang="en-us"/>
+            </a:pPr>
+            <a:r>
+              <a:rPr lang="es-es" b="1" dirty="0"/>
+              <a:t>Dataset</a:t>
+            </a:r>
+          </a:p>
+          <a:p>
+            <a:pPr algn="ctr">
+              <a:defRPr lang="en-us"/>
+            </a:pPr>
+            <a:r>
+              <a:rPr lang="es-es" dirty="0"/>
+              <a:t>226 CAMPOS</a:t>
+            </a:r>
+            <a:endParaRPr lang="es-ar" dirty="0"/>
+          </a:p>
+        </p:txBody>
+      </p:sp>
     </p:spTree>
     <p:extLst>
       <p:ext uri="{BB962C8B-B14F-4D97-AF65-F5344CB8AC3E}">
@@ -13774,7 +15856,7 @@
         </p:nvSpPr>
         <p:spPr>
           <a:xfrm>
-            <a:off x="1285105" y="239695"/>
+            <a:off x="4519793" y="422576"/>
             <a:ext cx="4083730" cy="700831"/>
           </a:xfrm>
         </p:spPr>
@@ -13796,7 +15878,7 @@
           <p:cNvSpPr>
             <a:extLst>
               <a:ext uri="smNativeData">
-                <pr:smNativeData xmlns="" xmlns:p14="http://schemas.microsoft.com/office/powerpoint/2010/main" xmlns:pr="smNativeData" val="SMDATA_13_SgSuXhMAAAAlAAAAZAAAAE0AAAAAkAAAAEgAAACQAAAASAAAAAAAAAAAAAAAAAAAAAEAAABQAAAAAAAAAAAA4D8AAAAAAADgPwAAAAAAAOA/AAAAAAAA4D8AAAAAAADgPwAAAAAAAOA/AAAAAAAA4D8AAAAAAADgPwAAAAAAAOA/AAAAAAAA4D8CAAAAjAAAAAAAAAAAAAAAprcnDP///wgAAAAAAAAAAAAAAAAAAAAAAAAAAAAAAAAAAAAAZAAAAAEAAABAAAAAAAAAAAAAAAAAAAAAAAAAAAAAAAAAAAAAAAAAAAAAAAAAAAAAAAAAAAAAAAAAAAAAAAAAAAAAAAAAAAAAAAAAAAAAAAAAAAAAAAAAAAAAAAAAAAAAFAAAADwAAAAAAAAAAAAAAAAAAAAPAAAAAQAAACMAAAAjAAAAIwAAAB4AAAAAAAAAZAAAAGQAAAAAAAAAZAAAAGQAAAAVAAAAYAAAAAAAAAAAAAAADwAAACADAAAAAAAAAAAAAAEAAACgMgAAVgcAAKr4//8BAAAAf39/AAEAAABkAAAAAAAAABQAAABAHwAAAAAAACYAAAAAAAAAwOD//wAAAAAmAAAAZAAAABYAAABMAAAAAAAAAAAAAAAEAAAAAAAAAAEAAADd3d0KAAAAACgAAAAoAAAAZAAAAGQAAAAAAAAAzMzMAAAAAABQAAAAUAAAAGQAAABkAAAAAAAAABcAAAAUAAAAAAAAAAAAAAD/fwAA/38AAAAAAAAJAAAABAAAAAYAAAAMAAAAEAAAAAAAAAAAAAAAAAAAAAAAAAAeAAAAaAAAAAAAAAAAAAAAAAAAAAAAAAAAAAAAECcAABAnAAAAAAAAAAAAAAAAAAAAAAAAAAAAAAAAAAAAAAAAAAAAABQAAAAAAAAAwMD/AAAAAABkAAAAMgAAAAAAAABkAAAAAAAAAH9/fwAKAAAAHwAAAFQAAACmtycF////AQAAAAAAAAAAAAAAAAAAAAAAAAAAAAAAAAAAAAAAAAAAAAAAAH9/fwDd3d0DzMzMAMDA/wB/f38AAAAAAAAAAAAAAAAAAAAAAAAAAAAhAAAAGAAAABQAAADnBAAAXAkAAHQkAABsKQAAACAAACYAAAAIAAAA//////////8="/>
+                <pr:smNativeData xmlns:pr="smNativeData" xmlns:p14="http://schemas.microsoft.com/office/powerpoint/2010/main" xmlns="" val="SMDATA_13_SgSuXhMAAAAlAAAAZAAAAE0AAAAAkAAAAEgAAACQAAAASAAAAAAAAAAAAAAAAAAAAAEAAABQAAAAAAAAAAAA4D8AAAAAAADgPwAAAAAAAOA/AAAAAAAA4D8AAAAAAADgPwAAAAAAAOA/AAAAAAAA4D8AAAAAAADgPwAAAAAAAOA/AAAAAAAA4D8CAAAAjAAAAAAAAAAAAAAAprcnDP///wgAAAAAAAAAAAAAAAAAAAAAAAAAAAAAAAAAAAAAZAAAAAEAAABAAAAAAAAAAAAAAAAAAAAAAAAAAAAAAAAAAAAAAAAAAAAAAAAAAAAAAAAAAAAAAAAAAAAAAAAAAAAAAAAAAAAAAAAAAAAAAAAAAAAAAAAAAAAAAAAAAAAAFAAAADwAAAAAAAAAAAAAAAAAAAAPAAAAAQAAACMAAAAjAAAAIwAAAB4AAAAAAAAAZAAAAGQAAAAAAAAAZAAAAGQAAAAVAAAAYAAAAAAAAAAAAAAADwAAACADAAAAAAAAAAAAAAEAAACgMgAAVgcAAKr4//8BAAAAf39/AAEAAABkAAAAAAAAABQAAABAHwAAAAAAACYAAAAAAAAAwOD//wAAAAAmAAAAZAAAABYAAABMAAAAAAAAAAAAAAAEAAAAAAAAAAEAAADd3d0KAAAAACgAAAAoAAAAZAAAAGQAAAAAAAAAzMzMAAAAAABQAAAAUAAAAGQAAABkAAAAAAAAABcAAAAUAAAAAAAAAAAAAAD/fwAA/38AAAAAAAAJAAAABAAAAAYAAAAMAAAAEAAAAAAAAAAAAAAAAAAAAAAAAAAeAAAAaAAAAAAAAAAAAAAAAAAAAAAAAAAAAAAAECcAABAnAAAAAAAAAAAAAAAAAAAAAAAAAAAAAAAAAAAAAAAAAAAAABQAAAAAAAAAwMD/AAAAAABkAAAAMgAAAAAAAABkAAAAAAAAAH9/fwAKAAAAHwAAAFQAAACmtycF////AQAAAAAAAAAAAAAAAAAAAAAAAAAAAAAAAAAAAAAAAAAAAAAAAH9/fwDd3d0DzMzMAMDA/wB/f38AAAAAAAAAAAAAAAAAAAAAAAAAAAAhAAAAGAAAABQAAADnBAAAXAkAAHQkAABsKQAAACAAACYAAAAIAAAA//////////8="/>
               </a:ext>
             </a:extLst>
           </p:cNvSpPr>
@@ -13804,8 +15886,8 @@
         </p:nvSpPr>
         <p:spPr>
           <a:xfrm>
-            <a:off x="1005930" y="940526"/>
-            <a:ext cx="10306504" cy="5499463"/>
+            <a:off x="979803" y="1123406"/>
+            <a:ext cx="9940745" cy="5734593"/>
           </a:xfrm>
           <a:prstGeom prst="rect">
             <a:avLst/>
@@ -13848,103 +15930,147 @@
               <a:rPr dirty="0" smtClean="0"/>
               <a:t>:	</a:t>
             </a:r>
-            <a:endParaRPr dirty="0" smtClean="0"/>
-          </a:p>
-          <a:p>
-            <a:pPr>
+            <a:r>
+              <a:rPr lang="es-ES" dirty="0" smtClean="0"/>
+              <a:t>Eliminamos </a:t>
+            </a:r>
+            <a:r>
+              <a:rPr lang="es-ES" dirty="0" smtClean="0"/>
+              <a:t>datos nulos que formaban parte de los datos categóricos </a:t>
+            </a:r>
+            <a:r>
+              <a:rPr lang="es-ES" dirty="0" err="1" smtClean="0"/>
+              <a:t>network</a:t>
+            </a:r>
+            <a:r>
+              <a:rPr lang="es-ES" dirty="0" smtClean="0"/>
+              <a:t> </a:t>
+            </a:r>
+            <a:r>
+              <a:rPr lang="es-ES" dirty="0" err="1" smtClean="0"/>
+              <a:t>tech</a:t>
+            </a:r>
+            <a:r>
+              <a:rPr lang="es-ES" dirty="0" smtClean="0"/>
+              <a:t>, </a:t>
+            </a:r>
+            <a:r>
+              <a:rPr lang="es-ES" dirty="0" err="1" smtClean="0"/>
+              <a:t>device</a:t>
+            </a:r>
+            <a:r>
+              <a:rPr lang="es-ES" dirty="0" smtClean="0"/>
+              <a:t> </a:t>
+            </a:r>
+            <a:r>
+              <a:rPr lang="es-ES" dirty="0" err="1" smtClean="0"/>
+              <a:t>model</a:t>
+            </a:r>
+            <a:r>
+              <a:rPr lang="es-ES" dirty="0" smtClean="0"/>
+              <a:t> </a:t>
+            </a:r>
+            <a:r>
+              <a:rPr lang="es-ES" dirty="0" err="1" smtClean="0"/>
+              <a:t>name</a:t>
+            </a:r>
+            <a:r>
+              <a:rPr lang="es-ES" dirty="0" smtClean="0"/>
+              <a:t> y </a:t>
+            </a:r>
+            <a:r>
+              <a:rPr lang="es-ES" dirty="0" err="1" smtClean="0"/>
+              <a:t>device</a:t>
+            </a:r>
+            <a:r>
+              <a:rPr lang="es-ES" dirty="0" smtClean="0"/>
+              <a:t> </a:t>
+            </a:r>
+            <a:r>
+              <a:rPr lang="es-ES" dirty="0" err="1" smtClean="0"/>
+              <a:t>vendor</a:t>
+            </a:r>
+            <a:r>
+              <a:rPr lang="es-ES" dirty="0" smtClean="0"/>
+              <a:t> </a:t>
+            </a:r>
+            <a:r>
+              <a:rPr lang="es-ES" dirty="0" err="1" smtClean="0"/>
+              <a:t>name</a:t>
+            </a:r>
+            <a:r>
+              <a:rPr lang="es-ES" dirty="0" smtClean="0"/>
+              <a:t>. </a:t>
+            </a:r>
+            <a:r>
+              <a:rPr lang="es-ES" dirty="0" smtClean="0"/>
+              <a:t>Estos </a:t>
+            </a:r>
+            <a:r>
+              <a:rPr lang="es-ES" dirty="0" smtClean="0"/>
+              <a:t>datos contenían valores </a:t>
+            </a:r>
+            <a:r>
+              <a:rPr lang="es-ES" dirty="0" err="1" smtClean="0"/>
+              <a:t>NaN</a:t>
+            </a:r>
+            <a:r>
+              <a:rPr lang="es-ES" dirty="0" smtClean="0"/>
+              <a:t> y “NOT_IDENTIFIED</a:t>
+            </a:r>
+            <a:r>
+              <a:rPr lang="es-ES" dirty="0" smtClean="0"/>
+              <a:t>”.</a:t>
+            </a:r>
+          </a:p>
+          <a:p>
+            <a:pPr marL="342900" indent="-342900">
+              <a:lnSpc>
+                <a:spcPct val="200000"/>
+              </a:lnSpc>
+              <a:buFont typeface="Arial" panose="020B0604020202020204" pitchFamily="34" charset="0"/>
+              <a:buChar char="•"/>
+              <a:defRPr lang="es-es" sz="2100"/>
+            </a:pPr>
+            <a:r>
+              <a:rPr lang="es-MX" u="sng" dirty="0"/>
+              <a:t>En cuanto a incorrectos</a:t>
+            </a:r>
+            <a:r>
+              <a:rPr lang="es-MX" dirty="0"/>
+              <a:t>: </a:t>
+            </a:r>
+          </a:p>
+          <a:p>
+            <a:pPr lvl="1">
               <a:lnSpc>
                 <a:spcPct val="200000"/>
               </a:lnSpc>
               <a:defRPr lang="es-es" sz="2100"/>
             </a:pPr>
             <a:r>
-              <a:rPr lang="es-ES" dirty="0" smtClean="0"/>
-              <a:t>Eliminamos datos nulos que formaban parte de los datos categóricos </a:t>
-            </a:r>
-            <a:r>
-              <a:rPr lang="es-ES" dirty="0" err="1" smtClean="0"/>
-              <a:t>network</a:t>
-            </a:r>
-            <a:r>
-              <a:rPr lang="es-ES" dirty="0" smtClean="0"/>
-              <a:t> </a:t>
-            </a:r>
-            <a:r>
-              <a:rPr lang="es-ES" dirty="0" err="1" smtClean="0"/>
-              <a:t>tech</a:t>
-            </a:r>
-            <a:r>
-              <a:rPr lang="es-ES" dirty="0" smtClean="0"/>
-              <a:t>, </a:t>
-            </a:r>
-            <a:r>
-              <a:rPr lang="es-ES" dirty="0" err="1" smtClean="0"/>
-              <a:t>device</a:t>
-            </a:r>
-            <a:r>
-              <a:rPr lang="es-ES" dirty="0" smtClean="0"/>
-              <a:t> </a:t>
-            </a:r>
-            <a:r>
-              <a:rPr lang="es-ES" dirty="0" err="1" smtClean="0"/>
-              <a:t>model</a:t>
-            </a:r>
-            <a:r>
-              <a:rPr lang="es-ES" dirty="0" smtClean="0"/>
-              <a:t> </a:t>
-            </a:r>
-            <a:r>
-              <a:rPr lang="es-ES" dirty="0" err="1" smtClean="0"/>
-              <a:t>name</a:t>
-            </a:r>
-            <a:r>
-              <a:rPr lang="es-ES" dirty="0" smtClean="0"/>
-              <a:t> y </a:t>
-            </a:r>
-            <a:r>
-              <a:rPr lang="es-ES" dirty="0" err="1" smtClean="0"/>
-              <a:t>device</a:t>
-            </a:r>
-            <a:r>
-              <a:rPr lang="es-ES" dirty="0" smtClean="0"/>
-              <a:t> </a:t>
-            </a:r>
-            <a:r>
-              <a:rPr lang="es-ES" dirty="0" err="1" smtClean="0"/>
-              <a:t>vendor</a:t>
-            </a:r>
-            <a:r>
-              <a:rPr lang="es-ES" dirty="0" smtClean="0"/>
-              <a:t> </a:t>
-            </a:r>
-            <a:r>
-              <a:rPr lang="es-ES" dirty="0" err="1" smtClean="0"/>
-              <a:t>name</a:t>
-            </a:r>
-            <a:r>
-              <a:rPr lang="es-ES" dirty="0" smtClean="0"/>
-              <a:t>. </a:t>
-            </a:r>
-          </a:p>
-          <a:p>
-            <a:pPr>
+              <a:rPr lang="es-MX" sz="2100" dirty="0"/>
+              <a:t>Se limpiaron datos sobre las cantidades semanales y acumulados mensuales de pack de datos, </a:t>
+            </a:r>
+            <a:r>
+              <a:rPr lang="es-MX" sz="2100" dirty="0" err="1"/>
+              <a:t>sms</a:t>
+            </a:r>
+            <a:r>
+              <a:rPr lang="es-MX" sz="2100" dirty="0"/>
+              <a:t> y voz. Estos datos eran incorrectos debido a una mala recolección de los datos por parte del área de DB. Esto también aplica para las recargas. </a:t>
+            </a:r>
+          </a:p>
+          <a:p>
+            <a:pPr marL="342900" indent="-342900">
               <a:lnSpc>
                 <a:spcPct val="200000"/>
               </a:lnSpc>
+              <a:buFont typeface="Arial" panose="020B0604020202020204" pitchFamily="34" charset="0"/>
+              <a:buChar char="•"/>
               <a:defRPr lang="es-es" sz="2100"/>
             </a:pPr>
-            <a:r>
-              <a:rPr lang="es-ES" dirty="0" smtClean="0"/>
-              <a:t>Estos datos contenían valores </a:t>
-            </a:r>
-            <a:r>
-              <a:rPr lang="es-ES" dirty="0" err="1" smtClean="0"/>
-              <a:t>NaN</a:t>
-            </a:r>
-            <a:r>
-              <a:rPr lang="es-ES" dirty="0" smtClean="0"/>
-              <a:t> y “NOT_IDENTIFIED”.</a:t>
-            </a:r>
+            <a:endParaRPr lang="es-ES" dirty="0" smtClean="0"/>
           </a:p>
           <a:p>
             <a:pPr>
@@ -13988,8 +16114,8 @@
         </p:blipFill>
         <p:spPr>
           <a:xfrm>
-            <a:off x="7550331" y="590110"/>
-            <a:ext cx="2845934" cy="1539604"/>
+            <a:off x="8603523" y="228601"/>
+            <a:ext cx="2559526" cy="1384662"/>
           </a:xfrm>
           <a:prstGeom prst="rect">
             <a:avLst/>
@@ -14038,7 +16164,7 @@
         </p:nvSpPr>
         <p:spPr>
           <a:xfrm>
-            <a:off x="1285105" y="239695"/>
+            <a:off x="4399491" y="239695"/>
             <a:ext cx="4083730" cy="700831"/>
           </a:xfrm>
         </p:spPr>
@@ -14060,7 +16186,7 @@
           <p:cNvSpPr>
             <a:extLst>
               <a:ext uri="smNativeData">
-                <pr:smNativeData xmlns="" xmlns:p14="http://schemas.microsoft.com/office/powerpoint/2010/main" xmlns:pr="smNativeData" val="SMDATA_13_SgSuXhMAAAAlAAAAZAAAAE0AAAAAkAAAAEgAAACQAAAASAAAAAAAAAAAAAAAAAAAAAEAAABQAAAAAAAAAAAA4D8AAAAAAADgPwAAAAAAAOA/AAAAAAAA4D8AAAAAAADgPwAAAAAAAOA/AAAAAAAA4D8AAAAAAADgPwAAAAAAAOA/AAAAAAAA4D8CAAAAjAAAAAAAAAAAAAAAprcnDP///wgAAAAAAAAAAAAAAAAAAAAAAAAAAAAAAAAAAAAAZAAAAAEAAABAAAAAAAAAAAAAAAAAAAAAAAAAAAAAAAAAAAAAAAAAAAAAAAAAAAAAAAAAAAAAAAAAAAAAAAAAAAAAAAAAAAAAAAAAAAAAAAAAAAAAAAAAAAAAAAAAAAAAFAAAADwAAAAAAAAAAAAAAAAAAAAPAAAAAQAAACMAAAAjAAAAIwAAAB4AAAAAAAAAZAAAAGQAAAAAAAAAZAAAAGQAAAAVAAAAYAAAAAAAAAAAAAAADwAAACADAAAAAAAAAAAAAAEAAACgMgAAVgcAAKr4//8BAAAAf39/AAEAAABkAAAAAAAAABQAAABAHwAAAAAAACYAAAAAAAAAwOD//wAAAAAmAAAAZAAAABYAAABMAAAAAAAAAAAAAAAEAAAAAAAAAAEAAADd3d0KAAAAACgAAAAoAAAAZAAAAGQAAAAAAAAAzMzMAAAAAABQAAAAUAAAAGQAAABkAAAAAAAAABcAAAAUAAAAAAAAAAAAAAD/fwAA/38AAAAAAAAJAAAABAAAAAYAAAAMAAAAEAAAAAAAAAAAAAAAAAAAAAAAAAAeAAAAaAAAAAAAAAAAAAAAAAAAAAAAAAAAAAAAECcAABAnAAAAAAAAAAAAAAAAAAAAAAAAAAAAAAAAAAAAAAAAAAAAABQAAAAAAAAAwMD/AAAAAABkAAAAMgAAAAAAAABkAAAAAAAAAH9/fwAKAAAAHwAAAFQAAACmtycF////AQAAAAAAAAAAAAAAAAAAAAAAAAAAAAAAAAAAAAAAAAAAAAAAAH9/fwDd3d0DzMzMAMDA/wB/f38AAAAAAAAAAAAAAAAAAAAAAAAAAAAhAAAAGAAAABQAAADnBAAAXAkAAHQkAABsKQAAACAAACYAAAAIAAAA//////////8="/>
+                <pr:smNativeData xmlns:pr="smNativeData" xmlns:p14="http://schemas.microsoft.com/office/powerpoint/2010/main" xmlns="" val="SMDATA_13_SgSuXhMAAAAlAAAAZAAAAE0AAAAAkAAAAEgAAACQAAAASAAAAAAAAAAAAAAAAAAAAAEAAABQAAAAAAAAAAAA4D8AAAAAAADgPwAAAAAAAOA/AAAAAAAA4D8AAAAAAADgPwAAAAAAAOA/AAAAAAAA4D8AAAAAAADgPwAAAAAAAOA/AAAAAAAA4D8CAAAAjAAAAAAAAAAAAAAAprcnDP///wgAAAAAAAAAAAAAAAAAAAAAAAAAAAAAAAAAAAAAZAAAAAEAAABAAAAAAAAAAAAAAAAAAAAAAAAAAAAAAAAAAAAAAAAAAAAAAAAAAAAAAAAAAAAAAAAAAAAAAAAAAAAAAAAAAAAAAAAAAAAAAAAAAAAAAAAAAAAAAAAAAAAAFAAAADwAAAAAAAAAAAAAAAAAAAAPAAAAAQAAACMAAAAjAAAAIwAAAB4AAAAAAAAAZAAAAGQAAAAAAAAAZAAAAGQAAAAVAAAAYAAAAAAAAAAAAAAADwAAACADAAAAAAAAAAAAAAEAAACgMgAAVgcAAKr4//8BAAAAf39/AAEAAABkAAAAAAAAABQAAABAHwAAAAAAACYAAAAAAAAAwOD//wAAAAAmAAAAZAAAABYAAABMAAAAAAAAAAAAAAAEAAAAAAAAAAEAAADd3d0KAAAAACgAAAAoAAAAZAAAAGQAAAAAAAAAzMzMAAAAAABQAAAAUAAAAGQAAABkAAAAAAAAABcAAAAUAAAAAAAAAAAAAAD/fwAA/38AAAAAAAAJAAAABAAAAAYAAAAMAAAAEAAAAAAAAAAAAAAAAAAAAAAAAAAeAAAAaAAAAAAAAAAAAAAAAAAAAAAAAAAAAAAAECcAABAnAAAAAAAAAAAAAAAAAAAAAAAAAAAAAAAAAAAAAAAAAAAAABQAAAAAAAAAwMD/AAAAAABkAAAAMgAAAAAAAABkAAAAAAAAAH9/fwAKAAAAHwAAAFQAAACmtycF////AQAAAAAAAAAAAAAAAAAAAAAAAAAAAAAAAAAAAAAAAAAAAAAAAH9/fwDd3d0DzMzMAMDA/wB/f38AAAAAAAAAAAAAAAAAAAAAAAAAAAAhAAAAGAAAABQAAADnBAAAXAkAAHQkAABsKQAAACAAACYAAAAIAAAA//////////8="/>
               </a:ext>
             </a:extLst>
           </p:cNvSpPr>
@@ -14068,8 +16194,8 @@
         </p:nvSpPr>
         <p:spPr>
           <a:xfrm>
-            <a:off x="1005930" y="940526"/>
-            <a:ext cx="10306504" cy="5499463"/>
+            <a:off x="1005930" y="940527"/>
+            <a:ext cx="8268699" cy="4937760"/>
           </a:xfrm>
           <a:prstGeom prst="rect">
             <a:avLst/>
@@ -14110,72 +16236,100 @@
               <a:defRPr lang="es-es" sz="2100"/>
             </a:pPr>
             <a:r>
+              <a:rPr u="sng" dirty="0" smtClean="0"/>
+              <a:t>En </a:t>
+            </a:r>
+            <a:r>
               <a:rPr u="sng" dirty="0"/>
-              <a:t>En cuanto a incorrectos</a:t>
-            </a:r>
-            <a:r>
-              <a:rPr dirty="0" smtClean="0"/>
+              <a:t>cuanto a </a:t>
+            </a:r>
+            <a:r>
+              <a:rPr u="sng" dirty="0" err="1" smtClean="0"/>
+              <a:t>outliers</a:t>
+            </a:r>
+            <a:r>
+              <a:rPr u="sng" dirty="0" smtClean="0"/>
               <a:t>: </a:t>
             </a:r>
           </a:p>
           <a:p>
-            <a:pPr lvl="1">
+            <a:pPr>
               <a:lnSpc>
                 <a:spcPct val="200000"/>
               </a:lnSpc>
               <a:defRPr lang="es-es" sz="2100"/>
             </a:pPr>
             <a:r>
-              <a:rPr sz="2100" dirty="0" smtClean="0"/>
-              <a:t>Se limpiaron datos sobre las cantidades semanales y acumulados mensuales de pack de datos, </a:t>
-            </a:r>
-            <a:r>
-              <a:rPr sz="2100" dirty="0" err="1" smtClean="0"/>
-              <a:t>sms</a:t>
-            </a:r>
-            <a:r>
-              <a:rPr sz="2100" dirty="0" smtClean="0"/>
-              <a:t> y voz. Estos datos eran incorrectos debido a una mala </a:t>
-            </a:r>
-            <a:r>
-              <a:rPr sz="2100" dirty="0" err="1" smtClean="0"/>
-              <a:t>recolecci</a:t>
-            </a:r>
-            <a:r>
-              <a:rPr lang="es-MX" sz="2100" dirty="0" err="1" smtClean="0"/>
-              <a:t>ó</a:t>
-            </a:r>
-            <a:r>
-              <a:rPr sz="2100" dirty="0" smtClean="0"/>
-              <a:t>n de los datos por parte del </a:t>
-            </a:r>
-            <a:r>
-              <a:rPr lang="es-MX" sz="2100" dirty="0" smtClean="0"/>
-              <a:t>á</a:t>
-            </a:r>
-            <a:r>
-              <a:rPr sz="2100" dirty="0" smtClean="0"/>
-              <a:t>rea de DB. Esto </a:t>
-            </a:r>
-            <a:r>
-              <a:rPr sz="2100" dirty="0" err="1" smtClean="0"/>
-              <a:t>tambi</a:t>
-            </a:r>
-            <a:r>
-              <a:rPr lang="es-MX" sz="2100" dirty="0" smtClean="0"/>
-              <a:t>é</a:t>
-            </a:r>
-            <a:r>
-              <a:rPr sz="2100" dirty="0" smtClean="0"/>
-              <a:t>n aplica para las recargas. </a:t>
-            </a:r>
-            <a:endParaRPr sz="2100" dirty="0"/>
+              <a:rPr lang="es-ES" dirty="0" smtClean="0"/>
+              <a:t>Encontramos </a:t>
+            </a:r>
+            <a:r>
+              <a:rPr lang="es-ES" dirty="0" err="1"/>
+              <a:t>outliers</a:t>
+            </a:r>
+            <a:r>
+              <a:rPr lang="es-ES" dirty="0"/>
+              <a:t>  para el trafico de datos y de </a:t>
+            </a:r>
+            <a:r>
+              <a:rPr lang="es-ES" dirty="0" smtClean="0"/>
+              <a:t>voz</a:t>
+            </a:r>
+            <a:r>
+              <a:rPr lang="es-ES" dirty="0"/>
+              <a:t>.</a:t>
+            </a:r>
+            <a:endParaRPr u="sng" dirty="0" smtClean="0"/>
+          </a:p>
+          <a:p>
+            <a:pPr>
+              <a:lnSpc>
+                <a:spcPct val="200000"/>
+              </a:lnSpc>
+              <a:defRPr lang="es-es" sz="2100"/>
+            </a:pPr>
+            <a:r>
+              <a:rPr lang="es-ES" dirty="0" smtClean="0"/>
+              <a:t>Para imputar los </a:t>
+            </a:r>
+            <a:r>
+              <a:rPr lang="es-ES" dirty="0" err="1" smtClean="0"/>
+              <a:t>outliers</a:t>
+            </a:r>
+            <a:r>
+              <a:rPr lang="es-ES" dirty="0" smtClean="0"/>
+              <a:t> dependiendo cuan distribuidos </a:t>
+            </a:r>
+            <a:r>
+              <a:rPr lang="es-ES" dirty="0" err="1" smtClean="0"/>
+              <a:t>uniformente</a:t>
+            </a:r>
+            <a:r>
+              <a:rPr lang="es-ES" dirty="0" smtClean="0"/>
+              <a:t> estaban los datos utilizamos la media o la mediana. Para definir el rango </a:t>
+            </a:r>
+            <a:r>
+              <a:rPr lang="es-ES" dirty="0" err="1" smtClean="0"/>
+              <a:t>interquartil</a:t>
+            </a:r>
+            <a:r>
+              <a:rPr lang="es-ES" dirty="0" smtClean="0"/>
+              <a:t> (IQR) usamos el Q1 y Q3, que luego de multiplicarlos por 1.5 nos definirán los valores que se consideran como </a:t>
+            </a:r>
+            <a:r>
+              <a:rPr lang="es-ES" dirty="0" err="1" smtClean="0"/>
+              <a:t>outliers</a:t>
+            </a:r>
+            <a:r>
+              <a:rPr lang="es-ES" dirty="0" smtClean="0"/>
+              <a:t>.</a:t>
+            </a:r>
           </a:p>
         </p:txBody>
       </p:sp>
       <p:pic>
         <p:nvPicPr>
-          <p:cNvPr id="3" name="Imagen 2"/>
+          <p:cNvPr id="7" name="Imagen 6"/>
           <p:cNvPicPr>
             <a:picLocks noChangeAspect="1"/>
           </p:cNvPicPr>
@@ -14195,8 +16349,8 @@
         </p:blipFill>
         <p:spPr>
           <a:xfrm>
-            <a:off x="7550331" y="409440"/>
-            <a:ext cx="2845934" cy="1539604"/>
+            <a:off x="9274629" y="2091589"/>
+            <a:ext cx="2385076" cy="2319129"/>
           </a:xfrm>
           <a:prstGeom prst="rect">
             <a:avLst/>
@@ -14206,7 +16360,7 @@
     </p:spTree>
     <p:extLst>
       <p:ext uri="{BB962C8B-B14F-4D97-AF65-F5344CB8AC3E}">
-        <p14:creationId xmlns:p14="http://schemas.microsoft.com/office/powerpoint/2010/main" val="4241633670"/>
+        <p14:creationId xmlns:p14="http://schemas.microsoft.com/office/powerpoint/2010/main" val="412317017"/>
       </p:ext>
     </p:extLst>
   </p:cSld>
@@ -14245,7 +16399,7 @@
         </p:nvSpPr>
         <p:spPr>
           <a:xfrm>
-            <a:off x="1285105" y="239695"/>
+            <a:off x="4955768" y="239695"/>
             <a:ext cx="4083730" cy="700831"/>
           </a:xfrm>
         </p:spPr>
@@ -14267,7 +16421,7 @@
           <p:cNvSpPr>
             <a:extLst>
               <a:ext uri="smNativeData">
-                <pr:smNativeData xmlns="" xmlns:p14="http://schemas.microsoft.com/office/powerpoint/2010/main" xmlns:pr="smNativeData" val="SMDATA_13_SgSuXhMAAAAlAAAAZAAAAE0AAAAAkAAAAEgAAACQAAAASAAAAAAAAAAAAAAAAAAAAAEAAABQAAAAAAAAAAAA4D8AAAAAAADgPwAAAAAAAOA/AAAAAAAA4D8AAAAAAADgPwAAAAAAAOA/AAAAAAAA4D8AAAAAAADgPwAAAAAAAOA/AAAAAAAA4D8CAAAAjAAAAAAAAAAAAAAAprcnDP///wgAAAAAAAAAAAAAAAAAAAAAAAAAAAAAAAAAAAAAZAAAAAEAAABAAAAAAAAAAAAAAAAAAAAAAAAAAAAAAAAAAAAAAAAAAAAAAAAAAAAAAAAAAAAAAAAAAAAAAAAAAAAAAAAAAAAAAAAAAAAAAAAAAAAAAAAAAAAAAAAAAAAAFAAAADwAAAAAAAAAAAAAAAAAAAAPAAAAAQAAACMAAAAjAAAAIwAAAB4AAAAAAAAAZAAAAGQAAAAAAAAAZAAAAGQAAAAVAAAAYAAAAAAAAAAAAAAADwAAACADAAAAAAAAAAAAAAEAAACgMgAAVgcAAKr4//8BAAAAf39/AAEAAABkAAAAAAAAABQAAABAHwAAAAAAACYAAAAAAAAAwOD//wAAAAAmAAAAZAAAABYAAABMAAAAAAAAAAAAAAAEAAAAAAAAAAEAAADd3d0KAAAAACgAAAAoAAAAZAAAAGQAAAAAAAAAzMzMAAAAAABQAAAAUAAAAGQAAABkAAAAAAAAABcAAAAUAAAAAAAAAAAAAAD/fwAA/38AAAAAAAAJAAAABAAAAAYAAAAMAAAAEAAAAAAAAAAAAAAAAAAAAAAAAAAeAAAAaAAAAAAAAAAAAAAAAAAAAAAAAAAAAAAAECcAABAnAAAAAAAAAAAAAAAAAAAAAAAAAAAAAAAAAAAAAAAAAAAAABQAAAAAAAAAwMD/AAAAAABkAAAAMgAAAAAAAABkAAAAAAAAAH9/fwAKAAAAHwAAAFQAAACmtycF////AQAAAAAAAAAAAAAAAAAAAAAAAAAAAAAAAAAAAAAAAAAAAAAAAH9/fwDd3d0DzMzMAMDA/wB/f38AAAAAAAAAAAAAAAAAAAAAAAAAAAAhAAAAGAAAABQAAADnBAAAXAkAAHQkAABsKQAAACAAACYAAAAIAAAA//////////8="/>
+                <pr:smNativeData xmlns:pr="smNativeData" xmlns:p14="http://schemas.microsoft.com/office/powerpoint/2010/main" xmlns="" val="SMDATA_13_SgSuXhMAAAAlAAAAZAAAAE0AAAAAkAAAAEgAAACQAAAASAAAAAAAAAAAAAAAAAAAAAEAAABQAAAAAAAAAAAA4D8AAAAAAADgPwAAAAAAAOA/AAAAAAAA4D8AAAAAAADgPwAAAAAAAOA/AAAAAAAA4D8AAAAAAADgPwAAAAAAAOA/AAAAAAAA4D8CAAAAjAAAAAAAAAAAAAAAprcnDP///wgAAAAAAAAAAAAAAAAAAAAAAAAAAAAAAAAAAAAAZAAAAAEAAABAAAAAAAAAAAAAAAAAAAAAAAAAAAAAAAAAAAAAAAAAAAAAAAAAAAAAAAAAAAAAAAAAAAAAAAAAAAAAAAAAAAAAAAAAAAAAAAAAAAAAAAAAAAAAAAAAAAAAFAAAADwAAAAAAAAAAAAAAAAAAAAPAAAAAQAAACMAAAAjAAAAIwAAAB4AAAAAAAAAZAAAAGQAAAAAAAAAZAAAAGQAAAAVAAAAYAAAAAAAAAAAAAAADwAAACADAAAAAAAAAAAAAAEAAACgMgAAVgcAAKr4//8BAAAAf39/AAEAAABkAAAAAAAAABQAAABAHwAAAAAAACYAAAAAAAAAwOD//wAAAAAmAAAAZAAAABYAAABMAAAAAAAAAAAAAAAEAAAAAAAAAAEAAADd3d0KAAAAACgAAAAoAAAAZAAAAGQAAAAAAAAAzMzMAAAAAABQAAAAUAAAAGQAAABkAAAAAAAAABcAAAAUAAAAAAAAAAAAAAD/fwAA/38AAAAAAAAJAAAABAAAAAYAAAAMAAAAEAAAAAAAAAAAAAAAAAAAAAAAAAAeAAAAaAAAAAAAAAAAAAAAAAAAAAAAAAAAAAAAECcAABAnAAAAAAAAAAAAAAAAAAAAAAAAAAAAAAAAAAAAAAAAAAAAABQAAAAAAAAAwMD/AAAAAABkAAAAMgAAAAAAAABkAAAAAAAAAH9/fwAKAAAAHwAAAFQAAACmtycF////AQAAAAAAAAAAAAAAAAAAAAAAAAAAAAAAAAAAAAAAAAAAAAAAAH9/fwDd3d0DzMzMAMDA/wB/f38AAAAAAAAAAAAAAAAAAAAAAAAAAAAhAAAAGAAAABQAAADnBAAAXAkAAHQkAABsKQAAACAAACYAAAAIAAAA//////////8="/>
               </a:ext>
             </a:extLst>
           </p:cNvSpPr>
@@ -14276,7 +16430,7 @@
         <p:spPr>
           <a:xfrm>
             <a:off x="1005930" y="940526"/>
-            <a:ext cx="10306504" cy="5499463"/>
+            <a:ext cx="7439479" cy="5499463"/>
           </a:xfrm>
           <a:prstGeom prst="rect">
             <a:avLst/>
@@ -14325,12 +16479,8 @@
               <a:t>cuanto a </a:t>
             </a:r>
             <a:r>
-              <a:rPr u="sng" dirty="0" err="1" smtClean="0"/>
-              <a:t>outliers</a:t>
-            </a:r>
-            <a:r>
               <a:rPr u="sng" dirty="0" smtClean="0"/>
-              <a:t>:</a:t>
+              <a:t>duplicados:</a:t>
             </a:r>
           </a:p>
           <a:p>
@@ -14341,76 +16491,16 @@
               <a:defRPr lang="es-es" sz="2100"/>
             </a:pPr>
             <a:r>
-              <a:rPr lang="es-ES" dirty="0"/>
-              <a:t>Encontramos </a:t>
-            </a:r>
-            <a:r>
-              <a:rPr lang="es-ES" dirty="0" err="1"/>
-              <a:t>outliers</a:t>
-            </a:r>
-            <a:r>
-              <a:rPr lang="es-ES" dirty="0"/>
-              <a:t>  para el trafico de datos y de </a:t>
-            </a:r>
-            <a:r>
               <a:rPr lang="es-ES" dirty="0" smtClean="0"/>
-              <a:t>voz</a:t>
-            </a:r>
-            <a:r>
-              <a:rPr lang="es-ES" dirty="0"/>
-              <a:t>.</a:t>
-            </a:r>
-            <a:endParaRPr u="sng" dirty="0" smtClean="0"/>
-          </a:p>
-          <a:p>
-            <a:pPr>
-              <a:lnSpc>
-                <a:spcPct val="200000"/>
-              </a:lnSpc>
-              <a:defRPr lang="es-es" sz="2100"/>
-            </a:pPr>
-            <a:r>
-              <a:rPr lang="es-ES" dirty="0" smtClean="0"/>
-              <a:t>Para imputar los </a:t>
-            </a:r>
-            <a:r>
-              <a:rPr lang="es-ES" dirty="0" err="1" smtClean="0"/>
-              <a:t>outliers</a:t>
-            </a:r>
-            <a:r>
-              <a:rPr lang="es-ES" dirty="0" smtClean="0"/>
-              <a:t> dependiendo cuan distribuidos </a:t>
-            </a:r>
-            <a:r>
-              <a:rPr lang="es-ES" dirty="0" err="1" smtClean="0"/>
-              <a:t>uniformente</a:t>
-            </a:r>
-            <a:r>
-              <a:rPr lang="es-ES" dirty="0" smtClean="0"/>
-              <a:t> estaban los datos utilizamos la media o la mediana. Para definir el rango </a:t>
-            </a:r>
-            <a:r>
-              <a:rPr lang="es-ES" dirty="0" err="1" smtClean="0"/>
-              <a:t>interquartil</a:t>
-            </a:r>
-            <a:r>
-              <a:rPr lang="es-ES" dirty="0" smtClean="0"/>
-              <a:t> (IQR) usamos el Q1 y Q3, que luego de multiplicarlos por 1.5 nos definirán los valores que se consideran como </a:t>
-            </a:r>
-            <a:r>
-              <a:rPr lang="es-ES" dirty="0" err="1" smtClean="0"/>
-              <a:t>outliers</a:t>
-            </a:r>
-            <a:r>
-              <a:rPr lang="es-ES" dirty="0" smtClean="0"/>
-              <a:t>.</a:t>
-            </a:r>
+              <a:t>Encontramos información que es duplicada que puede ser obtenida haciendo cálculos sobre las columnas, por ejemplo para el caso de los montos de recargas y los packs el desglose a nivel semanal al sumarlo nos daba la columna de su acumulado mensual, por lo que decidimos quitar estas columnas para no repetir datos.</a:t>
+            </a:r>
+            <a:endParaRPr dirty="0"/>
           </a:p>
         </p:txBody>
       </p:sp>
       <p:pic>
         <p:nvPicPr>
-          <p:cNvPr id="7" name="Imagen 6"/>
+          <p:cNvPr id="5" name="Imagen 4"/>
           <p:cNvPicPr>
             <a:picLocks noChangeAspect="1"/>
           </p:cNvPicPr>
@@ -14430,8 +16520,8 @@
         </p:blipFill>
         <p:spPr>
           <a:xfrm>
-            <a:off x="8483221" y="590110"/>
-            <a:ext cx="2385076" cy="2319129"/>
+            <a:off x="8680540" y="2090057"/>
+            <a:ext cx="2867025" cy="1600200"/>
           </a:xfrm>
           <a:prstGeom prst="rect">
             <a:avLst/>
@@ -14441,7 +16531,7 @@
     </p:spTree>
     <p:extLst>
       <p:ext uri="{BB962C8B-B14F-4D97-AF65-F5344CB8AC3E}">
-        <p14:creationId xmlns:p14="http://schemas.microsoft.com/office/powerpoint/2010/main" val="412317017"/>
+        <p14:creationId xmlns:p14="http://schemas.microsoft.com/office/powerpoint/2010/main" val="578151812"/>
       </p:ext>
     </p:extLst>
   </p:cSld>

</xml_diff>